<commit_message>
updated with additional qc feedback
</commit_message>
<xml_diff>
--- a/Whiteboard design session/WDS trainer presentation - Azure Synapse Analytics end-to-end solution.pptx
+++ b/Whiteboard design session/WDS trainer presentation - Azure Synapse Analytics end-to-end solution.pptx
@@ -150,15 +150,6 @@
 </p:presentation>
 </file>
 
-<file path=ppt/revisionInfo.xml><?xml version="1.0" encoding="utf-8"?>
-<p1510:revInfo xmlns:a="http://schemas.openxmlformats.org/drawingml/2006/main" xmlns:r="http://schemas.openxmlformats.org/officeDocument/2006/relationships" xmlns:p1510="http://schemas.microsoft.com/office/powerpoint/2015/10/main">
-  <p1510:revLst>
-    <p1510:client id="{5F159153-6972-4091-9728-9592CD7B1E22}" v="1" dt="2018-06-29T19:57:36.034"/>
-    <p1510:client id="{738DBAC3-60A1-4913-A600-E1113DEB827D}" v="37" dt="2018-05-10T17:30:28.024"/>
-  </p1510:revLst>
-</p1510:revInfo>
-</file>
-
 <file path=ppt/notesMasters/notesMaster1.xml><?xml version="1.0" encoding="utf-8"?>
 <p:notesMaster xmlns:a="http://schemas.openxmlformats.org/drawingml/2006/main" xmlns:r="http://schemas.openxmlformats.org/officeDocument/2006/relationships" xmlns:p="http://schemas.openxmlformats.org/presentationml/2006/main">
   <p:cSld>
@@ -208,7 +199,7 @@
             </a:lvl1pPr>
           </a:lstStyle>
           <a:p>
-            <a:endParaRPr lang="en-US"/>
+            <a:endParaRPr lang="en-US" dirty="0"/>
           </a:p>
         </p:txBody>
       </p:sp>
@@ -243,7 +234,7 @@
               <a:rPr lang="en-US" smtClean="0"/>
               <a:t>4/16/2020</a:t>
             </a:fld>
-            <a:endParaRPr lang="en-US"/>
+            <a:endParaRPr lang="en-US" dirty="0"/>
           </a:p>
         </p:txBody>
       </p:sp>
@@ -276,7 +267,7 @@
           <a:bodyPr vert="horz" lIns="91440" tIns="45720" rIns="91440" bIns="45720" rtlCol="0" anchor="ctr"/>
           <a:lstStyle/>
           <a:p>
-            <a:endParaRPr lang="en-US"/>
+            <a:endParaRPr lang="en-US" dirty="0"/>
           </a:p>
         </p:txBody>
       </p:sp>
@@ -366,7 +357,7 @@
             </a:lvl1pPr>
           </a:lstStyle>
           <a:p>
-            <a:endParaRPr lang="en-US"/>
+            <a:endParaRPr lang="en-US" dirty="0"/>
           </a:p>
         </p:txBody>
       </p:sp>
@@ -401,7 +392,7 @@
               <a:rPr lang="en-US" smtClean="0"/>
               <a:t>‹#›</a:t>
             </a:fld>
-            <a:endParaRPr lang="en-US"/>
+            <a:endParaRPr lang="en-US" dirty="0"/>
           </a:p>
         </p:txBody>
       </p:sp>
@@ -622,7 +613,7 @@
               </a:pPr>
               <a:t>1</a:t>
             </a:fld>
-            <a:endParaRPr kumimoji="0" lang="en-US" sz="1200" b="0" i="0" u="none" strike="noStrike" kern="1200" cap="none" spc="0" normalizeH="0" baseline="0" noProof="0">
+            <a:endParaRPr kumimoji="0" lang="en-US" sz="1200" b="0" i="0" u="none" strike="noStrike" kern="1200" cap="none" spc="0" normalizeH="0" baseline="0" noProof="0" dirty="0">
               <a:ln>
                 <a:noFill/>
               </a:ln>
@@ -798,7 +789,7 @@
                 <a:ea typeface="+mn-ea"/>
                 <a:cs typeface="+mn-cs"/>
               </a:rPr>
-              <a:t>8. Need a solution that provides a consistent security model across all components.</a:t>
+              <a:t>8. Create a solution that provides a consistent security model across all components.</a:t>
             </a:r>
           </a:p>
           <a:p>
@@ -836,7 +827,7 @@
               <a:rPr lang="en-US" smtClean="0"/>
               <a:t>10</a:t>
             </a:fld>
-            <a:endParaRPr lang="en-US"/>
+            <a:endParaRPr lang="en-US" dirty="0"/>
           </a:p>
         </p:txBody>
       </p:sp>
@@ -897,7 +888,7 @@
           <a:bodyPr/>
           <a:lstStyle/>
           <a:p>
-            <a:endParaRPr lang="en-US"/>
+            <a:endParaRPr lang="en-US" dirty="0"/>
           </a:p>
         </p:txBody>
       </p:sp>
@@ -920,7 +911,7 @@
               <a:rPr lang="en-US" smtClean="0"/>
               <a:t>11</a:t>
             </a:fld>
-            <a:endParaRPr lang="en-US"/>
+            <a:endParaRPr lang="en-US" dirty="0"/>
           </a:p>
         </p:txBody>
       </p:sp>
@@ -981,7 +972,7 @@
           <a:bodyPr/>
           <a:lstStyle/>
           <a:p>
-            <a:endParaRPr lang="en-US"/>
+            <a:endParaRPr lang="en-US" dirty="0"/>
           </a:p>
         </p:txBody>
       </p:sp>
@@ -1004,7 +995,7 @@
               <a:rPr lang="en-US" smtClean="0"/>
               <a:t>12</a:t>
             </a:fld>
-            <a:endParaRPr lang="en-US"/>
+            <a:endParaRPr lang="en-US" dirty="0"/>
           </a:p>
         </p:txBody>
       </p:sp>
@@ -1088,7 +1079,7 @@
               <a:rPr lang="en-US" smtClean="0"/>
               <a:t>13</a:t>
             </a:fld>
-            <a:endParaRPr lang="en-US"/>
+            <a:endParaRPr lang="en-US" dirty="0"/>
           </a:p>
         </p:txBody>
       </p:sp>
@@ -1172,7 +1163,7 @@
               <a:rPr lang="en-US" smtClean="0"/>
               <a:t>14</a:t>
             </a:fld>
-            <a:endParaRPr lang="en-US"/>
+            <a:endParaRPr lang="en-US" dirty="0"/>
           </a:p>
         </p:txBody>
       </p:sp>
@@ -1256,7 +1247,7 @@
               <a:rPr lang="en-US" smtClean="0"/>
               <a:t>15</a:t>
             </a:fld>
-            <a:endParaRPr lang="en-US"/>
+            <a:endParaRPr lang="en-US" dirty="0"/>
           </a:p>
         </p:txBody>
       </p:sp>
@@ -1340,7 +1331,7 @@
               <a:rPr lang="en-US" smtClean="0"/>
               <a:t>16</a:t>
             </a:fld>
-            <a:endParaRPr lang="en-US"/>
+            <a:endParaRPr lang="en-US" dirty="0"/>
           </a:p>
         </p:txBody>
       </p:sp>
@@ -1401,7 +1392,7 @@
           <a:bodyPr/>
           <a:lstStyle/>
           <a:p>
-            <a:endParaRPr lang="en-US"/>
+            <a:endParaRPr lang="en-US" dirty="0"/>
           </a:p>
         </p:txBody>
       </p:sp>
@@ -1424,7 +1415,7 @@
               <a:rPr lang="en-US" smtClean="0"/>
               <a:t>17</a:t>
             </a:fld>
-            <a:endParaRPr lang="en-US"/>
+            <a:endParaRPr lang="en-US" dirty="0"/>
           </a:p>
         </p:txBody>
       </p:sp>
@@ -1553,31 +1544,7 @@
                 <a:ea typeface="+mn-ea"/>
                 <a:cs typeface="+mn-cs"/>
               </a:rPr>
-              <a:t>Azure Synapse SQL offers both serverless and provisioned resource models, offering consumption and billing options to fit the customer's needs. For predictable performance and cost, provision pools to reserve processing power for data stored in SQL tables. For ad hoc or </a:t>
-            </a:r>
-            <a:r>
-              <a:rPr lang="en-US" sz="1200" b="0" kern="1200" dirty="0" err="1">
-                <a:solidFill>
-                  <a:schemeClr val="tx1"/>
-                </a:solidFill>
-                <a:effectLst/>
-                <a:latin typeface="+mn-lt"/>
-                <a:ea typeface="+mn-ea"/>
-                <a:cs typeface="+mn-cs"/>
-              </a:rPr>
-              <a:t>bursty</a:t>
-            </a:r>
-            <a:r>
-              <a:rPr lang="en-US" sz="1200" b="0" kern="1200" dirty="0">
-                <a:solidFill>
-                  <a:schemeClr val="tx1"/>
-                </a:solidFill>
-                <a:effectLst/>
-                <a:latin typeface="+mn-lt"/>
-                <a:ea typeface="+mn-ea"/>
-                <a:cs typeface="+mn-cs"/>
-              </a:rPr>
-              <a:t> workloads, use the serverless, always-available SQL endpoint. </a:t>
+              <a:t>Azure Synapse SQL offers both serverless and provisioned resource models, offering consumption and billing options to fit the customer's needs. For predictable performance and cost, provision pools to reserve processing power for data stored in SQL tables. For ad hoc or bursty workloads, use the serverless, always-available SQL endpoint. </a:t>
             </a:r>
           </a:p>
           <a:p>
@@ -1637,7 +1604,7 @@
               <a:rPr lang="en-US" smtClean="0"/>
               <a:t>18</a:t>
             </a:fld>
-            <a:endParaRPr lang="en-US"/>
+            <a:endParaRPr lang="en-US" dirty="0"/>
           </a:p>
         </p:txBody>
       </p:sp>
@@ -1708,55 +1675,7 @@
                 <a:ea typeface="+mn-ea"/>
                 <a:cs typeface="+mn-cs"/>
               </a:rPr>
-              <a:t>This diagram illustrates how they could handle the streaming data, the "hot path". Twitter tweet data needs to be pulled using a </a:t>
-            </a:r>
-            <a:r>
-              <a:rPr lang="en-US" sz="1200" b="0" kern="1200" dirty="0" err="1">
-                <a:solidFill>
-                  <a:schemeClr val="tx1"/>
-                </a:solidFill>
-                <a:effectLst/>
-                <a:latin typeface="+mn-lt"/>
-                <a:ea typeface="+mn-ea"/>
-                <a:cs typeface="+mn-cs"/>
-              </a:rPr>
-              <a:t>WebJob</a:t>
-            </a:r>
-            <a:r>
-              <a:rPr lang="en-US" sz="1200" b="0" kern="1200" dirty="0">
-                <a:solidFill>
-                  <a:schemeClr val="tx1"/>
-                </a:solidFill>
-                <a:effectLst/>
-                <a:latin typeface="+mn-lt"/>
-                <a:ea typeface="+mn-ea"/>
-                <a:cs typeface="+mn-cs"/>
-              </a:rPr>
-              <a:t>. This </a:t>
-            </a:r>
-            <a:r>
-              <a:rPr lang="en-US" sz="1200" b="0" kern="1200" dirty="0" err="1">
-                <a:solidFill>
-                  <a:schemeClr val="tx1"/>
-                </a:solidFill>
-                <a:effectLst/>
-                <a:latin typeface="+mn-lt"/>
-                <a:ea typeface="+mn-ea"/>
-                <a:cs typeface="+mn-cs"/>
-              </a:rPr>
-              <a:t>WebJob</a:t>
-            </a:r>
-            <a:r>
-              <a:rPr lang="en-US" sz="1200" b="0" kern="1200" dirty="0">
-                <a:solidFill>
-                  <a:schemeClr val="tx1"/>
-                </a:solidFill>
-                <a:effectLst/>
-                <a:latin typeface="+mn-lt"/>
-                <a:ea typeface="+mn-ea"/>
-                <a:cs typeface="+mn-cs"/>
-              </a:rPr>
-              <a:t> would load the tweets into Event Hubs so that they could be processed reliably using Stream Analytics. Stream Analytics can be used both to archive all tweets to the data lake for offline or batch analysis using Azure Synapse SQL Pools within Azure Synapse Analytics, as well as to send live data to Power BI reports for real-time dashboards and reports. The in-store IoT sensors could ingest their data into IoT Hub directly, and by integrating with IoT Hub also benefit from the device management capabilities that IoT Hub enables. Ultimately this data would also be processed by another Stream Analytics job and served in the same was as the tweets.</a:t>
+              <a:t>This diagram illustrates how they could handle the streaming data, the "hot path". Twitter tweet data needs to be pulled using a WebJob. This WebJob would load the tweets into Event Hubs so that they could be processed reliably using Stream Analytics. Stream Analytics can be used both to archive all tweets to the data lake for offline or batch analysis using Azure Synapse SQL Pools within Azure Synapse Analytics, as well as to send live data to Power BI reports for real-time dashboards and reports. The in-store IoT sensors could ingest their data into IoT Hub directly, and by integrating with IoT Hub also benefit from the device management capabilities that IoT Hub enables. Ultimately this data would also be processed by another Stream Analytics job and served in the same was as the tweets.</a:t>
             </a:r>
           </a:p>
         </p:txBody>
@@ -1780,7 +1699,7 @@
               <a:rPr lang="en-US" smtClean="0"/>
               <a:t>19</a:t>
             </a:fld>
-            <a:endParaRPr lang="en-US"/>
+            <a:endParaRPr lang="en-US" dirty="0"/>
           </a:p>
         </p:txBody>
       </p:sp>
@@ -1864,7 +1783,7 @@
               <a:rPr lang="en-US" smtClean="0"/>
               <a:t>2</a:t>
             </a:fld>
-            <a:endParaRPr lang="en-US"/>
+            <a:endParaRPr lang="en-US" dirty="0"/>
           </a:p>
         </p:txBody>
       </p:sp>
@@ -1951,7 +1870,7 @@
               <a:rPr lang="en-US" smtClean="0"/>
               <a:t>20</a:t>
             </a:fld>
-            <a:endParaRPr lang="en-US"/>
+            <a:endParaRPr lang="en-US" dirty="0"/>
           </a:p>
         </p:txBody>
       </p:sp>
@@ -2237,17 +2156,6 @@
             </a:endParaRPr>
           </a:p>
           <a:p>
-            <a:endParaRPr lang="en-US" sz="1200" b="1" i="0" u="none" strike="noStrike" kern="1200" dirty="0">
-              <a:solidFill>
-                <a:schemeClr val="tx1"/>
-              </a:solidFill>
-              <a:effectLst/>
-              <a:latin typeface="+mn-lt"/>
-              <a:ea typeface="+mn-ea"/>
-              <a:cs typeface="+mn-cs"/>
-            </a:endParaRPr>
-          </a:p>
-          <a:p>
             <a:r>
               <a:rPr lang="en-US" sz="1200" b="0" i="0" u="none" strike="noStrike" kern="1200" dirty="0">
                 <a:solidFill>
@@ -2318,7 +2226,7 @@
               <a:rPr lang="en-US" smtClean="0"/>
               <a:t>21</a:t>
             </a:fld>
-            <a:endParaRPr lang="en-US"/>
+            <a:endParaRPr lang="en-US" dirty="0"/>
           </a:p>
         </p:txBody>
       </p:sp>
@@ -2414,31 +2322,7 @@
                 <a:ea typeface="+mn-ea"/>
                 <a:cs typeface="+mn-cs"/>
               </a:rPr>
-              <a:t>Using Azure Synapse Studio, for any parquet files stored in ADLS, they can right click on a parquet file to query as SQL or as </a:t>
-            </a:r>
-            <a:r>
-              <a:rPr lang="en-US" sz="1200" b="0" i="0" u="none" strike="noStrike" kern="1200" dirty="0" err="1">
-                <a:solidFill>
-                  <a:schemeClr val="tx1"/>
-                </a:solidFill>
-                <a:effectLst/>
-                <a:latin typeface="+mn-lt"/>
-                <a:ea typeface="+mn-ea"/>
-                <a:cs typeface="+mn-cs"/>
-              </a:rPr>
-              <a:t>DataFrame</a:t>
-            </a:r>
-            <a:r>
-              <a:rPr lang="en-US" sz="1200" b="0" i="0" u="none" strike="noStrike" kern="1200" dirty="0">
-                <a:solidFill>
-                  <a:schemeClr val="tx1"/>
-                </a:solidFill>
-                <a:effectLst/>
-                <a:latin typeface="+mn-lt"/>
-                <a:ea typeface="+mn-ea"/>
-                <a:cs typeface="+mn-cs"/>
-              </a:rPr>
-              <a:t> in a notebook.</a:t>
+              <a:t>Using Azure Synapse Studio, for any parquet files stored in ADLS, they can right click on a parquet file to query as SQL or as DataFrame in a notebook.</a:t>
             </a:r>
           </a:p>
           <a:p>
@@ -2563,31 +2447,7 @@
                 <a:ea typeface="+mn-ea"/>
                 <a:cs typeface="+mn-cs"/>
               </a:rPr>
-              <a:t>They can use code when their data engineers prefer to use Spark to transform the data via </a:t>
-            </a:r>
-            <a:r>
-              <a:rPr lang="en-US" sz="1200" b="0" i="0" u="none" strike="noStrike" kern="1200" dirty="0" err="1">
-                <a:solidFill>
-                  <a:schemeClr val="tx1"/>
-                </a:solidFill>
-                <a:effectLst/>
-                <a:latin typeface="+mn-lt"/>
-                <a:ea typeface="+mn-ea"/>
-                <a:cs typeface="+mn-cs"/>
-              </a:rPr>
-              <a:t>DataFrames</a:t>
-            </a:r>
-            <a:r>
-              <a:rPr lang="en-US" sz="1200" b="0" i="0" u="none" strike="noStrike" kern="1200" dirty="0">
-                <a:solidFill>
-                  <a:schemeClr val="tx1"/>
-                </a:solidFill>
-                <a:effectLst/>
-                <a:latin typeface="+mn-lt"/>
-                <a:ea typeface="+mn-ea"/>
-                <a:cs typeface="+mn-cs"/>
-              </a:rPr>
-              <a:t>.</a:t>
+              <a:t>They can use code when their data engineers prefer to use Spark to transform the data via DataFrames.</a:t>
             </a:r>
           </a:p>
           <a:p>
@@ -2637,31 +2497,7 @@
                 <a:ea typeface="+mn-ea"/>
                 <a:cs typeface="+mn-cs"/>
               </a:rPr>
-              <a:t>Azure Synapse Analytics supports open source Apache Spark and the execution of Python, Scala and (in the near future) R code. Their data team would be able to use the familiar </a:t>
-            </a:r>
-            <a:r>
-              <a:rPr lang="en-US" sz="1200" b="0" i="0" u="none" strike="noStrike" kern="1200" dirty="0" err="1">
-                <a:solidFill>
-                  <a:schemeClr val="tx1"/>
-                </a:solidFill>
-                <a:effectLst/>
-                <a:latin typeface="+mn-lt"/>
-                <a:ea typeface="+mn-ea"/>
-                <a:cs typeface="+mn-cs"/>
-              </a:rPr>
-              <a:t>Jupyter</a:t>
-            </a:r>
-            <a:r>
-              <a:rPr lang="en-US" sz="1200" b="0" i="0" u="none" strike="noStrike" kern="1200" dirty="0">
-                <a:solidFill>
-                  <a:schemeClr val="tx1"/>
-                </a:solidFill>
-                <a:effectLst/>
-                <a:latin typeface="+mn-lt"/>
-                <a:ea typeface="+mn-ea"/>
-                <a:cs typeface="+mn-cs"/>
-              </a:rPr>
-              <a:t> notebooks and leverage their favorite libraries.</a:t>
+              <a:t>Azure Synapse Analytics supports open source Apache Spark and the execution of Python, Scala and (in the near future) R code. Their data team would be able to use the familiar Jupyter notebooks and leverage their favorite libraries.</a:t>
             </a:r>
           </a:p>
           <a:p>
@@ -2687,31 +2523,7 @@
                 <a:ea typeface="+mn-ea"/>
                 <a:cs typeface="+mn-cs"/>
               </a:rPr>
-              <a:t>Does your solution allow their data engineers and data scientists to work within </a:t>
-            </a:r>
-            <a:r>
-              <a:rPr lang="en-US" sz="1200" b="1" i="0" u="none" strike="noStrike" kern="1200" dirty="0" err="1">
-                <a:solidFill>
-                  <a:schemeClr val="tx1"/>
-                </a:solidFill>
-                <a:effectLst/>
-                <a:latin typeface="+mn-lt"/>
-                <a:ea typeface="+mn-ea"/>
-                <a:cs typeface="+mn-cs"/>
-              </a:rPr>
-              <a:t>Jupyter</a:t>
-            </a:r>
-            <a:r>
-              <a:rPr lang="en-US" sz="1200" b="1" i="0" u="none" strike="noStrike" kern="1200" dirty="0">
-                <a:solidFill>
-                  <a:schemeClr val="tx1"/>
-                </a:solidFill>
-                <a:effectLst/>
-                <a:latin typeface="+mn-lt"/>
-                <a:ea typeface="+mn-ea"/>
-                <a:cs typeface="+mn-cs"/>
-              </a:rPr>
-              <a:t> notebooks? How are libraries managed?</a:t>
+              <a:t>Does your solution allow their data engineers and data scientists to work within Jupyter notebooks? How are libraries managed?</a:t>
             </a:r>
           </a:p>
           <a:p>
@@ -2791,7 +2603,7 @@
               <a:rPr lang="en-US" smtClean="0"/>
               <a:t>22</a:t>
             </a:fld>
-            <a:endParaRPr lang="en-US"/>
+            <a:endParaRPr lang="en-US" dirty="0"/>
           </a:p>
         </p:txBody>
       </p:sp>
@@ -2912,55 +2724,7 @@
                 <a:ea typeface="+mn-ea"/>
                 <a:cs typeface="+mn-cs"/>
               </a:rPr>
-              <a:t>Clustered </a:t>
-            </a:r>
-            <a:r>
-              <a:rPr lang="en-US" sz="1200" b="0" i="0" u="none" strike="noStrike" kern="1200" dirty="0" err="1">
-                <a:solidFill>
-                  <a:schemeClr val="tx1"/>
-                </a:solidFill>
-                <a:effectLst/>
-                <a:latin typeface="+mn-lt"/>
-                <a:ea typeface="+mn-ea"/>
-                <a:cs typeface="+mn-cs"/>
-              </a:rPr>
-              <a:t>Columnstore</a:t>
-            </a:r>
-            <a:r>
-              <a:rPr lang="en-US" sz="1200" b="0" i="0" u="none" strike="noStrike" kern="1200" dirty="0">
-                <a:solidFill>
-                  <a:schemeClr val="tx1"/>
-                </a:solidFill>
-                <a:effectLst/>
-                <a:latin typeface="+mn-lt"/>
-                <a:ea typeface="+mn-ea"/>
-                <a:cs typeface="+mn-cs"/>
-              </a:rPr>
-              <a:t> Indexes. As they offer the highest level of data compression and best overall query performance, </a:t>
-            </a:r>
-            <a:r>
-              <a:rPr lang="en-US" sz="1200" b="0" i="0" u="none" strike="noStrike" kern="1200" dirty="0" err="1">
-                <a:solidFill>
-                  <a:schemeClr val="tx1"/>
-                </a:solidFill>
-                <a:effectLst/>
-                <a:latin typeface="+mn-lt"/>
-                <a:ea typeface="+mn-ea"/>
-                <a:cs typeface="+mn-cs"/>
-              </a:rPr>
-              <a:t>columnstore</a:t>
-            </a:r>
-            <a:r>
-              <a:rPr lang="en-US" sz="1200" b="0" i="0" u="none" strike="noStrike" kern="1200" dirty="0">
-                <a:solidFill>
-                  <a:schemeClr val="tx1"/>
-                </a:solidFill>
-                <a:effectLst/>
-                <a:latin typeface="+mn-lt"/>
-                <a:ea typeface="+mn-ea"/>
-                <a:cs typeface="+mn-cs"/>
-              </a:rPr>
-              <a:t> indexes are usually the best choice for large tables such as fact tables.</a:t>
+              <a:t>Clustered Columnstore Indexes. As they offer the highest level of data compression and best overall query performance, columnstore indexes are usually the best choice for large tables such as fact tables.</a:t>
             </a:r>
           </a:p>
           <a:p>
@@ -3060,31 +2824,7 @@
                 <a:ea typeface="+mn-ea"/>
                 <a:cs typeface="+mn-cs"/>
               </a:rPr>
-              <a:t>They should consider using Heap tables. For small lookup tables, less than 100 million rows, often heap tables make sense. Cluster </a:t>
-            </a:r>
-            <a:r>
-              <a:rPr lang="en-US" sz="1200" b="0" i="0" u="none" strike="noStrike" kern="1200" dirty="0" err="1">
-                <a:solidFill>
-                  <a:schemeClr val="tx1"/>
-                </a:solidFill>
-                <a:effectLst/>
-                <a:latin typeface="+mn-lt"/>
-                <a:ea typeface="+mn-ea"/>
-                <a:cs typeface="+mn-cs"/>
-              </a:rPr>
-              <a:t>columnstore</a:t>
-            </a:r>
-            <a:r>
-              <a:rPr lang="en-US" sz="1200" b="0" i="0" u="none" strike="noStrike" kern="1200" dirty="0">
-                <a:solidFill>
-                  <a:schemeClr val="tx1"/>
-                </a:solidFill>
-                <a:effectLst/>
-                <a:latin typeface="+mn-lt"/>
-                <a:ea typeface="+mn-ea"/>
-                <a:cs typeface="+mn-cs"/>
-              </a:rPr>
-              <a:t> tables begin to achieve optimal compression once there is more than 100 million rows.</a:t>
+              <a:t>They should consider using Heap tables. For small lookup tables, less than 100 million rows, often heap tables make sense. Cluster columnstore tables begin to achieve optimal compression once there is more than 100 million rows.</a:t>
             </a:r>
           </a:p>
           <a:p>
@@ -3134,31 +2874,7 @@
                 <a:ea typeface="+mn-ea"/>
                 <a:cs typeface="+mn-cs"/>
               </a:rPr>
-              <a:t>Use clustered indexes. Clustered indexes may outperform clustered </a:t>
-            </a:r>
-            <a:r>
-              <a:rPr lang="en-US" sz="1200" b="0" i="0" u="none" strike="noStrike" kern="1200" dirty="0" err="1">
-                <a:solidFill>
-                  <a:schemeClr val="tx1"/>
-                </a:solidFill>
-                <a:effectLst/>
-                <a:latin typeface="+mn-lt"/>
-                <a:ea typeface="+mn-ea"/>
-                <a:cs typeface="+mn-cs"/>
-              </a:rPr>
-              <a:t>columnstore</a:t>
-            </a:r>
-            <a:r>
-              <a:rPr lang="en-US" sz="1200" b="0" i="0" u="none" strike="noStrike" kern="1200" dirty="0">
-                <a:solidFill>
-                  <a:schemeClr val="tx1"/>
-                </a:solidFill>
-                <a:effectLst/>
-                <a:latin typeface="+mn-lt"/>
-                <a:ea typeface="+mn-ea"/>
-                <a:cs typeface="+mn-cs"/>
-              </a:rPr>
-              <a:t> tables when a single row needs to be quickly retrieved. For queries where a single or a very few number of rows to lookup is required to perform with extreme speed, consider a cluster index or non-clustered secondary index.</a:t>
+              <a:t>Use clustered indexes. Clustered indexes may outperform clustered columnstore tables when a single row needs to be quickly retrieved. For queries where a single or a very few number of rows to lookup is required to perform with extreme speed, consider a clustered index or non-clustered secondary index.</a:t>
             </a:r>
           </a:p>
           <a:p>
@@ -3258,31 +2974,7 @@
                 <a:ea typeface="+mn-ea"/>
                 <a:cs typeface="+mn-cs"/>
               </a:rPr>
-              <a:t>A heap table. If you are loading data only to stage it before running more transformations, loading the table to heap table is much faster than loading the data to a clustered </a:t>
-            </a:r>
-            <a:r>
-              <a:rPr lang="en-US" sz="1200" b="0" i="0" u="none" strike="noStrike" kern="1200" dirty="0" err="1">
-                <a:solidFill>
-                  <a:schemeClr val="tx1"/>
-                </a:solidFill>
-                <a:effectLst/>
-                <a:latin typeface="+mn-lt"/>
-                <a:ea typeface="+mn-ea"/>
-                <a:cs typeface="+mn-cs"/>
-              </a:rPr>
-              <a:t>columnstore</a:t>
-            </a:r>
-            <a:r>
-              <a:rPr lang="en-US" sz="1200" b="0" i="0" u="none" strike="noStrike" kern="1200" dirty="0">
-                <a:solidFill>
-                  <a:schemeClr val="tx1"/>
-                </a:solidFill>
-                <a:effectLst/>
-                <a:latin typeface="+mn-lt"/>
-                <a:ea typeface="+mn-ea"/>
-                <a:cs typeface="+mn-cs"/>
-              </a:rPr>
-              <a:t> table.</a:t>
+              <a:t>A heap table. If you are loading data only to stage it before running more transformations, loading the table to heap table is much faster than loading the data to a clustered columnstore table.</a:t>
             </a:r>
           </a:p>
           <a:p>
@@ -3353,7 +3045,7 @@
               <a:rPr lang="en-US" smtClean="0"/>
               <a:t>23</a:t>
             </a:fld>
-            <a:endParaRPr lang="en-US"/>
+            <a:endParaRPr lang="en-US" dirty="0"/>
           </a:p>
         </p:txBody>
       </p:sp>
@@ -3969,7 +3661,7 @@
               <a:rPr lang="en-US" smtClean="0"/>
               <a:t>24</a:t>
             </a:fld>
-            <a:endParaRPr lang="en-US"/>
+            <a:endParaRPr lang="en-US" dirty="0"/>
           </a:p>
         </p:txBody>
       </p:sp>
@@ -4130,17 +3822,6 @@
             </a:endParaRPr>
           </a:p>
           <a:p>
-            <a:endParaRPr lang="en-US" sz="1200" b="0" i="0" u="none" strike="noStrike" kern="1200" dirty="0">
-              <a:solidFill>
-                <a:schemeClr val="tx1"/>
-              </a:solidFill>
-              <a:effectLst/>
-              <a:latin typeface="+mn-lt"/>
-              <a:ea typeface="+mn-ea"/>
-              <a:cs typeface="+mn-cs"/>
-            </a:endParaRPr>
-          </a:p>
-          <a:p>
             <a:r>
               <a:rPr lang="en-US" sz="1200" b="1" i="0" u="none" strike="noStrike" kern="1200" dirty="0">
                 <a:solidFill>
@@ -4176,31 +3857,7 @@
                 <a:ea typeface="+mn-ea"/>
                 <a:cs typeface="+mn-cs"/>
               </a:rPr>
-              <a:t>They should use the APPROXIMATE_COUNT_DISTINCT statement which uses the </a:t>
-            </a:r>
-            <a:r>
-              <a:rPr lang="en-US" sz="1200" b="0" i="0" u="none" strike="noStrike" kern="1200" dirty="0" err="1">
-                <a:solidFill>
-                  <a:schemeClr val="tx1"/>
-                </a:solidFill>
-                <a:effectLst/>
-                <a:latin typeface="+mn-lt"/>
-                <a:ea typeface="+mn-ea"/>
-                <a:cs typeface="+mn-cs"/>
-              </a:rPr>
-              <a:t>HyperLogLog</a:t>
-            </a:r>
-            <a:r>
-              <a:rPr lang="en-US" sz="1200" b="0" i="0" u="none" strike="noStrike" kern="1200" dirty="0">
-                <a:solidFill>
-                  <a:schemeClr val="tx1"/>
-                </a:solidFill>
-                <a:effectLst/>
-                <a:latin typeface="+mn-lt"/>
-                <a:ea typeface="+mn-ea"/>
-                <a:cs typeface="+mn-cs"/>
-              </a:rPr>
-              <a:t> to return a result with an average 2% accuracy of the true cardinality. For example, if COUNT(DISTINCT) returns 1,000,000, then with approximate execution you will get a value between 999,736 to 1,016,234.</a:t>
+              <a:t>They should use the APPROXIMATE_COUNT_DISTINCT statement which uses the HyperLogLog to return a result with an average 2% accuracy of the true cardinality. For example, if COUNT(DISTINCT) returns 1,000,000, then with approximate execution you will get a value between 999,736 to 1,016,234.</a:t>
             </a:r>
           </a:p>
           <a:p>
@@ -4374,7 +4031,7 @@
               <a:rPr lang="en-US" smtClean="0"/>
               <a:t>25</a:t>
             </a:fld>
-            <a:endParaRPr lang="en-US"/>
+            <a:endParaRPr lang="en-US" dirty="0"/>
           </a:p>
         </p:txBody>
       </p:sp>
@@ -4605,7 +4262,7 @@
               <a:rPr lang="en-US" smtClean="0"/>
               <a:t>26</a:t>
             </a:fld>
-            <a:endParaRPr lang="en-US"/>
+            <a:endParaRPr lang="en-US" dirty="0"/>
           </a:p>
         </p:txBody>
       </p:sp>
@@ -4822,31 +4479,7 @@
                 <a:ea typeface="+mn-ea"/>
                 <a:cs typeface="+mn-cs"/>
               </a:rPr>
-              <a:t>What does your solution provide to WWI to help them identify issues such as suboptimal table distribution, data skew, cache misses, </a:t>
-            </a:r>
-            <a:r>
-              <a:rPr lang="en-US" sz="1200" b="1" i="0" u="none" strike="noStrike" kern="1200" dirty="0" err="1">
-                <a:solidFill>
-                  <a:schemeClr val="tx1"/>
-                </a:solidFill>
-                <a:effectLst/>
-                <a:latin typeface="+mn-lt"/>
-                <a:ea typeface="+mn-ea"/>
-                <a:cs typeface="+mn-cs"/>
-              </a:rPr>
-              <a:t>tempdb</a:t>
-            </a:r>
-            <a:r>
-              <a:rPr lang="en-US" sz="1200" b="1" i="0" u="none" strike="noStrike" kern="1200" dirty="0">
-                <a:solidFill>
-                  <a:schemeClr val="tx1"/>
-                </a:solidFill>
-                <a:effectLst/>
-                <a:latin typeface="+mn-lt"/>
-                <a:ea typeface="+mn-ea"/>
-                <a:cs typeface="+mn-cs"/>
-              </a:rPr>
-              <a:t> contention and suboptimal plan selection?</a:t>
+              <a:t>What does your solution provide to WWI to help them identify issues such as suboptimal table distribution, data skew, cache misses, tempdb contention and suboptimal plan selection?</a:t>
             </a:r>
           </a:p>
           <a:p>
@@ -5001,7 +4634,7 @@
               <a:rPr lang="en-US" smtClean="0"/>
               <a:t>27</a:t>
             </a:fld>
-            <a:endParaRPr lang="en-US"/>
+            <a:endParaRPr lang="en-US" dirty="0"/>
           </a:p>
         </p:txBody>
       </p:sp>
@@ -5220,31 +4853,7 @@
                 <a:ea typeface="+mn-ea"/>
                 <a:cs typeface="+mn-cs"/>
               </a:rPr>
-              <a:t> Management of database permissions is performed by setting access permissions on Azure Active Directory groups and users, which are external to the database. Object level security allows you to </a:t>
-            </a:r>
-            <a:r>
-              <a:rPr lang="en-US" sz="1200" b="0" i="0" u="none" strike="noStrike" kern="1200" dirty="0" err="1">
-                <a:solidFill>
-                  <a:schemeClr val="tx1"/>
-                </a:solidFill>
-                <a:effectLst/>
-                <a:latin typeface="+mn-lt"/>
-                <a:ea typeface="+mn-ea"/>
-                <a:cs typeface="+mn-cs"/>
-              </a:rPr>
-              <a:t>contol</a:t>
-            </a:r>
-            <a:r>
-              <a:rPr lang="en-US" sz="1200" b="0" i="0" u="none" strike="noStrike" kern="1200" dirty="0">
-                <a:solidFill>
-                  <a:schemeClr val="tx1"/>
-                </a:solidFill>
-                <a:effectLst/>
-                <a:latin typeface="+mn-lt"/>
-                <a:ea typeface="+mn-ea"/>
-                <a:cs typeface="+mn-cs"/>
-              </a:rPr>
-              <a:t> permissions on tables, views, stored procedures and functions.</a:t>
+              <a:t> Management of database permissions is performed by setting access permissions on Azure Active Directory groups and users, which are external to the database. Object level security allows you to control permissions on tables, views, stored procedures and functions.</a:t>
             </a:r>
           </a:p>
           <a:p>
@@ -5290,7 +4899,7 @@
               <a:rPr lang="en-US" smtClean="0"/>
               <a:t>28</a:t>
             </a:fld>
-            <a:endParaRPr lang="en-US"/>
+            <a:endParaRPr lang="en-US" dirty="0"/>
           </a:p>
         </p:txBody>
       </p:sp>
@@ -5533,31 +5142,7 @@
                 <a:ea typeface="+mn-ea"/>
                 <a:cs typeface="+mn-cs"/>
               </a:rPr>
-              <a:t> Alternately, if parts only parts of a field need to be displayed according to the </a:t>
-            </a:r>
-            <a:r>
-              <a:rPr lang="en-US" sz="1200" b="0" i="0" u="none" strike="noStrike" kern="1200" dirty="0" err="1">
-                <a:solidFill>
-                  <a:schemeClr val="tx1"/>
-                </a:solidFill>
-                <a:effectLst/>
-                <a:latin typeface="+mn-lt"/>
-                <a:ea typeface="+mn-ea"/>
-                <a:cs typeface="+mn-cs"/>
-              </a:rPr>
-              <a:t>users's</a:t>
-            </a:r>
-            <a:r>
-              <a:rPr lang="en-US" sz="1200" b="0" i="0" u="none" strike="noStrike" kern="1200" dirty="0">
-                <a:solidFill>
-                  <a:schemeClr val="tx1"/>
-                </a:solidFill>
-                <a:effectLst/>
-                <a:latin typeface="+mn-lt"/>
-                <a:ea typeface="+mn-ea"/>
-                <a:cs typeface="+mn-cs"/>
-              </a:rPr>
-              <a:t> group membership (such as displaying only a few characters of an email address), then WWI could use Dynamic Data Masking.</a:t>
+              <a:t> Alternately, if parts only parts of a field need to be displayed according to the users' group membership (such as displaying only a few characters of an email address), then WWI could use Dynamic Data Masking.</a:t>
             </a:r>
           </a:p>
           <a:p>
@@ -6037,7 +5622,7 @@
               <a:rPr lang="en-US" smtClean="0"/>
               <a:t>29</a:t>
             </a:fld>
-            <a:endParaRPr lang="en-US"/>
+            <a:endParaRPr lang="en-US" dirty="0"/>
           </a:p>
         </p:txBody>
       </p:sp>
@@ -6121,7 +5706,7 @@
               <a:rPr lang="en-US" smtClean="0"/>
               <a:t>3</a:t>
             </a:fld>
-            <a:endParaRPr lang="en-US"/>
+            <a:endParaRPr lang="en-US" dirty="0"/>
           </a:p>
         </p:txBody>
       </p:sp>
@@ -6424,127 +6009,7 @@
                 <a:ea typeface="+mn-ea"/>
                 <a:cs typeface="+mn-cs"/>
               </a:rPr>
-              <a:t>WWI should deploy their Azure Synapse Analytics workspace within a managed workspace Virtual Network (</a:t>
-            </a:r>
-            <a:r>
-              <a:rPr lang="en-US" sz="1200" b="0" i="0" u="none" strike="noStrike" kern="1200" dirty="0" err="1">
-                <a:solidFill>
-                  <a:schemeClr val="tx1"/>
-                </a:solidFill>
-                <a:effectLst/>
-                <a:latin typeface="+mn-lt"/>
-                <a:ea typeface="+mn-ea"/>
-                <a:cs typeface="+mn-cs"/>
-              </a:rPr>
-              <a:t>VNet</a:t>
-            </a:r>
-            <a:r>
-              <a:rPr lang="en-US" sz="1200" b="0" i="0" u="none" strike="noStrike" kern="1200" dirty="0">
-                <a:solidFill>
-                  <a:schemeClr val="tx1"/>
-                </a:solidFill>
-                <a:effectLst/>
-                <a:latin typeface="+mn-lt"/>
-                <a:ea typeface="+mn-ea"/>
-                <a:cs typeface="+mn-cs"/>
-              </a:rPr>
-              <a:t>), and then use managed private endpoints to establish a private link to Azure resources. By using a private link, traffic between their </a:t>
-            </a:r>
-            <a:r>
-              <a:rPr lang="en-US" sz="1200" b="0" i="0" u="none" strike="noStrike" kern="1200" dirty="0" err="1">
-                <a:solidFill>
-                  <a:schemeClr val="tx1"/>
-                </a:solidFill>
-                <a:effectLst/>
-                <a:latin typeface="+mn-lt"/>
-                <a:ea typeface="+mn-ea"/>
-                <a:cs typeface="+mn-cs"/>
-              </a:rPr>
-              <a:t>VNet</a:t>
-            </a:r>
-            <a:r>
-              <a:rPr lang="en-US" sz="1200" b="0" i="0" u="none" strike="noStrike" kern="1200" dirty="0">
-                <a:solidFill>
-                  <a:schemeClr val="tx1"/>
-                </a:solidFill>
-                <a:effectLst/>
-                <a:latin typeface="+mn-lt"/>
-                <a:ea typeface="+mn-ea"/>
-                <a:cs typeface="+mn-cs"/>
-              </a:rPr>
-              <a:t> and Azure Synapse Analytics workspace traverses entirely over the Microsoft backbone network, which protects against data exfiltration risks. You establish a private link to a resource by creating a private endpoint. Private endpoint uses a private IP address from the </a:t>
-            </a:r>
-            <a:r>
-              <a:rPr lang="en-US" sz="1200" b="0" i="0" u="none" strike="noStrike" kern="1200" dirty="0" err="1">
-                <a:solidFill>
-                  <a:schemeClr val="tx1"/>
-                </a:solidFill>
-                <a:effectLst/>
-                <a:latin typeface="+mn-lt"/>
-                <a:ea typeface="+mn-ea"/>
-                <a:cs typeface="+mn-cs"/>
-              </a:rPr>
-              <a:t>VNet</a:t>
-            </a:r>
-            <a:r>
-              <a:rPr lang="en-US" sz="1200" b="0" i="0" u="none" strike="noStrike" kern="1200" dirty="0">
-                <a:solidFill>
-                  <a:schemeClr val="tx1"/>
-                </a:solidFill>
-                <a:effectLst/>
-                <a:latin typeface="+mn-lt"/>
-                <a:ea typeface="+mn-ea"/>
-                <a:cs typeface="+mn-cs"/>
-              </a:rPr>
-              <a:t> to effectively bring the service "into" the </a:t>
-            </a:r>
-            <a:r>
-              <a:rPr lang="en-US" sz="1200" b="0" i="0" u="none" strike="noStrike" kern="1200" dirty="0" err="1">
-                <a:solidFill>
-                  <a:schemeClr val="tx1"/>
-                </a:solidFill>
-                <a:effectLst/>
-                <a:latin typeface="+mn-lt"/>
-                <a:ea typeface="+mn-ea"/>
-                <a:cs typeface="+mn-cs"/>
-              </a:rPr>
-              <a:t>VNet</a:t>
-            </a:r>
-            <a:r>
-              <a:rPr lang="en-US" sz="1200" b="0" i="0" u="none" strike="noStrike" kern="1200" dirty="0">
-                <a:solidFill>
-                  <a:schemeClr val="tx1"/>
-                </a:solidFill>
-                <a:effectLst/>
-                <a:latin typeface="+mn-lt"/>
-                <a:ea typeface="+mn-ea"/>
-                <a:cs typeface="+mn-cs"/>
-              </a:rPr>
-              <a:t>. Azure Synapse Analytics creates two Managed private endpoints automatically when the Azure Synapse workspace is created within a managed </a:t>
-            </a:r>
-            <a:r>
-              <a:rPr lang="en-US" sz="1200" b="0" i="0" u="none" strike="noStrike" kern="1200" dirty="0" err="1">
-                <a:solidFill>
-                  <a:schemeClr val="tx1"/>
-                </a:solidFill>
-                <a:effectLst/>
-                <a:latin typeface="+mn-lt"/>
-                <a:ea typeface="+mn-ea"/>
-                <a:cs typeface="+mn-cs"/>
-              </a:rPr>
-              <a:t>VNet</a:t>
-            </a:r>
-            <a:r>
-              <a:rPr lang="en-US" sz="1200" b="0" i="0" u="none" strike="noStrike" kern="1200" dirty="0">
-                <a:solidFill>
-                  <a:schemeClr val="tx1"/>
-                </a:solidFill>
-                <a:effectLst/>
-                <a:latin typeface="+mn-lt"/>
-                <a:ea typeface="+mn-ea"/>
-                <a:cs typeface="+mn-cs"/>
-              </a:rPr>
-              <a:t>.</a:t>
+              <a:t>WWI should deploy their Azure Synapse Analytics workspace within a managed workspace Virtual Network (VNet), and then use managed private endpoints to establish a private link to Azure resources. By using a private link, traffic between their VNet and Azure Synapse Analytics workspace traverses entirely over the Microsoft backbone network, which protects against data exfiltration risks. You establish a private link to a resource by creating a private endpoint. Private endpoint uses a private IP address from the VNet to effectively bring the service "into" the VNet. Azure Synapse Analytics creates two Managed private endpoints automatically when the Azure Synapse workspace is created within a managed VNet.</a:t>
             </a:r>
           </a:p>
           <a:p>
@@ -6579,7 +6044,7 @@
               <a:rPr lang="en-US" smtClean="0"/>
               <a:t>30</a:t>
             </a:fld>
-            <a:endParaRPr lang="en-US"/>
+            <a:endParaRPr lang="en-US" dirty="0"/>
           </a:p>
         </p:txBody>
       </p:sp>
@@ -6783,7 +6248,7 @@
               <a:rPr lang="en-US" smtClean="0"/>
               <a:t>31</a:t>
             </a:fld>
-            <a:endParaRPr lang="en-US"/>
+            <a:endParaRPr lang="en-US" dirty="0"/>
           </a:p>
         </p:txBody>
       </p:sp>
@@ -6954,31 +6419,7 @@
                 <a:ea typeface="+mn-ea"/>
                 <a:cs typeface="+mn-cs"/>
               </a:rPr>
-              <a:t>Azure Synapse SQL serverless is an always available SQL endpoint that provides T-SQL querying over high scale data in Azure Storage, and is ideal for ad hoc or </a:t>
-            </a:r>
-            <a:r>
-              <a:rPr lang="en-US" sz="1200" b="0" i="0" u="none" strike="noStrike" kern="1200" dirty="0" err="1">
-                <a:solidFill>
-                  <a:schemeClr val="tx1"/>
-                </a:solidFill>
-                <a:effectLst/>
-                <a:latin typeface="+mn-lt"/>
-                <a:ea typeface="+mn-ea"/>
-                <a:cs typeface="+mn-cs"/>
-              </a:rPr>
-              <a:t>bursty</a:t>
-            </a:r>
-            <a:r>
-              <a:rPr lang="en-US" sz="1200" b="0" i="0" u="none" strike="noStrike" kern="1200" dirty="0">
-                <a:solidFill>
-                  <a:schemeClr val="tx1"/>
-                </a:solidFill>
-                <a:effectLst/>
-                <a:latin typeface="+mn-lt"/>
-                <a:ea typeface="+mn-ea"/>
-                <a:cs typeface="+mn-cs"/>
-              </a:rPr>
-              <a:t> workloads.</a:t>
+              <a:t>Azure Synapse SQL serverless is an always available SQL endpoint that provides T-SQL querying over high scale data in Azure Storage, and is ideal for ad hoc or bursty workloads.</a:t>
             </a:r>
           </a:p>
           <a:p>
@@ -7052,7 +6493,7 @@
               <a:rPr lang="en-US" smtClean="0"/>
               <a:t>32</a:t>
             </a:fld>
-            <a:endParaRPr lang="en-US"/>
+            <a:endParaRPr lang="en-US" dirty="0"/>
           </a:p>
         </p:txBody>
       </p:sp>
@@ -7233,7 +6674,7 @@
               <a:rPr lang="en-US" smtClean="0"/>
               <a:t>33</a:t>
             </a:fld>
-            <a:endParaRPr lang="en-US"/>
+            <a:endParaRPr lang="en-US" dirty="0"/>
           </a:p>
         </p:txBody>
       </p:sp>
@@ -7294,7 +6735,7 @@
           <a:bodyPr/>
           <a:lstStyle/>
           <a:p>
-            <a:endParaRPr lang="en-US"/>
+            <a:endParaRPr lang="en-US" dirty="0"/>
           </a:p>
         </p:txBody>
       </p:sp>
@@ -7317,7 +6758,7 @@
               <a:rPr lang="en-US" smtClean="0"/>
               <a:t>34</a:t>
             </a:fld>
-            <a:endParaRPr lang="en-US"/>
+            <a:endParaRPr lang="en-US" dirty="0"/>
           </a:p>
         </p:txBody>
       </p:sp>
@@ -7441,7 +6882,7 @@
                   <a:prstClr val="black"/>
                 </a:solidFill>
               </a:rPr>
-              <a:t>4/16/2020 5:32 AM</a:t>
+              <a:t>4/16/2020 11:24 AM</a:t>
             </a:fld>
             <a:endParaRPr lang="en-US" dirty="0">
               <a:solidFill>
@@ -7500,7 +6941,7 @@
           <a:p>
             <a:pPr defTabSz="914099" eaLnBrk="0" hangingPunct="0"/>
             <a:r>
-              <a:rPr lang="en-US" sz="400">
+              <a:rPr lang="en-US" sz="400" dirty="0">
                 <a:gradFill>
                   <a:gsLst>
                     <a:gs pos="0">
@@ -7518,22 +6959,6 @@
               </a:rPr>
               <a:t>© Microsoft Corporation. All rights reserved. MICROSOFT MAKES NO WARRANTIES, EXPRESS, IMPLIED OR STATUTORY, AS TO THE INFORMATION IN THIS PRESENTATION.</a:t>
             </a:r>
-            <a:endParaRPr lang="en-US" sz="400" dirty="0">
-              <a:gradFill>
-                <a:gsLst>
-                  <a:gs pos="0">
-                    <a:prstClr val="black"/>
-                  </a:gs>
-                  <a:gs pos="100000">
-                    <a:prstClr val="black"/>
-                  </a:gs>
-                </a:gsLst>
-                <a:lin ang="5400000" scaled="0"/>
-              </a:gradFill>
-              <a:latin typeface="Segoe UI" pitchFamily="34" charset="0"/>
-              <a:ea typeface="Segoe UI" pitchFamily="34" charset="0"/>
-              <a:cs typeface="Segoe UI" pitchFamily="34" charset="0"/>
-            </a:endParaRPr>
           </a:p>
         </p:txBody>
       </p:sp>
@@ -7731,7 +7156,7 @@
               <a:rPr lang="en-US" smtClean="0"/>
               <a:t>4</a:t>
             </a:fld>
-            <a:endParaRPr lang="en-US"/>
+            <a:endParaRPr lang="en-US" dirty="0"/>
           </a:p>
         </p:txBody>
       </p:sp>
@@ -7840,7 +7265,7 @@
               <a:rPr lang="en-US" smtClean="0"/>
               <a:t>5</a:t>
             </a:fld>
-            <a:endParaRPr lang="en-US"/>
+            <a:endParaRPr lang="en-US" dirty="0"/>
           </a:p>
         </p:txBody>
       </p:sp>
@@ -7955,7 +7380,7 @@
               <a:rPr lang="en-US" smtClean="0"/>
               <a:t>6</a:t>
             </a:fld>
-            <a:endParaRPr lang="en-US"/>
+            <a:endParaRPr lang="en-US" dirty="0"/>
           </a:p>
         </p:txBody>
       </p:sp>
@@ -8078,7 +7503,7 @@
               <a:rPr lang="en-US" smtClean="0"/>
               <a:t>7</a:t>
             </a:fld>
-            <a:endParaRPr lang="en-US"/>
+            <a:endParaRPr lang="en-US" dirty="0"/>
           </a:p>
         </p:txBody>
       </p:sp>
@@ -8193,7 +7618,7 @@
               <a:rPr lang="en-US" smtClean="0"/>
               <a:t>8</a:t>
             </a:fld>
-            <a:endParaRPr lang="en-US"/>
+            <a:endParaRPr lang="en-US" dirty="0"/>
           </a:p>
         </p:txBody>
       </p:sp>
@@ -8388,7 +7813,7 @@
               <a:rPr lang="en-US" smtClean="0"/>
               <a:t>9</a:t>
             </a:fld>
-            <a:endParaRPr lang="en-US"/>
+            <a:endParaRPr lang="en-US" dirty="0"/>
           </a:p>
         </p:txBody>
       </p:sp>
@@ -8542,7 +7967,7 @@
           <a:lstStyle/>
           <a:p>
             <a:r>
-              <a:rPr>
+              <a:rPr dirty="0">
                 <a:gradFill>
                   <a:gsLst>
                     <a:gs pos="2239">
@@ -8592,7 +8017,7 @@
               <a:pPr/>
               <a:t>‹#›</a:t>
             </a:fld>
-            <a:endParaRPr>
+            <a:endParaRPr dirty="0">
               <a:gradFill>
                 <a:gsLst>
                   <a:gs pos="2239">
@@ -10302,7 +9727,7 @@
             </a:bodyPr>
             <a:lstStyle/>
             <a:p>
-              <a:endParaRPr lang="en-US" sz="1765"/>
+              <a:endParaRPr lang="en-US" sz="1765" dirty="0"/>
             </a:p>
           </p:txBody>
         </p:sp>
@@ -11515,7 +10940,7 @@
           </a:bodyPr>
           <a:lstStyle/>
           <a:p>
-            <a:endParaRPr lang="en-US"/>
+            <a:endParaRPr lang="en-US" dirty="0"/>
           </a:p>
         </p:txBody>
       </p:sp>
@@ -12924,7 +12349,7 @@
             </a:bodyPr>
             <a:lstStyle/>
             <a:p>
-              <a:endParaRPr lang="en-US" sz="1765"/>
+              <a:endParaRPr lang="en-US" sz="1765" dirty="0"/>
             </a:p>
           </p:txBody>
         </p:sp>
@@ -14420,7 +13845,7 @@
             </a:bodyPr>
             <a:lstStyle/>
             <a:p>
-              <a:endParaRPr lang="en-US" sz="1765"/>
+              <a:endParaRPr lang="en-US" sz="1765" dirty="0"/>
             </a:p>
           </p:txBody>
         </p:sp>
@@ -15799,10 +15224,9 @@
           </a:lstStyle>
           <a:p>
             <a:r>
-              <a:rPr lang="en-US"/>
+              <a:rPr lang="en-US" dirty="0"/>
               <a:t>Click icon to add picture</a:t>
             </a:r>
-            <a:endParaRPr lang="en-US" dirty="0"/>
           </a:p>
         </p:txBody>
       </p:sp>
@@ -17694,7 +17118,7 @@
             </a:bodyPr>
             <a:lstStyle/>
             <a:p>
-              <a:endParaRPr lang="en-US" sz="1765"/>
+              <a:endParaRPr lang="en-US" sz="1765" dirty="0"/>
             </a:p>
           </p:txBody>
         </p:sp>
@@ -19197,7 +18621,7 @@
           </a:lstStyle>
           <a:p>
             <a:r>
-              <a:rPr>
+              <a:rPr dirty="0">
                 <a:gradFill>
                   <a:gsLst>
                     <a:gs pos="2239">
@@ -19275,7 +18699,7 @@
               <a:pPr defTabSz="914554"/>
               <a:t>‹#›</a:t>
             </a:fld>
-            <a:endParaRPr lang="en-US">
+            <a:endParaRPr lang="en-US" dirty="0">
               <a:gradFill>
                 <a:gsLst>
                   <a:gs pos="2239">
@@ -20615,6 +20039,11 @@
           </a:bodyPr>
           <a:lstStyle/>
           <a:p>
+            <a:pPr>
+              <a:lnSpc>
+                <a:spcPct val="100000"/>
+              </a:lnSpc>
+            </a:pPr>
             <a:r>
               <a:rPr lang="en-US" sz="2800" dirty="0">
                 <a:solidFill>
@@ -20626,6 +20055,11 @@
             </a:r>
           </a:p>
           <a:p>
+            <a:pPr>
+              <a:lnSpc>
+                <a:spcPct val="100000"/>
+              </a:lnSpc>
+            </a:pPr>
             <a:r>
               <a:rPr lang="en-US" sz="2800" dirty="0">
                 <a:solidFill>
@@ -20636,6 +20070,11 @@
             </a:r>
           </a:p>
           <a:p>
+            <a:pPr>
+              <a:lnSpc>
+                <a:spcPct val="100000"/>
+              </a:lnSpc>
+            </a:pPr>
             <a:r>
               <a:rPr lang="en-US" sz="2800" dirty="0">
                 <a:solidFill>
@@ -20646,13 +20085,18 @@
             </a:r>
           </a:p>
           <a:p>
+            <a:pPr>
+              <a:lnSpc>
+                <a:spcPct val="100000"/>
+              </a:lnSpc>
+            </a:pPr>
             <a:r>
               <a:rPr lang="en-US" sz="2800" dirty="0">
                 <a:solidFill>
                   <a:schemeClr val="tx1"/>
                 </a:solidFill>
               </a:rPr>
-              <a:t>Need a solution that provides a consistent security model across all components.</a:t>
+              <a:t>Create a solution that provides a consistent security model across all components.</a:t>
             </a:r>
           </a:p>
         </p:txBody>
@@ -20757,25 +20201,40 @@
         <p:spPr>
           <a:xfrm>
             <a:off x="269239" y="1189177"/>
-            <a:ext cx="10134943" cy="4622804"/>
+            <a:ext cx="10134943" cy="5096780"/>
           </a:xfrm>
         </p:spPr>
         <p:txBody>
           <a:bodyPr/>
           <a:lstStyle/>
           <a:p>
+            <a:pPr>
+              <a:lnSpc>
+                <a:spcPct val="100000"/>
+              </a:lnSpc>
+            </a:pPr>
             <a:r>
               <a:rPr lang="en-US" sz="2800" dirty="0"/>
               <a:t>WWI understands that Azure offers several services with overlapping capabilities.  They do not want to spend the time stitching them together to get to the desired analytics solution.</a:t>
             </a:r>
           </a:p>
           <a:p>
+            <a:pPr>
+              <a:lnSpc>
+                <a:spcPct val="100000"/>
+              </a:lnSpc>
+            </a:pPr>
             <a:r>
               <a:rPr lang="en-US" sz="2800" dirty="0"/>
               <a:t>WWI have seen demos from competing systems that claim to load massive datasets in seconds. Does Azure offer such a solution?</a:t>
             </a:r>
           </a:p>
           <a:p>
+            <a:pPr>
+              <a:lnSpc>
+                <a:spcPct val="100000"/>
+              </a:lnSpc>
+            </a:pPr>
             <a:r>
               <a:rPr lang="en-US" sz="2800" dirty="0"/>
               <a:t>Is it really possible to minimize the number of disparate services they use across ingest, transformation, querying and storage, so that WWI team of data engineers, data scientists and database administrators can master one tool, and can build shared best practices for development, management and monitoring?</a:t>
@@ -20785,7 +20244,7 @@
       </p:sp>
       <p:pic>
         <p:nvPicPr>
-          <p:cNvPr id="4" name="Graphic 3" descr="Questions">
+          <p:cNvPr id="4" name="Graphic 3" descr="Questions ">
             <a:extLst>
               <a:ext uri="{FF2B5EF4-FFF2-40B4-BE49-F238E27FC236}">
                 <a16:creationId xmlns:a16="http://schemas.microsoft.com/office/drawing/2014/main" id="{9036810E-39F2-4230-809A-EABA88D8ACD4}"/>
@@ -20922,25 +20381,40 @@
         <p:spPr>
           <a:xfrm>
             <a:off x="269239" y="1189177"/>
-            <a:ext cx="11653523" cy="3459409"/>
+            <a:ext cx="11653523" cy="3804118"/>
           </a:xfrm>
         </p:spPr>
         <p:txBody>
           <a:bodyPr/>
           <a:lstStyle/>
           <a:p>
+            <a:pPr>
+              <a:lnSpc>
+                <a:spcPct val="100000"/>
+              </a:lnSpc>
+            </a:pPr>
             <a:r>
               <a:rPr lang="en-US" sz="2800" dirty="0"/>
               <a:t>WWI have heard of serverless querying, does Azure offer this? Does it support querying the data at the scale of WWI and what formats does it support? Would this be appropriate for supporting WWI dashboards or reports?</a:t>
             </a:r>
           </a:p>
           <a:p>
+            <a:pPr>
+              <a:lnSpc>
+                <a:spcPct val="100000"/>
+              </a:lnSpc>
+            </a:pPr>
             <a:r>
               <a:rPr lang="en-US" sz="2800" dirty="0"/>
               <a:t>If Azure provides serverless querying, does selecting serverless remove the option of using pre-allocated query resources?</a:t>
             </a:r>
           </a:p>
           <a:p>
+            <a:pPr>
+              <a:lnSpc>
+                <a:spcPct val="100000"/>
+              </a:lnSpc>
+            </a:pPr>
             <a:r>
               <a:rPr lang="en-US" sz="2800" dirty="0"/>
               <a:t>Would data be protected at rest and are there controls over the keys used to encrypt it?</a:t>
@@ -21739,7 +21213,7 @@
                 <a:latin typeface="Segoe UI Semilight" panose="020B0402040204020203" pitchFamily="34" charset="0"/>
                 <a:cs typeface="Segoe UI Semilight" panose="020B0402040204020203" pitchFamily="34" charset="0"/>
               </a:rPr>
-              <a:t>Present a solution to the target customer in a 15-minute chalk-talk format </a:t>
+              <a:t>Present a solution to the target customer in a 15-minute chalk-talk format. </a:t>
             </a:r>
             <a:endParaRPr lang="en-US" sz="3600" dirty="0">
               <a:latin typeface="+mj-lt"/>
@@ -21830,7 +21304,7 @@
                 <a:latin typeface="Segoe UI Semilight" panose="020B0402040204020203" pitchFamily="34" charset="0"/>
                 <a:cs typeface="Segoe UI Semilight" panose="020B0402040204020203" pitchFamily="34" charset="0"/>
               </a:rPr>
-              <a:t>Pair with another table</a:t>
+              <a:t>Pair with another table.</a:t>
             </a:r>
           </a:p>
           <a:p>
@@ -21843,7 +21317,7 @@
                 <a:latin typeface="Segoe UI Semilight" panose="020B0402040204020203" pitchFamily="34" charset="0"/>
                 <a:cs typeface="Segoe UI Semilight" panose="020B0402040204020203" pitchFamily="34" charset="0"/>
               </a:rPr>
-              <a:t>One table is the Microsoft team and the other table is the customer</a:t>
+              <a:t>One table is the Microsoft team and the other table is the customer.</a:t>
             </a:r>
           </a:p>
           <a:p>
@@ -21856,7 +21330,7 @@
                 <a:latin typeface="Segoe UI Semilight" panose="020B0402040204020203" pitchFamily="34" charset="0"/>
                 <a:cs typeface="Segoe UI Semilight" panose="020B0402040204020203" pitchFamily="34" charset="0"/>
               </a:rPr>
-              <a:t>The Microsoft team presents their proposed solution to the customer</a:t>
+              <a:t>The Microsoft team presents their proposed solution to the customer.</a:t>
             </a:r>
           </a:p>
           <a:p>
@@ -21869,7 +21343,7 @@
                 <a:latin typeface="Segoe UI Semilight" panose="020B0402040204020203" pitchFamily="34" charset="0"/>
                 <a:cs typeface="Segoe UI Semilight" panose="020B0402040204020203" pitchFamily="34" charset="0"/>
               </a:rPr>
-              <a:t>The customer asks one of the objections from the list of objections in the case study</a:t>
+              <a:t>The customer asks one of the objections from the list of objections in the case study.</a:t>
             </a:r>
           </a:p>
           <a:p>
@@ -21882,7 +21356,7 @@
                 <a:latin typeface="Segoe UI Semilight" panose="020B0402040204020203" pitchFamily="34" charset="0"/>
                 <a:cs typeface="Segoe UI Semilight" panose="020B0402040204020203" pitchFamily="34" charset="0"/>
               </a:rPr>
-              <a:t>The Microsoft team responds to the objection</a:t>
+              <a:t>The Microsoft team responds to the objection.</a:t>
             </a:r>
           </a:p>
           <a:p>
@@ -21895,7 +21369,7 @@
                 <a:latin typeface="Segoe UI Semilight" panose="020B0402040204020203" pitchFamily="34" charset="0"/>
                 <a:cs typeface="Segoe UI Semilight" panose="020B0402040204020203" pitchFamily="34" charset="0"/>
               </a:rPr>
-              <a:t>The customer team gives feedback to the Microsoft team</a:t>
+              <a:t>The customer team gives feedback to the Microsoft team.</a:t>
             </a:r>
             <a:endParaRPr lang="en-US" sz="2000" strike="sngStrike" dirty="0">
               <a:latin typeface="Segoe UI Semilight" panose="020B0402040204020203" pitchFamily="34" charset="0"/>
@@ -22043,7 +21517,7 @@
                 <a:latin typeface="Segoe UI Semilight" panose="020B0402040204020203" pitchFamily="34" charset="0"/>
                 <a:cs typeface="Segoe UI Semilight" panose="020B0402040204020203" pitchFamily="34" charset="0"/>
               </a:rPr>
-              <a:t>Identify the preferred solution for the case study</a:t>
+              <a:t>Identify the preferred solution for the case study.</a:t>
             </a:r>
           </a:p>
           <a:p>
@@ -22060,7 +21534,7 @@
                 <a:latin typeface="Segoe UI Semilight" panose="020B0402040204020203" pitchFamily="34" charset="0"/>
                 <a:cs typeface="Segoe UI Semilight" panose="020B0402040204020203" pitchFamily="34" charset="0"/>
               </a:rPr>
-              <a:t>Identify solutions designed by other teams</a:t>
+              <a:t>Identify solutions designed by other teams.</a:t>
             </a:r>
           </a:p>
           <a:p>
@@ -22222,11 +21696,15 @@
         </p:spPr>
         <p:txBody>
           <a:bodyPr>
-            <a:normAutofit lnSpcReduction="10000"/>
+            <a:normAutofit fontScale="92500" lnSpcReduction="20000"/>
           </a:bodyPr>
           <a:lstStyle/>
           <a:p>
-            <a:pPr lvl="1"/>
+            <a:pPr lvl="1">
+              <a:lnSpc>
+                <a:spcPct val="110000"/>
+              </a:lnSpc>
+            </a:pPr>
             <a:r>
               <a:rPr lang="en-US" sz="2800" dirty="0">
                 <a:solidFill>
@@ -22239,7 +21717,11 @@
             </a:r>
           </a:p>
           <a:p>
-            <a:pPr lvl="1"/>
+            <a:pPr lvl="1">
+              <a:lnSpc>
+                <a:spcPct val="110000"/>
+              </a:lnSpc>
+            </a:pPr>
             <a:endParaRPr lang="en-US" sz="2800" dirty="0">
               <a:solidFill>
                 <a:schemeClr val="tx1"/>
@@ -22249,7 +21731,11 @@
             </a:endParaRPr>
           </a:p>
           <a:p>
-            <a:pPr lvl="1"/>
+            <a:pPr lvl="1">
+              <a:lnSpc>
+                <a:spcPct val="110000"/>
+              </a:lnSpc>
+            </a:pPr>
             <a:r>
               <a:rPr lang="en-US" sz="2800" dirty="0">
                 <a:solidFill>
@@ -22262,7 +21748,11 @@
             </a:r>
           </a:p>
           <a:p>
-            <a:pPr lvl="1"/>
+            <a:pPr lvl="1">
+              <a:lnSpc>
+                <a:spcPct val="110000"/>
+              </a:lnSpc>
+            </a:pPr>
             <a:endParaRPr lang="en-US" sz="2800" dirty="0">
               <a:solidFill>
                 <a:schemeClr val="tx1"/>
@@ -22272,7 +21762,11 @@
             </a:endParaRPr>
           </a:p>
           <a:p>
-            <a:pPr lvl="1"/>
+            <a:pPr lvl="1">
+              <a:lnSpc>
+                <a:spcPct val="110000"/>
+              </a:lnSpc>
+            </a:pPr>
             <a:r>
               <a:rPr lang="en-US" sz="2800" dirty="0">
                 <a:solidFill>
@@ -22634,6 +22128,101 @@
           </a:p>
         </p:txBody>
       </p:sp>
+      <p:sp>
+        <p:nvSpPr>
+          <p:cNvPr id="5" name="TextBox 4">
+            <a:extLst>
+              <a:ext uri="{FF2B5EF4-FFF2-40B4-BE49-F238E27FC236}">
+                <a16:creationId xmlns:a16="http://schemas.microsoft.com/office/drawing/2014/main" id="{14863F9F-12C3-4104-AF05-EE6350D14EEC}"/>
+              </a:ext>
+            </a:extLst>
+          </p:cNvPr>
+          <p:cNvSpPr txBox="1"/>
+          <p:nvPr/>
+        </p:nvSpPr>
+        <p:spPr>
+          <a:xfrm>
+            <a:off x="568586" y="1094646"/>
+            <a:ext cx="7355243" cy="4881336"/>
+          </a:xfrm>
+          <a:prstGeom prst="rect">
+            <a:avLst/>
+          </a:prstGeom>
+          <a:noFill/>
+        </p:spPr>
+        <p:txBody>
+          <a:bodyPr wrap="square" lIns="182880" tIns="146304" rIns="182880" bIns="146304" rtlCol="0">
+            <a:spAutoFit/>
+          </a:bodyPr>
+          <a:lstStyle/>
+          <a:p>
+            <a:pPr>
+              <a:spcAft>
+                <a:spcPts val="600"/>
+              </a:spcAft>
+            </a:pPr>
+            <a:r>
+              <a:rPr lang="en-US" sz="2400" dirty="0">
+                <a:gradFill>
+                  <a:gsLst>
+                    <a:gs pos="2917">
+                      <a:schemeClr val="tx1"/>
+                    </a:gs>
+                    <a:gs pos="30000">
+                      <a:schemeClr val="tx1"/>
+                    </a:gs>
+                  </a:gsLst>
+                  <a:lin ang="5400000" scaled="0"/>
+                </a:gradFill>
+              </a:rPr>
+              <a:t>In this whiteboard design session, you will work in a group to look at the process of designing an end-to-end solution using Azure Synapse Analytics. The design session will cover data loading, data preparation, data transformation and data serving, along with performing machine learning and handling of both batch and real-time data.</a:t>
+            </a:r>
+          </a:p>
+          <a:p>
+            <a:pPr>
+              <a:spcAft>
+                <a:spcPts val="600"/>
+              </a:spcAft>
+            </a:pPr>
+            <a:endParaRPr lang="en-US" sz="2400" dirty="0">
+              <a:gradFill>
+                <a:gsLst>
+                  <a:gs pos="2917">
+                    <a:schemeClr val="tx1"/>
+                  </a:gs>
+                  <a:gs pos="30000">
+                    <a:schemeClr val="tx1"/>
+                  </a:gs>
+                </a:gsLst>
+                <a:lin ang="5400000" scaled="0"/>
+              </a:gradFill>
+            </a:endParaRPr>
+          </a:p>
+          <a:p>
+            <a:pPr>
+              <a:spcAft>
+                <a:spcPts val="600"/>
+              </a:spcAft>
+            </a:pPr>
+            <a:r>
+              <a:rPr lang="en-US" sz="2400" dirty="0">
+                <a:gradFill>
+                  <a:gsLst>
+                    <a:gs pos="2917">
+                      <a:schemeClr val="tx1"/>
+                    </a:gs>
+                    <a:gs pos="30000">
+                      <a:schemeClr val="tx1"/>
+                    </a:gs>
+                  </a:gsLst>
+                  <a:lin ang="5400000" scaled="0"/>
+                </a:gradFill>
+              </a:rPr>
+              <a:t>At the end of this whiteboard design session, you will be better able to design and build a complete end-to-end advanced analytics solution using Azure Synapse Analytics.</a:t>
+            </a:r>
+          </a:p>
+        </p:txBody>
+      </p:sp>
       <p:pic>
         <p:nvPicPr>
           <p:cNvPr id="3" name="Picture 2" descr="Icon representation of a presenter waving at a whiteboard.">
@@ -22664,123 +22253,6 @@
           </a:prstGeom>
         </p:spPr>
       </p:pic>
-      <p:sp>
-        <p:nvSpPr>
-          <p:cNvPr id="5" name="TextBox 4">
-            <a:extLst>
-              <a:ext uri="{FF2B5EF4-FFF2-40B4-BE49-F238E27FC236}">
-                <a16:creationId xmlns:a16="http://schemas.microsoft.com/office/drawing/2014/main" id="{14863F9F-12C3-4104-AF05-EE6350D14EEC}"/>
-              </a:ext>
-            </a:extLst>
-          </p:cNvPr>
-          <p:cNvSpPr txBox="1"/>
-          <p:nvPr/>
-        </p:nvSpPr>
-        <p:spPr>
-          <a:xfrm>
-            <a:off x="568586" y="1657350"/>
-            <a:ext cx="7355243" cy="4438138"/>
-          </a:xfrm>
-          <a:prstGeom prst="rect">
-            <a:avLst/>
-          </a:prstGeom>
-          <a:noFill/>
-        </p:spPr>
-        <p:txBody>
-          <a:bodyPr wrap="square" lIns="182880" tIns="146304" rIns="182880" bIns="146304" rtlCol="0">
-            <a:spAutoFit/>
-          </a:bodyPr>
-          <a:lstStyle/>
-          <a:p>
-            <a:pPr>
-              <a:lnSpc>
-                <a:spcPct val="90000"/>
-              </a:lnSpc>
-              <a:spcAft>
-                <a:spcPts val="600"/>
-              </a:spcAft>
-            </a:pPr>
-            <a:r>
-              <a:rPr lang="en-US" sz="2400">
-                <a:gradFill>
-                  <a:gsLst>
-                    <a:gs pos="2917">
-                      <a:schemeClr val="tx1"/>
-                    </a:gs>
-                    <a:gs pos="30000">
-                      <a:schemeClr val="tx1"/>
-                    </a:gs>
-                  </a:gsLst>
-                  <a:lin ang="5400000" scaled="0"/>
-                </a:gradFill>
-              </a:rPr>
-              <a:t>In this whiteboard design session, you will work in a group to look at the process of designing an end-to-end solution using Azure Synapse Analytics. The design session will cover data loading, data preparation, data transformation and data serving, along with performing machine learning and handling of both batch and real-time data.</a:t>
-            </a:r>
-          </a:p>
-          <a:p>
-            <a:pPr>
-              <a:lnSpc>
-                <a:spcPct val="90000"/>
-              </a:lnSpc>
-              <a:spcAft>
-                <a:spcPts val="600"/>
-              </a:spcAft>
-            </a:pPr>
-            <a:endParaRPr lang="en-US" sz="2400">
-              <a:gradFill>
-                <a:gsLst>
-                  <a:gs pos="2917">
-                    <a:schemeClr val="tx1"/>
-                  </a:gs>
-                  <a:gs pos="30000">
-                    <a:schemeClr val="tx1"/>
-                  </a:gs>
-                </a:gsLst>
-                <a:lin ang="5400000" scaled="0"/>
-              </a:gradFill>
-            </a:endParaRPr>
-          </a:p>
-          <a:p>
-            <a:pPr>
-              <a:lnSpc>
-                <a:spcPct val="90000"/>
-              </a:lnSpc>
-              <a:spcAft>
-                <a:spcPts val="600"/>
-              </a:spcAft>
-            </a:pPr>
-            <a:r>
-              <a:rPr lang="en-US" sz="2400">
-                <a:gradFill>
-                  <a:gsLst>
-                    <a:gs pos="2917">
-                      <a:schemeClr val="tx1"/>
-                    </a:gs>
-                    <a:gs pos="30000">
-                      <a:schemeClr val="tx1"/>
-                    </a:gs>
-                  </a:gsLst>
-                  <a:lin ang="5400000" scaled="0"/>
-                </a:gradFill>
-              </a:rPr>
-              <a:t>At the end of this whiteboard design session, you will be better able to design and build a complete end-to-end advanced analytics solution using Azure Synapse Analytics.</a:t>
-            </a:r>
-            <a:endParaRPr lang="en-US" sz="2400" dirty="0" err="1">
-              <a:gradFill>
-                <a:gsLst>
-                  <a:gs pos="2917">
-                    <a:schemeClr val="tx1"/>
-                  </a:gs>
-                  <a:gs pos="30000">
-                    <a:schemeClr val="tx1"/>
-                  </a:gs>
-                </a:gsLst>
-                <a:lin ang="5400000" scaled="0"/>
-              </a:gradFill>
-            </a:endParaRPr>
-          </a:p>
-        </p:txBody>
-      </p:sp>
     </p:spTree>
     <p:extLst>
       <p:ext uri="{BB962C8B-B14F-4D97-AF65-F5344CB8AC3E}">
@@ -22982,40 +22454,76 @@
         <p:spPr>
           <a:xfrm>
             <a:off x="269239" y="1189177"/>
-            <a:ext cx="11653523" cy="4019562"/>
+            <a:ext cx="11653523" cy="3200876"/>
           </a:xfrm>
         </p:spPr>
         <p:txBody>
           <a:bodyPr/>
           <a:lstStyle/>
           <a:p>
+            <a:pPr>
+              <a:lnSpc>
+                <a:spcPct val="100000"/>
+              </a:lnSpc>
+            </a:pPr>
             <a:r>
               <a:rPr lang="en-US" sz="2800" dirty="0"/>
-              <a:t>Flat file data will land in Azure Data Lake Storage and be translated into relational tables within the data warehouse.</a:t>
-            </a:r>
-          </a:p>
-          <a:p>
+              <a:t>Ingest flat file data into Azure Storage (Azure Data Lake Store Gen2) </a:t>
+            </a:r>
+          </a:p>
+          <a:p>
+            <a:pPr>
+              <a:lnSpc>
+                <a:spcPct val="100000"/>
+              </a:lnSpc>
+            </a:pPr>
             <a:r>
               <a:rPr lang="en-US" sz="2800" dirty="0"/>
-              <a:t>Provide a separate storage account for each environment: dev, test, and production.</a:t>
-            </a:r>
-          </a:p>
-          <a:p>
+              <a:t>Load from flat file as relational tables within the data warehouse</a:t>
+            </a:r>
+          </a:p>
+          <a:p>
+            <a:pPr>
+              <a:lnSpc>
+                <a:spcPct val="100000"/>
+              </a:lnSpc>
+            </a:pPr>
             <a:r>
               <a:rPr lang="en-US" sz="2800" dirty="0"/>
-              <a:t>Establish a common folder structure to organize data by degree of refinement. </a:t>
-            </a:r>
-          </a:p>
-          <a:p>
+              <a:t>Separate storage accounts for each environment: dev, test, &amp; production.</a:t>
+            </a:r>
+          </a:p>
+          <a:p>
+            <a:pPr>
+              <a:lnSpc>
+                <a:spcPct val="100000"/>
+              </a:lnSpc>
+            </a:pPr>
             <a:r>
               <a:rPr lang="en-US" sz="2800" dirty="0"/>
-              <a:t>Batch raw data ingestion supported data formats are CSV, Parquet, ORC, and JSON.</a:t>
-            </a:r>
-          </a:p>
-          <a:p>
+              <a:t>Use a common folder structure to organize data by degree of refinement. </a:t>
+            </a:r>
+          </a:p>
+          <a:p>
+            <a:pPr>
+              <a:lnSpc>
+                <a:spcPct val="100000"/>
+              </a:lnSpc>
+            </a:pPr>
             <a:r>
               <a:rPr lang="en-US" sz="2800" dirty="0"/>
-              <a:t>Streaming data ingested via Event Hub or IoT Hub.</a:t>
+              <a:t>Azure Synapse Analytics supports CSV, Parquet, ORC, and JSON formats.</a:t>
+            </a:r>
+          </a:p>
+          <a:p>
+            <a:pPr>
+              <a:lnSpc>
+                <a:spcPct val="100000"/>
+              </a:lnSpc>
+            </a:pPr>
+            <a:r>
+              <a:rPr lang="en-US" sz="2800" dirty="0"/>
+              <a:t>Ingest streaming data via Event Hub or IoT Hub.</a:t>
             </a:r>
           </a:p>
         </p:txBody>
@@ -23072,41 +22580,69 @@
         <p:spPr>
           <a:xfrm>
             <a:off x="266920" y="1150756"/>
-            <a:ext cx="11653523" cy="5355312"/>
+            <a:ext cx="11653523" cy="5829288"/>
           </a:xfrm>
         </p:spPr>
         <p:txBody>
           <a:bodyPr/>
           <a:lstStyle/>
           <a:p>
+            <a:pPr>
+              <a:lnSpc>
+                <a:spcPct val="100000"/>
+              </a:lnSpc>
+            </a:pPr>
             <a:r>
               <a:rPr lang="en-US" sz="2800" dirty="0"/>
-              <a:t>Raw data is easily explored using Azure Synapse Studio.</a:t>
-            </a:r>
-          </a:p>
-          <a:p>
+              <a:t>Explore raw flat file data easily using Azure Synapse Studio.</a:t>
+            </a:r>
+          </a:p>
+          <a:p>
+            <a:pPr>
+              <a:lnSpc>
+                <a:spcPct val="100000"/>
+              </a:lnSpc>
+            </a:pPr>
             <a:r>
               <a:rPr lang="en-US" sz="2800" dirty="0"/>
-              <a:t>The Parquet data format is recommended for storing refined versions of data to benefit from interoperability and high performance.</a:t>
-            </a:r>
-          </a:p>
-          <a:p>
+              <a:t>Azure Synapse Studio provides a code-free graphical design surface to create Mapping Data Flows that run at scale on Spark. Engineers can also use code in notebooks if they prefer.</a:t>
+            </a:r>
+          </a:p>
+          <a:p>
+            <a:pPr>
+              <a:lnSpc>
+                <a:spcPct val="100000"/>
+              </a:lnSpc>
+            </a:pPr>
             <a:r>
               <a:rPr lang="en-US" sz="2800" dirty="0"/>
-              <a:t>Azure Synapse Studio provides a code-free graphical design surface to create Data Flows that run at scale on Spark. Engineers can also use code if they prefer.</a:t>
-            </a:r>
-          </a:p>
-          <a:p>
+              <a:t>Notebook support open source Apache Spark and the execution of Python, Scala, (and soon) R code.</a:t>
+            </a:r>
+          </a:p>
+          <a:p>
+            <a:pPr>
+              <a:lnSpc>
+                <a:spcPct val="100000"/>
+              </a:lnSpc>
+            </a:pPr>
             <a:r>
               <a:rPr lang="en-US" sz="2800" dirty="0"/>
-              <a:t>Azure Synapse Analytics supports open source Apache Spark and the execution of Python, Scala, (and soon) R code.</a:t>
-            </a:r>
-          </a:p>
-          <a:p>
+              <a:t>Libraries need by notebook are imported to Azure Synapse Spark pools and used within attached notebooks.</a:t>
+            </a:r>
+          </a:p>
+          <a:p>
+            <a:pPr>
+              <a:lnSpc>
+                <a:spcPct val="100000"/>
+              </a:lnSpc>
+            </a:pPr>
             <a:r>
               <a:rPr lang="en-US" sz="2800" dirty="0"/>
-              <a:t>Azure Synapse Spark pools allow for the importing of libraries to leverage within attached Jupyter notebooks.</a:t>
-            </a:r>
+              <a:t>Parquet format recommended for storing transformed data.</a:t>
+            </a:r>
+          </a:p>
+          <a:p>
+            <a:endParaRPr lang="en-US" sz="2800" dirty="0"/>
           </a:p>
           <a:p>
             <a:endParaRPr lang="en-US" sz="2800" dirty="0"/>
@@ -23201,64 +22737,87 @@
         <p:spPr>
           <a:xfrm>
             <a:off x="266920" y="1150756"/>
-            <a:ext cx="11653523" cy="7463262"/>
+            <a:ext cx="11653523" cy="7709483"/>
           </a:xfrm>
         </p:spPr>
         <p:txBody>
           <a:bodyPr/>
           <a:lstStyle/>
           <a:p>
+            <a:pPr>
+              <a:lnSpc>
+                <a:spcPct val="100000"/>
+              </a:lnSpc>
+            </a:pPr>
             <a:r>
               <a:rPr lang="en-US" sz="2800" dirty="0"/>
-              <a:t>Clustered </a:t>
-            </a:r>
-            <a:r>
-              <a:rPr lang="en-US" sz="2800" dirty="0" err="1"/>
-              <a:t>Columnstore</a:t>
-            </a:r>
+              <a:t>Clustered Columnstore indexes (CCI) are best for fact tables. </a:t>
+            </a:r>
+          </a:p>
+          <a:p>
+            <a:pPr>
+              <a:lnSpc>
+                <a:spcPct val="100000"/>
+              </a:lnSpc>
+            </a:pPr>
             <a:r>
               <a:rPr lang="en-US" sz="2800" dirty="0"/>
-              <a:t> indexes offer the highest level of data compression with the best overall query performance for tables with over 100 million rows.</a:t>
-            </a:r>
-          </a:p>
-          <a:p>
+              <a:t>CCI offer the highest level of data compression and best query performance for tables with over 100 million rows. </a:t>
+            </a:r>
+          </a:p>
+          <a:p>
+            <a:pPr>
+              <a:lnSpc>
+                <a:spcPct val="100000"/>
+              </a:lnSpc>
+            </a:pPr>
             <a:r>
               <a:rPr lang="en-US" sz="2800" dirty="0"/>
-              <a:t>Heap tables are recommended for tables with less than 100 million rows.</a:t>
-            </a:r>
-          </a:p>
-          <a:p>
+              <a:t>Heap tables are best for small lookup tables and recommended for tables with less than 100 million rows.</a:t>
+            </a:r>
+          </a:p>
+          <a:p>
+            <a:pPr>
+              <a:lnSpc>
+                <a:spcPct val="100000"/>
+              </a:lnSpc>
+            </a:pPr>
             <a:r>
               <a:rPr lang="en-US" sz="2800" dirty="0"/>
-              <a:t>Clustered Indexes may outperform clustered </a:t>
-            </a:r>
-            <a:r>
-              <a:rPr lang="en-US" sz="2800" dirty="0" err="1"/>
-              <a:t>columnstore</a:t>
-            </a:r>
+              <a:t>Clustered Indexes may outperform CCI when very few rows need to be retrieved quickly.</a:t>
+            </a:r>
+          </a:p>
+          <a:p>
+            <a:pPr lvl="1">
+              <a:lnSpc>
+                <a:spcPct val="100000"/>
+              </a:lnSpc>
+            </a:pPr>
+            <a:r>
+              <a:rPr lang="en-US" sz="2400" dirty="0"/>
+              <a:t>Add non-clustered indexes to improve performance for less selective queries. </a:t>
+            </a:r>
+          </a:p>
+          <a:p>
+            <a:pPr lvl="1">
+              <a:lnSpc>
+                <a:spcPct val="100000"/>
+              </a:lnSpc>
+            </a:pPr>
+            <a:r>
+              <a:rPr lang="en-US" sz="2400" dirty="0"/>
+              <a:t>Each additional index added to a table increases storage space required and processing time during data loads.</a:t>
+            </a:r>
+          </a:p>
+          <a:p>
+            <a:pPr>
+              <a:lnSpc>
+                <a:spcPct val="100000"/>
+              </a:lnSpc>
+            </a:pPr>
             <a:r>
               <a:rPr lang="en-US" sz="2800" dirty="0"/>
-              <a:t> when very few rows need to be retrieved quickly.</a:t>
-            </a:r>
-          </a:p>
-          <a:p>
-            <a:pPr lvl="1"/>
-            <a:r>
-              <a:rPr lang="en-US" sz="2400" dirty="0"/>
-              <a:t>Queries using Clustered Indexes will only see benefits by using a highly selective filter on the clustered index column – non-clustered secondary indexes can be added to improve this performance.</a:t>
-            </a:r>
-          </a:p>
-          <a:p>
-            <a:pPr lvl="1"/>
-            <a:r>
-              <a:rPr lang="en-US" sz="2400" dirty="0"/>
-              <a:t>Each additional index that is added to a table adds both space and processing time to data loads.</a:t>
-            </a:r>
-          </a:p>
-          <a:p>
-            <a:r>
-              <a:rPr lang="en-US" sz="2800" dirty="0"/>
-              <a:t>For faster loading performance, Heap tables and Temporary tables can be used as staging tables prior to running transformations.</a:t>
+              <a:t>Speed load performance by staging data in heap tables and temporary tables prior to running transformations.</a:t>
             </a:r>
           </a:p>
           <a:p>
@@ -23364,48 +22923,98 @@
         <p:spPr>
           <a:xfrm>
             <a:off x="266920" y="1150756"/>
-            <a:ext cx="11653523" cy="5355312"/>
+            <a:ext cx="11653523" cy="5634491"/>
           </a:xfrm>
         </p:spPr>
         <p:txBody>
           <a:bodyPr/>
           <a:lstStyle/>
           <a:p>
-            <a:r>
-              <a:rPr lang="en-US" sz="2800" b="1" dirty="0"/>
-              <a:t>Distributed</a:t>
-            </a:r>
+            <a:pPr>
+              <a:lnSpc>
+                <a:spcPct val="100000"/>
+              </a:lnSpc>
+            </a:pPr>
             <a:r>
               <a:rPr lang="en-US" sz="2800" dirty="0"/>
-              <a:t> table design recommendations</a:t>
-            </a:r>
-          </a:p>
-          <a:p>
-            <a:pPr lvl="1"/>
+              <a:t>Distributed table design recommendations</a:t>
+            </a:r>
+          </a:p>
+          <a:p>
+            <a:pPr lvl="1">
+              <a:lnSpc>
+                <a:spcPct val="100000"/>
+              </a:lnSpc>
+            </a:pPr>
             <a:r>
               <a:rPr lang="en-US" sz="2800" dirty="0"/>
+              <a:t>Hash Distribution: </a:t>
+            </a:r>
+          </a:p>
+          <a:p>
+            <a:pPr lvl="2">
+              <a:lnSpc>
+                <a:spcPct val="100000"/>
+              </a:lnSpc>
+            </a:pPr>
+            <a:r>
+              <a:rPr lang="en-US" sz="2408" dirty="0"/>
               <a:t>Small fact tables exceeding several GBs with frequent inserts should use a hash distribution.</a:t>
             </a:r>
           </a:p>
           <a:p>
-            <a:pPr lvl="1"/>
+            <a:pPr lvl="1">
+              <a:lnSpc>
+                <a:spcPct val="100000"/>
+              </a:lnSpc>
+            </a:pPr>
             <a:r>
               <a:rPr lang="en-US" sz="2800" dirty="0"/>
-              <a:t>Potentially useful tables created from raw input should use round-robin distribution.</a:t>
-            </a:r>
-          </a:p>
-          <a:p>
-            <a:pPr lvl="1"/>
+              <a:t>Round Robin Distribution: </a:t>
+            </a:r>
+          </a:p>
+          <a:p>
+            <a:pPr lvl="2">
+              <a:lnSpc>
+                <a:spcPct val="100000"/>
+              </a:lnSpc>
+            </a:pPr>
+            <a:r>
+              <a:rPr lang="en-US" sz="2408" dirty="0"/>
+              <a:t>Potentially useful tables created from raw input. </a:t>
+            </a:r>
+          </a:p>
+          <a:p>
+            <a:pPr lvl="2">
+              <a:lnSpc>
+                <a:spcPct val="100000"/>
+              </a:lnSpc>
+            </a:pPr>
+            <a:r>
+              <a:rPr lang="en-US" sz="2408" dirty="0"/>
+              <a:t>Temporary staging tables used in data preparation.</a:t>
+            </a:r>
+          </a:p>
+          <a:p>
+            <a:pPr lvl="1">
+              <a:lnSpc>
+                <a:spcPct val="100000"/>
+              </a:lnSpc>
+            </a:pPr>
             <a:r>
               <a:rPr lang="en-US" sz="2800" dirty="0"/>
-              <a:t>Temporary staging tables used in data preparation should use a round-robin distributed table.</a:t>
-            </a:r>
-          </a:p>
-          <a:p>
-            <a:pPr lvl="1"/>
-            <a:r>
-              <a:rPr lang="en-US" sz="2800" dirty="0"/>
-              <a:t>Lookup tables that range from several hundred MBs to 1.5 GBs in size should be considered for replication. (This works best when table size is less than 2 GB compressed)</a:t>
+              <a:t>Replicated Tables: </a:t>
+            </a:r>
+          </a:p>
+          <a:p>
+            <a:pPr lvl="2">
+              <a:lnSpc>
+                <a:spcPct val="100000"/>
+              </a:lnSpc>
+            </a:pPr>
+            <a:r>
+              <a:rPr lang="en-US" sz="2408" dirty="0"/>
+              <a:t>Lookup tables that range in size from 100’s MBs to 1.5 GBs should be replicated. Works best when table size is less than 2 GB compressed.</a:t>
             </a:r>
           </a:p>
           <a:p>
@@ -23501,44 +23110,76 @@
         <p:spPr>
           <a:xfrm>
             <a:off x="266920" y="1150756"/>
-            <a:ext cx="11653523" cy="4708981"/>
+            <a:ext cx="11653523" cy="5398401"/>
           </a:xfrm>
         </p:spPr>
         <p:txBody>
           <a:bodyPr/>
           <a:lstStyle/>
           <a:p>
+            <a:pPr>
+              <a:lnSpc>
+                <a:spcPct val="100000"/>
+              </a:lnSpc>
+            </a:pPr>
             <a:r>
               <a:rPr lang="en-US" sz="2800" dirty="0"/>
-              <a:t>JSON formatted data columns are </a:t>
-            </a:r>
-            <a:r>
-              <a:rPr lang="en-US" sz="2800" dirty="0" err="1"/>
-              <a:t>queryable</a:t>
-            </a:r>
+              <a:t>Query JSON using Azure Synapse SQL in conjunction with T-SQL OPENJSON, JSON_VALUE, and JSON_Query statements. </a:t>
+            </a:r>
+          </a:p>
+          <a:p>
+            <a:pPr>
+              <a:lnSpc>
+                <a:spcPct val="100000"/>
+              </a:lnSpc>
+            </a:pPr>
             <a:r>
               <a:rPr lang="en-US" sz="2800" dirty="0"/>
-              <a:t> using Azure Synapse SQL serverless in conjunction with T-SQL OPENJSON, JSON_VALUE, and </a:t>
-            </a:r>
-            <a:r>
-              <a:rPr lang="en-US" sz="2800" dirty="0" err="1"/>
-              <a:t>JSON_Query</a:t>
-            </a:r>
+              <a:t>Modify JSON data during UPDATE using the JSON_MODIFY statement.</a:t>
+            </a:r>
+          </a:p>
+          <a:p>
+            <a:pPr>
+              <a:lnSpc>
+                <a:spcPct val="100000"/>
+              </a:lnSpc>
+            </a:pPr>
             <a:r>
               <a:rPr lang="en-US" sz="2800" dirty="0"/>
-              <a:t> statements. JSON data is updateable via the JSON_MODIFY command.</a:t>
-            </a:r>
-          </a:p>
-          <a:p>
+              <a:t>Use APPROXIMATE_COUNT_DISTINCT for better count query performance- results within average 2% accuracy of the true count.</a:t>
+            </a:r>
+          </a:p>
+          <a:p>
+            <a:pPr>
+              <a:lnSpc>
+                <a:spcPct val="100000"/>
+              </a:lnSpc>
+            </a:pPr>
             <a:r>
               <a:rPr lang="en-US" sz="2800" dirty="0"/>
-              <a:t>APPROXIMATE_COUNT_DISTINCT provides better count query performance with an average 2% accuracy of the true cardinality.</a:t>
-            </a:r>
-          </a:p>
-          <a:p>
+              <a:t>Use result-set caching to improve query performance when the same queries are executed repeatedly against mainly static data. </a:t>
+            </a:r>
+          </a:p>
+          <a:p>
+            <a:pPr>
+              <a:lnSpc>
+                <a:spcPct val="100000"/>
+              </a:lnSpc>
+            </a:pPr>
             <a:r>
               <a:rPr lang="en-US" sz="2800" dirty="0"/>
-              <a:t>When the same queries are executed repeatedly against mainly static data; result-set caching can be used to improve performance – this cache is invalidated and refreshed when underlying table data changes or the query code changes.</a:t>
+              <a:t>Result-set cache is invalidated and refreshed when underlying table data changes or the query code changes</a:t>
+            </a:r>
+          </a:p>
+          <a:p>
+            <a:pPr>
+              <a:lnSpc>
+                <a:spcPct val="100000"/>
+              </a:lnSpc>
+            </a:pPr>
+            <a:r>
+              <a:rPr lang="en-US" sz="2800" dirty="0"/>
+              <a:t>Result-set cache persists when SQL Pool is paused and resumed.</a:t>
             </a:r>
           </a:p>
           <a:p>
@@ -23631,34 +23272,54 @@
         <p:spPr>
           <a:xfrm>
             <a:off x="266920" y="1150756"/>
-            <a:ext cx="11653523" cy="4493538"/>
+            <a:ext cx="11653523" cy="4838248"/>
           </a:xfrm>
         </p:spPr>
         <p:txBody>
           <a:bodyPr/>
           <a:lstStyle/>
           <a:p>
+            <a:pPr>
+              <a:lnSpc>
+                <a:spcPct val="100000"/>
+              </a:lnSpc>
+            </a:pPr>
             <a:r>
               <a:rPr lang="en-US" sz="2800" dirty="0"/>
-              <a:t>The Azure Synapse Studio provides the ability to create Power BI reports.</a:t>
-            </a:r>
-          </a:p>
-          <a:p>
+              <a:t>Azure Synapse Studio provides the ability to create Power BI reports.</a:t>
+            </a:r>
+          </a:p>
+          <a:p>
+            <a:pPr>
+              <a:lnSpc>
+                <a:spcPct val="100000"/>
+              </a:lnSpc>
+            </a:pPr>
             <a:r>
               <a:rPr lang="en-US" sz="2800" dirty="0"/>
-              <a:t>Power BI Desktop can also be used to publish both datasets and reports to the Azure Synapse Studio.</a:t>
-            </a:r>
-          </a:p>
-          <a:p>
+              <a:t>Power BI Desktop can also be used to publish datasets and reports to Azure Synapse Studio.</a:t>
+            </a:r>
+          </a:p>
+          <a:p>
+            <a:pPr>
+              <a:lnSpc>
+                <a:spcPct val="100000"/>
+              </a:lnSpc>
+            </a:pPr>
             <a:r>
               <a:rPr lang="en-US" sz="2800" dirty="0"/>
-              <a:t>Power BI supports the creation of dashboards that query both batch and streaming data into a single view.</a:t>
-            </a:r>
-          </a:p>
-          <a:p>
+              <a:t>Power BI supports the creation of dashboards that query both batch and streaming data in a single view.</a:t>
+            </a:r>
+          </a:p>
+          <a:p>
+            <a:pPr>
+              <a:lnSpc>
+                <a:spcPct val="100000"/>
+              </a:lnSpc>
+            </a:pPr>
             <a:r>
               <a:rPr lang="en-US" sz="2800" dirty="0"/>
-              <a:t>Power BI with Azure Synapse SQL serverless they can create reports with data residing in Azure Storage that hasn’t yet been moved to the data warehouse.</a:t>
+              <a:t>Use Power BI with Azure Synapse SQL serverless to create reports with data residing in Azure Storage that has yet to move into the data warehouse.</a:t>
             </a:r>
           </a:p>
           <a:p>
@@ -23754,81 +23415,91 @@
         <p:spPr>
           <a:xfrm>
             <a:off x="266920" y="1150756"/>
-            <a:ext cx="11653523" cy="6290953"/>
+            <a:ext cx="11653523" cy="6389441"/>
           </a:xfrm>
         </p:spPr>
         <p:txBody>
           <a:bodyPr/>
           <a:lstStyle/>
           <a:p>
+            <a:pPr>
+              <a:lnSpc>
+                <a:spcPct val="100000"/>
+              </a:lnSpc>
+            </a:pPr>
             <a:r>
               <a:rPr lang="en-US" sz="2800" dirty="0"/>
               <a:t>Resource contention can be mitigated by applying Workload Management in Azure Synapse Analytics.</a:t>
             </a:r>
           </a:p>
           <a:p>
-            <a:pPr lvl="1"/>
+            <a:pPr lvl="1">
+              <a:lnSpc>
+                <a:spcPct val="100000"/>
+              </a:lnSpc>
+            </a:pPr>
+            <a:r>
+              <a:rPr lang="en-US" sz="2400" b="1" dirty="0"/>
+              <a:t>Workload Classification: </a:t>
+            </a:r>
+            <a:r>
+              <a:rPr lang="en-US" sz="2400" dirty="0">
+                <a:latin typeface="Segoe UI Semilight" panose="020B0402040204020203" pitchFamily="34" charset="0"/>
+                <a:cs typeface="Segoe UI Semilight" panose="020B0402040204020203" pitchFamily="34" charset="0"/>
+              </a:rPr>
+              <a:t>Assign a request to a workload group and set importance levels.</a:t>
+            </a:r>
+          </a:p>
+          <a:p>
+            <a:pPr lvl="1">
+              <a:lnSpc>
+                <a:spcPct val="100000"/>
+              </a:lnSpc>
+            </a:pPr>
+            <a:r>
+              <a:rPr lang="en-US" sz="2400" b="1" dirty="0"/>
+              <a:t>Workload Importance: </a:t>
+            </a:r>
             <a:r>
               <a:rPr lang="en-US" sz="2400" dirty="0"/>
-              <a:t>Assign a request to a workload group and set importance levels through </a:t>
-            </a:r>
+              <a:t>Influence the order in which a request gets access to resources.</a:t>
+            </a:r>
+          </a:p>
+          <a:p>
+            <a:pPr lvl="1">
+              <a:lnSpc>
+                <a:spcPct val="100000"/>
+              </a:lnSpc>
+            </a:pPr>
             <a:r>
               <a:rPr lang="en-US" sz="2400" b="1" dirty="0"/>
-              <a:t>Workload Classification</a:t>
+              <a:t>Workload Isolation: </a:t>
             </a:r>
             <a:r>
               <a:rPr lang="en-US" sz="2400" dirty="0"/>
-              <a:t>.</a:t>
-            </a:r>
-          </a:p>
-          <a:p>
-            <a:pPr lvl="1"/>
-            <a:r>
-              <a:rPr lang="en-US" sz="2400" dirty="0"/>
-              <a:t>Influence the order in which a request gets access to resources through </a:t>
-            </a:r>
-            <a:r>
-              <a:rPr lang="en-US" sz="2400" b="1" dirty="0"/>
-              <a:t>Workload Importance</a:t>
-            </a:r>
-            <a:r>
-              <a:rPr lang="en-US" sz="2400" dirty="0"/>
-              <a:t>.</a:t>
-            </a:r>
-          </a:p>
-          <a:p>
-            <a:pPr lvl="1"/>
-            <a:r>
-              <a:rPr lang="en-US" sz="2400" dirty="0"/>
-              <a:t>Reserve resources for a workload group through </a:t>
-            </a:r>
-            <a:r>
-              <a:rPr lang="en-US" sz="2400" b="1" dirty="0"/>
-              <a:t>Workload Isolation</a:t>
-            </a:r>
-            <a:r>
-              <a:rPr lang="en-US" sz="2400" dirty="0"/>
-              <a:t>.</a:t>
-            </a:r>
-          </a:p>
-          <a:p>
+              <a:t>Reserve resources for a workload group.</a:t>
+            </a:r>
+          </a:p>
+          <a:p>
+            <a:pPr>
+              <a:lnSpc>
+                <a:spcPct val="100000"/>
+              </a:lnSpc>
+            </a:pPr>
             <a:r>
               <a:rPr lang="en-US" sz="2800" dirty="0"/>
-              <a:t>Leverage Azure Advisor recommendations to identify suboptimal table distribution, data skew, cache misses, </a:t>
-            </a:r>
-            <a:r>
-              <a:rPr lang="en-US" sz="2800" dirty="0" err="1"/>
-              <a:t>tempdb</a:t>
-            </a:r>
+              <a:t>Use Azure Advisor recommendations to identify suboptimal table distribution, data skew, cache misses, tempdb contention, and suboptimal plan selection.</a:t>
+            </a:r>
+          </a:p>
+          <a:p>
+            <a:pPr>
+              <a:lnSpc>
+                <a:spcPct val="100000"/>
+              </a:lnSpc>
+            </a:pPr>
             <a:r>
               <a:rPr lang="en-US" sz="2800" dirty="0"/>
-              <a:t> contention, and suboptimal plan selection.</a:t>
-            </a:r>
-          </a:p>
-          <a:p>
-            <a:r>
-              <a:rPr lang="en-US" sz="2800" dirty="0"/>
-              <a:t>Avoid disruptive system downtime attributed to system upgrades by setting maintenance windows and notifications in Azure Synapse Analytics.</a:t>
+              <a:t>Avoid disruptive system downtime due to system upgrades by configuring maintenance windows and notifications in Azure Synapse Analytics.</a:t>
             </a:r>
           </a:p>
           <a:p>
@@ -23924,28 +23595,56 @@
         <p:spPr>
           <a:xfrm>
             <a:off x="266920" y="1150756"/>
-            <a:ext cx="11653523" cy="4019562"/>
+            <a:ext cx="11653523" cy="4881336"/>
           </a:xfrm>
         </p:spPr>
         <p:txBody>
-          <a:bodyPr/>
+          <a:bodyPr>
+            <a:noAutofit/>
+          </a:bodyPr>
           <a:lstStyle/>
           <a:p>
+            <a:pPr>
+              <a:lnSpc>
+                <a:spcPct val="100000"/>
+              </a:lnSpc>
+            </a:pPr>
             <a:r>
               <a:rPr lang="en-US" sz="2800" dirty="0"/>
               <a:t>Azure Synapse Analytics utilizes Azure Active Directory (AAD) as its authentication mechanism.</a:t>
             </a:r>
           </a:p>
           <a:p>
+            <a:pPr>
+              <a:lnSpc>
+                <a:spcPct val="100000"/>
+              </a:lnSpc>
+            </a:pPr>
             <a:r>
               <a:rPr lang="en-US" sz="2800" dirty="0"/>
-              <a:t>Azure Data Lake Store Gen2 authorization provides container level security via AAD roles. Fine-grained access control is enabled by setting POSIX ACLs at the folder level.</a:t>
-            </a:r>
-          </a:p>
-          <a:p>
-            <a:r>
-              <a:rPr lang="en-US" sz="2800" dirty="0"/>
-              <a:t>Database permissions (including object level security for tables, views, stored procedures, and functions) are based on AAD groups and users. </a:t>
+              <a:t>Different authorization mechanisms apply depending on datastore:</a:t>
+            </a:r>
+          </a:p>
+          <a:p>
+            <a:pPr lvl="1">
+              <a:lnSpc>
+                <a:spcPct val="100000"/>
+              </a:lnSpc>
+            </a:pPr>
+            <a:r>
+              <a:rPr lang="en-US" sz="2400" dirty="0"/>
+              <a:t>Azure Data Lake Store Gen2 authorization provides course grained container level (aka file system level) security via built-in roles assigned to AAD security principals. Fine-grained access control is enabled by setting POSIX ACLs at the folder level.</a:t>
+            </a:r>
+          </a:p>
+          <a:p>
+            <a:pPr lvl="1">
+              <a:lnSpc>
+                <a:spcPct val="100000"/>
+              </a:lnSpc>
+            </a:pPr>
+            <a:r>
+              <a:rPr lang="en-US" sz="2400" dirty="0"/>
+              <a:t>Database permissions (including object level security for tables, views, stored procedures, and functions) are based on AAD group and user security principals. </a:t>
             </a:r>
           </a:p>
           <a:p>
@@ -24041,20 +23740,29 @@
         <p:spPr>
           <a:xfrm>
             <a:off x="266920" y="1150756"/>
-            <a:ext cx="11653523" cy="5392245"/>
+            <a:ext cx="11653523" cy="5964710"/>
           </a:xfrm>
         </p:spPr>
         <p:txBody>
           <a:bodyPr/>
           <a:lstStyle/>
           <a:p>
+            <a:pPr>
+              <a:lnSpc>
+                <a:spcPct val="100000"/>
+              </a:lnSpc>
+            </a:pPr>
             <a:r>
               <a:rPr lang="en-US" sz="2800" dirty="0"/>
               <a:t>Fine-grained data security can be achieved via:</a:t>
             </a:r>
           </a:p>
           <a:p>
-            <a:pPr lvl="1"/>
+            <a:pPr lvl="1">
+              <a:lnSpc>
+                <a:spcPct val="100000"/>
+              </a:lnSpc>
+            </a:pPr>
             <a:r>
               <a:rPr lang="en-US" sz="2000" b="1" dirty="0"/>
               <a:t>Row Level Security </a:t>
@@ -24065,7 +23773,11 @@
             </a:r>
           </a:p>
           <a:p>
-            <a:pPr lvl="1"/>
+            <a:pPr lvl="1">
+              <a:lnSpc>
+                <a:spcPct val="100000"/>
+              </a:lnSpc>
+            </a:pPr>
             <a:r>
               <a:rPr lang="en-US" sz="2000" b="1" dirty="0"/>
               <a:t>Column Level Security </a:t>
@@ -24076,7 +23788,11 @@
             </a:r>
           </a:p>
           <a:p>
-            <a:pPr lvl="1"/>
+            <a:pPr lvl="1">
+              <a:lnSpc>
+                <a:spcPct val="100000"/>
+              </a:lnSpc>
+            </a:pPr>
             <a:r>
               <a:rPr lang="en-US" sz="2000" b="1" dirty="0"/>
               <a:t>Dynamic Data Masking </a:t>
@@ -24087,15 +23803,36 @@
             </a:r>
           </a:p>
           <a:p>
+            <a:pPr>
+              <a:lnSpc>
+                <a:spcPct val="100000"/>
+              </a:lnSpc>
+            </a:pPr>
             <a:r>
               <a:rPr lang="en-US" sz="2800" dirty="0"/>
-              <a:t>SQL Vulnerability Assessment is an automated tool used to discover, track, and remediate database vulnerabilities that also gives you the ability to set a security baseline that will customize scan results to suit your environment.</a:t>
-            </a:r>
-          </a:p>
-          <a:p>
+              <a:t>Discover, track, and remediate database vulnerabilities using SQL Vulnerability Assessment (SQL VA).</a:t>
+            </a:r>
+          </a:p>
+          <a:p>
+            <a:pPr>
+              <a:lnSpc>
+                <a:spcPct val="100000"/>
+              </a:lnSpc>
+            </a:pPr>
             <a:r>
               <a:rPr lang="en-US" sz="2800" dirty="0"/>
-              <a:t>SQL Threat Detection allows you to respond to and remediate unusual and harmful attempts to breach your database. </a:t>
+              <a:t>SQL VA is automated tool that also gives you the ability to set a security baseline that will customize scan results to suit your environment.</a:t>
+            </a:r>
+          </a:p>
+          <a:p>
+            <a:pPr>
+              <a:lnSpc>
+                <a:spcPct val="100000"/>
+              </a:lnSpc>
+            </a:pPr>
+            <a:r>
+              <a:rPr lang="en-US" sz="2800" dirty="0"/>
+              <a:t>Detect and respond to database security threats using SQL Threat Detection.</a:t>
             </a:r>
           </a:p>
           <a:p>
@@ -24264,7 +24001,7 @@
                 <a:latin typeface="Segoe UI Semilight" panose="020B0402040204020203" pitchFamily="34" charset="0"/>
                 <a:cs typeface="Segoe UI Semilight" panose="020B0402040204020203" pitchFamily="34" charset="0"/>
               </a:rPr>
-              <a:t>Analyze your customer needs</a:t>
+              <a:t>Analyze your customer needs.</a:t>
             </a:r>
           </a:p>
           <a:p>
@@ -24370,30 +24107,43 @@
         <p:spPr>
           <a:xfrm>
             <a:off x="266920" y="1150756"/>
-            <a:ext cx="11653523" cy="3459409"/>
+            <a:ext cx="11653523" cy="5139869"/>
           </a:xfrm>
         </p:spPr>
         <p:txBody>
           <a:bodyPr/>
           <a:lstStyle/>
           <a:p>
+            <a:pPr>
+              <a:lnSpc>
+                <a:spcPct val="100000"/>
+              </a:lnSpc>
+            </a:pPr>
             <a:r>
               <a:rPr lang="en-US" sz="2800" dirty="0"/>
-              <a:t>SQL Data Discovery and Classification automatically discovers columns containing potentially sensitive data and provides recommendations for labeling this data via metadata attributes.</a:t>
-            </a:r>
-          </a:p>
-          <a:p>
+              <a:t>Monitor and discover sensitive data using SQL Data Discovery and Classification. It automatically discovers columns containing potentially sensitive data and provides recommendations for labeling this data via metadata attributes.</a:t>
+            </a:r>
+          </a:p>
+          <a:p>
+            <a:pPr>
+              <a:lnSpc>
+                <a:spcPct val="100000"/>
+              </a:lnSpc>
+            </a:pPr>
             <a:r>
               <a:rPr lang="en-US" sz="2800" dirty="0"/>
-              <a:t>From a network perspective, Azure Synapse Analytics workspaces can be deployed in a Virtual Network that exposes managed private endpoints. This way all traffic between the </a:t>
-            </a:r>
-            <a:r>
-              <a:rPr lang="en-US" sz="2800" dirty="0" err="1"/>
-              <a:t>VNet</a:t>
-            </a:r>
+              <a:t>Prevent data exfiltration using Azure Synapse Analytics with managed private endpoints. </a:t>
+            </a:r>
+          </a:p>
+          <a:p>
+            <a:pPr>
+              <a:lnSpc>
+                <a:spcPct val="100000"/>
+              </a:lnSpc>
+            </a:pPr>
             <a:r>
               <a:rPr lang="en-US" sz="2800" dirty="0"/>
-              <a:t> and Azure Synapse Analytics traverses only over the Microsoft backbone network.</a:t>
+              <a:t>Azure Synapse Analytics workspaces can be deployed in a Virtual Network that exposes managed private endpoints to data sources. All traffic between the Virtual Network and Azure Synapse Analytics traverses only over the Microsoft backbone network.</a:t>
             </a:r>
           </a:p>
           <a:p>
@@ -24528,10 +24278,15 @@
         </p:spPr>
         <p:txBody>
           <a:bodyPr>
-            <a:normAutofit/>
+            <a:normAutofit lnSpcReduction="10000"/>
           </a:bodyPr>
           <a:lstStyle/>
           <a:p>
+            <a:pPr>
+              <a:lnSpc>
+                <a:spcPct val="100000"/>
+              </a:lnSpc>
+            </a:pPr>
             <a:r>
               <a:rPr lang="en-US" sz="2800" dirty="0">
                 <a:solidFill>
@@ -24555,6 +24310,9 @@
           </a:p>
           <a:p>
             <a:pPr marL="336145" lvl="1" indent="0">
+              <a:lnSpc>
+                <a:spcPct val="100000"/>
+              </a:lnSpc>
               <a:buNone/>
             </a:pPr>
             <a:r>
@@ -24568,6 +24326,9 @@
           </a:p>
           <a:p>
             <a:pPr marL="336145" lvl="1" indent="0">
+              <a:lnSpc>
+                <a:spcPct val="100000"/>
+              </a:lnSpc>
               <a:buNone/>
             </a:pPr>
             <a:endParaRPr lang="en-US" sz="2032" dirty="0">
@@ -24577,6 +24338,11 @@
             </a:endParaRPr>
           </a:p>
           <a:p>
+            <a:pPr>
+              <a:lnSpc>
+                <a:spcPct val="100000"/>
+              </a:lnSpc>
+            </a:pPr>
             <a:r>
               <a:rPr lang="en-US" sz="2800" dirty="0">
                 <a:solidFill>
@@ -24588,6 +24354,9 @@
           </a:p>
           <a:p>
             <a:pPr marL="336145" lvl="1" indent="0">
+              <a:lnSpc>
+                <a:spcPct val="100000"/>
+              </a:lnSpc>
               <a:buNone/>
             </a:pPr>
             <a:endParaRPr lang="en-US" sz="2400" dirty="0">
@@ -24598,6 +24367,9 @@
           </a:p>
           <a:p>
             <a:pPr marL="336145" lvl="1" indent="0">
+              <a:lnSpc>
+                <a:spcPct val="100000"/>
+              </a:lnSpc>
               <a:buNone/>
             </a:pPr>
             <a:r>
@@ -24724,7 +24496,7 @@
         <p:spPr>
           <a:xfrm>
             <a:off x="269239" y="1189177"/>
-            <a:ext cx="11653523" cy="5495932"/>
+            <a:ext cx="11653523" cy="5809500"/>
           </a:xfrm>
         </p:spPr>
         <p:txBody>
@@ -24749,9 +24521,12 @@
           </a:p>
           <a:p>
             <a:pPr marL="336145" lvl="1" indent="0">
+              <a:lnSpc>
+                <a:spcPct val="120000"/>
+              </a:lnSpc>
               <a:buNone/>
             </a:pPr>
-            <a:endParaRPr lang="en-US" sz="2400" dirty="0">
+            <a:endParaRPr lang="en-US" sz="1400" dirty="0">
               <a:solidFill>
                 <a:schemeClr val="tx1"/>
               </a:solidFill>
@@ -24760,6 +24535,9 @@
           </a:p>
           <a:p>
             <a:pPr marL="336145" lvl="1" indent="0">
+              <a:lnSpc>
+                <a:spcPct val="120000"/>
+              </a:lnSpc>
               <a:buNone/>
             </a:pPr>
             <a:r>
@@ -24774,6 +24552,9 @@
           </a:p>
           <a:p>
             <a:pPr marL="336145" lvl="1" indent="0">
+              <a:lnSpc>
+                <a:spcPct val="120000"/>
+              </a:lnSpc>
               <a:buNone/>
             </a:pPr>
             <a:endParaRPr lang="en-US" sz="2032" dirty="0">
@@ -24805,7 +24586,7 @@
               </a:lnSpc>
               <a:buNone/>
             </a:pPr>
-            <a:endParaRPr lang="en-US" sz="2300" dirty="0">
+            <a:endParaRPr lang="en-US" sz="1600" dirty="0">
               <a:solidFill>
                 <a:schemeClr val="tx1"/>
               </a:solidFill>
@@ -24939,15 +24720,20 @@
         <p:spPr>
           <a:xfrm>
             <a:off x="269239" y="1189177"/>
-            <a:ext cx="11653523" cy="5495932"/>
+            <a:ext cx="11653523" cy="5668824"/>
           </a:xfrm>
         </p:spPr>
         <p:txBody>
           <a:bodyPr>
-            <a:normAutofit fontScale="92500" lnSpcReduction="20000"/>
+            <a:normAutofit fontScale="85000" lnSpcReduction="20000"/>
           </a:bodyPr>
           <a:lstStyle/>
           <a:p>
+            <a:pPr>
+              <a:lnSpc>
+                <a:spcPct val="120000"/>
+              </a:lnSpc>
+            </a:pPr>
             <a:r>
               <a:rPr lang="en-US" sz="3000" dirty="0">
                 <a:solidFill>
@@ -24959,9 +24745,12 @@
           </a:p>
           <a:p>
             <a:pPr marL="336145" lvl="1" indent="0">
+              <a:lnSpc>
+                <a:spcPct val="120000"/>
+              </a:lnSpc>
               <a:buNone/>
             </a:pPr>
-            <a:endParaRPr lang="en-US" sz="2400" dirty="0">
+            <a:endParaRPr lang="en-US" sz="1400" dirty="0">
               <a:solidFill>
                 <a:schemeClr val="tx1"/>
               </a:solidFill>
@@ -24971,7 +24760,7 @@
           <a:p>
             <a:pPr marL="336145" lvl="1" indent="0">
               <a:lnSpc>
-                <a:spcPct val="110000"/>
+                <a:spcPct val="120000"/>
               </a:lnSpc>
               <a:buNone/>
             </a:pPr>
@@ -24987,6 +24776,9 @@
           </a:p>
           <a:p>
             <a:pPr marL="336145" lvl="1" indent="0">
+              <a:lnSpc>
+                <a:spcPct val="120000"/>
+              </a:lnSpc>
               <a:buNone/>
             </a:pPr>
             <a:endParaRPr lang="en-US" sz="2032" dirty="0">
@@ -24997,6 +24789,11 @@
             </a:endParaRPr>
           </a:p>
           <a:p>
+            <a:pPr>
+              <a:lnSpc>
+                <a:spcPct val="120000"/>
+              </a:lnSpc>
+            </a:pPr>
             <a:r>
               <a:rPr lang="en-US" sz="3000" dirty="0">
                 <a:solidFill>
@@ -25008,9 +24805,12 @@
           </a:p>
           <a:p>
             <a:pPr marL="336145" lvl="1" indent="0">
+              <a:lnSpc>
+                <a:spcPct val="120000"/>
+              </a:lnSpc>
               <a:buNone/>
             </a:pPr>
-            <a:endParaRPr lang="en-US" sz="2400" dirty="0">
+            <a:endParaRPr lang="en-US" sz="1800" dirty="0">
               <a:solidFill>
                 <a:schemeClr val="tx1"/>
               </a:solidFill>
@@ -25020,7 +24820,7 @@
           <a:p>
             <a:pPr marL="336145" lvl="1" indent="0">
               <a:lnSpc>
-                <a:spcPct val="110000"/>
+                <a:spcPct val="120000"/>
               </a:lnSpc>
               <a:buNone/>
             </a:pPr>
@@ -25148,6 +24948,9 @@
           <a:lstStyle/>
           <a:p>
             <a:pPr marL="0" indent="0">
+              <a:lnSpc>
+                <a:spcPct val="100000"/>
+              </a:lnSpc>
               <a:spcAft>
                 <a:spcPts val="882"/>
               </a:spcAft>
@@ -25164,6 +24967,9 @@
           </a:p>
           <a:p>
             <a:pPr marL="0" indent="0">
+              <a:lnSpc>
+                <a:spcPct val="100000"/>
+              </a:lnSpc>
               <a:spcAft>
                 <a:spcPts val="882"/>
               </a:spcAft>
@@ -25370,7 +25176,7 @@
                 </a:solidFill>
                 <a:latin typeface="+mj-lt"/>
               </a:rPr>
-              <a:t>Wide World Importers has hundreds of brick and mortar stores. </a:t>
+              <a:t>Wide World Importers (WWI) has hundreds of brick and mortar stores. </a:t>
             </a:r>
             <a:r>
               <a:rPr lang="en-US" sz="2800" dirty="0">
@@ -25378,7 +25184,20 @@
                   <a:schemeClr val="tx1"/>
                 </a:solidFill>
               </a:rPr>
-              <a:t>Over their years of operation, they have amassed large amounts of historical data stored in disparate systems. </a:t>
+              <a:t>Over their years of operation, they have amassed large amounts of historical data stored in disparate systems.</a:t>
+            </a:r>
+          </a:p>
+          <a:p>
+            <a:pPr marL="0" indent="0">
+              <a:buNone/>
+            </a:pPr>
+            <a:r>
+              <a:rPr lang="en-US" sz="2800" dirty="0">
+                <a:solidFill>
+                  <a:schemeClr val="tx1"/>
+                </a:solidFill>
+              </a:rPr>
+              <a:t> </a:t>
             </a:r>
           </a:p>
           <a:p>
@@ -25548,7 +25367,7 @@
           <a:p>
             <a:pPr>
               <a:lnSpc>
-                <a:spcPct val="120000"/>
+                <a:spcPct val="100000"/>
               </a:lnSpc>
             </a:pPr>
             <a:r>
@@ -25561,9 +25380,22 @@
             </a:r>
           </a:p>
           <a:p>
+            <a:pPr marL="0" indent="0">
+              <a:lnSpc>
+                <a:spcPct val="100000"/>
+              </a:lnSpc>
+              <a:buNone/>
+            </a:pPr>
+            <a:endParaRPr lang="en-US" sz="1600" dirty="0">
+              <a:solidFill>
+                <a:schemeClr val="tx1"/>
+              </a:solidFill>
+            </a:endParaRPr>
+          </a:p>
+          <a:p>
             <a:pPr>
               <a:lnSpc>
-                <a:spcPct val="120000"/>
+                <a:spcPct val="100000"/>
               </a:lnSpc>
             </a:pPr>
             <a:r>
@@ -25612,10 +25444,13 @@
         </p:grpSpPr>
         <p:pic>
           <p:nvPicPr>
-            <p:cNvPr id="5" name="Graphic 4" descr="Database">
+            <p:cNvPr id="5" name="Graphic 4">
               <a:extLst>
                 <a:ext uri="{FF2B5EF4-FFF2-40B4-BE49-F238E27FC236}">
                   <a16:creationId xmlns:a16="http://schemas.microsoft.com/office/drawing/2014/main" id="{A58634F1-F885-4C54-9CB9-B2AB33E14FC2}"/>
+                </a:ext>
+                <a:ext uri="{C183D7F6-B498-43B3-948B-1728B52AA6E4}">
+                  <adec:decorative xmlns:adec="http://schemas.microsoft.com/office/drawing/2017/decorative" val="1"/>
                 </a:ext>
               </a:extLst>
             </p:cNvPr>
@@ -25651,10 +25486,13 @@
         </p:pic>
         <p:pic>
           <p:nvPicPr>
-            <p:cNvPr id="7" name="Graphic 6" descr="Research">
+            <p:cNvPr id="7" name="Graphic 6">
               <a:extLst>
                 <a:ext uri="{FF2B5EF4-FFF2-40B4-BE49-F238E27FC236}">
                   <a16:creationId xmlns:a16="http://schemas.microsoft.com/office/drawing/2014/main" id="{93FBA86C-3611-4776-BF5D-FB13DD459B12}"/>
+                </a:ext>
+                <a:ext uri="{C183D7F6-B498-43B3-948B-1728B52AA6E4}">
+                  <adec:decorative xmlns:adec="http://schemas.microsoft.com/office/drawing/2017/decorative" val="1"/>
                 </a:ext>
               </a:extLst>
             </p:cNvPr>
@@ -25746,19 +25584,37 @@
         <p:spPr>
           <a:xfrm>
             <a:off x="266920" y="1089285"/>
-            <a:ext cx="10859561" cy="2597634"/>
+            <a:ext cx="10859561" cy="3225498"/>
           </a:xfrm>
         </p:spPr>
         <p:txBody>
           <a:bodyPr/>
           <a:lstStyle/>
           <a:p>
+            <a:pPr>
+              <a:lnSpc>
+                <a:spcPct val="100000"/>
+              </a:lnSpc>
+            </a:pPr>
             <a:r>
               <a:rPr lang="en-US" sz="2800" dirty="0"/>
               <a:t>WWI has 100 stores each equipped with 50 IoT sensors that monitor customer behavior in the store aisles.</a:t>
             </a:r>
           </a:p>
           <a:p>
+            <a:pPr>
+              <a:lnSpc>
+                <a:spcPct val="100000"/>
+              </a:lnSpc>
+            </a:pPr>
+            <a:endParaRPr lang="en-US" sz="1800" dirty="0"/>
+          </a:p>
+          <a:p>
+            <a:pPr>
+              <a:lnSpc>
+                <a:spcPct val="100000"/>
+              </a:lnSpc>
+            </a:pPr>
             <a:r>
               <a:rPr lang="en-US" sz="2800" dirty="0"/>
               <a:t>They need to ingest sensor data in near real time to allow them to quickly identify patterns that can be shared between stores in an aim to improve sales with last minute offers and improved product placement.</a:t>
@@ -25796,7 +25652,7 @@
       </p:sp>
       <p:pic>
         <p:nvPicPr>
-          <p:cNvPr id="5" name="Graphic 4" descr="City">
+          <p:cNvPr id="5" name="Graphic 4" descr="City icon">
             <a:extLst>
               <a:ext uri="{FF2B5EF4-FFF2-40B4-BE49-F238E27FC236}">
                 <a16:creationId xmlns:a16="http://schemas.microsoft.com/office/drawing/2014/main" id="{DF1778BB-5152-4226-9986-A614E96A4098}"/>
@@ -25868,45 +25724,6 @@
       </p:grpSpPr>
       <p:sp>
         <p:nvSpPr>
-          <p:cNvPr id="2" name="Text Placeholder 1">
-            <a:extLst>
-              <a:ext uri="{FF2B5EF4-FFF2-40B4-BE49-F238E27FC236}">
-                <a16:creationId xmlns:a16="http://schemas.microsoft.com/office/drawing/2014/main" id="{CA2B7A85-C830-4E37-804A-6E42FEACAA18}"/>
-              </a:ext>
-            </a:extLst>
-          </p:cNvPr>
-          <p:cNvSpPr>
-            <a:spLocks noGrp="1"/>
-          </p:cNvSpPr>
-          <p:nvPr>
-            <p:ph type="body" sz="quarter" idx="10"/>
-          </p:nvPr>
-        </p:nvSpPr>
-        <p:spPr>
-          <a:xfrm>
-            <a:off x="269239" y="1004760"/>
-            <a:ext cx="10035049" cy="2597634"/>
-          </a:xfrm>
-        </p:spPr>
-        <p:txBody>
-          <a:bodyPr/>
-          <a:lstStyle/>
-          <a:p>
-            <a:r>
-              <a:rPr lang="en-US" sz="2800" dirty="0"/>
-              <a:t>When ingesting data and creating data transformation pipelines, WWI would like their specialists to take advantage of a graphical user interface, but still retain the ability to drop down to code should the need arise.</a:t>
-            </a:r>
-          </a:p>
-          <a:p>
-            <a:r>
-              <a:rPr lang="en-US" sz="2800" dirty="0"/>
-              <a:t>They want the ability to quickly explore raw ingested data prior to any preliminary data analysis.</a:t>
-            </a:r>
-          </a:p>
-        </p:txBody>
-      </p:sp>
-      <p:sp>
-        <p:nvSpPr>
           <p:cNvPr id="3" name="Title 2">
             <a:extLst>
               <a:ext uri="{FF2B5EF4-FFF2-40B4-BE49-F238E27FC236}">
@@ -25929,6 +25746,63 @@
             <a:r>
               <a:rPr lang="en-US" dirty="0"/>
               <a:t>Customer situation - 4</a:t>
+            </a:r>
+          </a:p>
+        </p:txBody>
+      </p:sp>
+      <p:sp>
+        <p:nvSpPr>
+          <p:cNvPr id="2" name="Text Placeholder 1">
+            <a:extLst>
+              <a:ext uri="{FF2B5EF4-FFF2-40B4-BE49-F238E27FC236}">
+                <a16:creationId xmlns:a16="http://schemas.microsoft.com/office/drawing/2014/main" id="{CA2B7A85-C830-4E37-804A-6E42FEACAA18}"/>
+              </a:ext>
+            </a:extLst>
+          </p:cNvPr>
+          <p:cNvSpPr>
+            <a:spLocks noGrp="1"/>
+          </p:cNvSpPr>
+          <p:nvPr>
+            <p:ph type="body" sz="quarter" idx="10"/>
+          </p:nvPr>
+        </p:nvSpPr>
+        <p:spPr>
+          <a:xfrm>
+            <a:off x="269239" y="1004760"/>
+            <a:ext cx="10035049" cy="3225498"/>
+          </a:xfrm>
+        </p:spPr>
+        <p:txBody>
+          <a:bodyPr/>
+          <a:lstStyle/>
+          <a:p>
+            <a:pPr>
+              <a:lnSpc>
+                <a:spcPct val="100000"/>
+              </a:lnSpc>
+            </a:pPr>
+            <a:r>
+              <a:rPr lang="en-US" sz="2800" dirty="0"/>
+              <a:t>When ingesting data and creating data transformation pipelines, WWI would like their specialists to take advantage of a graphical user interface, but still retain the ability to drop down to code should the need arise.</a:t>
+            </a:r>
+          </a:p>
+          <a:p>
+            <a:pPr>
+              <a:lnSpc>
+                <a:spcPct val="100000"/>
+              </a:lnSpc>
+            </a:pPr>
+            <a:endParaRPr lang="en-US" sz="1800" dirty="0"/>
+          </a:p>
+          <a:p>
+            <a:pPr>
+              <a:lnSpc>
+                <a:spcPct val="100000"/>
+              </a:lnSpc>
+            </a:pPr>
+            <a:r>
+              <a:rPr lang="en-US" sz="2800" dirty="0"/>
+              <a:t>They want the ability to quickly explore raw ingested data prior to any preliminary data analysis.</a:t>
             </a:r>
           </a:p>
         </p:txBody>
@@ -26052,19 +25926,37 @@
         <p:spPr>
           <a:xfrm>
             <a:off x="269240" y="1189177"/>
-            <a:ext cx="10398760" cy="2985433"/>
+            <a:ext cx="10398760" cy="3225498"/>
           </a:xfrm>
         </p:spPr>
         <p:txBody>
           <a:bodyPr/>
           <a:lstStyle/>
           <a:p>
+            <a:pPr>
+              <a:lnSpc>
+                <a:spcPct val="100000"/>
+              </a:lnSpc>
+            </a:pPr>
             <a:r>
               <a:rPr lang="en-US" sz="2800" dirty="0"/>
               <a:t>To bring their entire operation into perspective, WWI would like to create a dashboard where they can see their KPIs derived from historical data, and near real-time data streams. </a:t>
             </a:r>
           </a:p>
           <a:p>
+            <a:pPr>
+              <a:lnSpc>
+                <a:spcPct val="100000"/>
+              </a:lnSpc>
+            </a:pPr>
+            <a:endParaRPr lang="en-US" sz="1600" dirty="0"/>
+          </a:p>
+          <a:p>
+            <a:pPr>
+              <a:lnSpc>
+                <a:spcPct val="100000"/>
+              </a:lnSpc>
+            </a:pPr>
             <a:r>
               <a:rPr lang="en-US" sz="2800" dirty="0"/>
               <a:t>They want to make up to the minute key product recommendations generated with the help of machine learning models.</a:t>
@@ -26074,7 +25966,7 @@
       </p:sp>
       <p:pic>
         <p:nvPicPr>
-          <p:cNvPr id="7" name="Graphic 6" descr="Statistics">
+          <p:cNvPr id="7" name="Graphic 6" descr="Statistics icon">
             <a:extLst>
               <a:ext uri="{FF2B5EF4-FFF2-40B4-BE49-F238E27FC236}">
                 <a16:creationId xmlns:a16="http://schemas.microsoft.com/office/drawing/2014/main" id="{5340270E-0CC4-4292-AE42-BD0C77209714}"/>
@@ -26209,6 +26101,11 @@
           </a:bodyPr>
           <a:lstStyle/>
           <a:p>
+            <a:pPr>
+              <a:lnSpc>
+                <a:spcPct val="100000"/>
+              </a:lnSpc>
+            </a:pPr>
             <a:r>
               <a:rPr lang="en-US" sz="2800" dirty="0">
                 <a:solidFill>
@@ -26228,6 +26125,11 @@
             </a:r>
           </a:p>
           <a:p>
+            <a:pPr>
+              <a:lnSpc>
+                <a:spcPct val="100000"/>
+              </a:lnSpc>
+            </a:pPr>
             <a:r>
               <a:rPr lang="en-US" sz="2800" dirty="0">
                 <a:solidFill>
@@ -26239,6 +26141,11 @@
             </a:r>
           </a:p>
           <a:p>
+            <a:pPr>
+              <a:lnSpc>
+                <a:spcPct val="100000"/>
+              </a:lnSpc>
+            </a:pPr>
             <a:r>
               <a:rPr lang="en-US" sz="2800" dirty="0">
                 <a:solidFill>
@@ -26250,6 +26157,11 @@
             </a:r>
           </a:p>
           <a:p>
+            <a:pPr>
+              <a:lnSpc>
+                <a:spcPct val="100000"/>
+              </a:lnSpc>
+            </a:pPr>
             <a:r>
               <a:rPr lang="en-US" sz="2800" dirty="0">
                 <a:solidFill>
@@ -27154,6 +27066,15 @@
 </file>
 
 <file path=customXml/item1.xml><?xml version="1.0" encoding="utf-8"?>
+<?mso-contentType ?>
+<FormTemplates xmlns="http://schemas.microsoft.com/sharepoint/v3/contenttype/forms">
+  <Display>DocumentLibraryForm</Display>
+  <Edit>DocumentLibraryForm</Edit>
+  <New>DocumentLibraryForm</New>
+</FormTemplates>
+</file>
+
+<file path=customXml/item2.xml><?xml version="1.0" encoding="utf-8"?>
 <ct:contentTypeSchema xmlns:ct="http://schemas.microsoft.com/office/2006/metadata/contentType" xmlns:ma="http://schemas.microsoft.com/office/2006/metadata/properties/metaAttributes" ct:_="" ma:_="" ma:contentTypeName="Document" ma:contentTypeID="0x010100D15DFA3690A15B4081582BBCC6BEAC3E" ma:contentTypeVersion="9" ma:contentTypeDescription="Create a new document." ma:contentTypeScope="" ma:versionID="642da1784587cbe85a7fdbbe4dc36103">
   <xsd:schema xmlns:xsd="http://www.w3.org/2001/XMLSchema" xmlns:xs="http://www.w3.org/2001/XMLSchema" xmlns:p="http://schemas.microsoft.com/office/2006/metadata/properties" xmlns:ns1="http://schemas.microsoft.com/sharepoint/v3" xmlns:ns2="2023ac63-7b75-4916-a9ee-591457758eee" xmlns:ns3="d9c797ad-d7c3-4982-82b7-81352a75e4a5" targetNamespace="http://schemas.microsoft.com/office/2006/metadata/properties" ma:root="true" ma:fieldsID="91198b0246576053cc55dd2c67035a89" ns1:_="" ns2:_="" ns3:_="">
     <xsd:import namespace="http://schemas.microsoft.com/sharepoint/v3"/>
@@ -27355,15 +27276,6 @@
 </ct:contentTypeSchema>
 </file>
 
-<file path=customXml/item2.xml><?xml version="1.0" encoding="utf-8"?>
-<?mso-contentType ?>
-<FormTemplates xmlns="http://schemas.microsoft.com/sharepoint/v3/contenttype/forms">
-  <Display>DocumentLibraryForm</Display>
-  <Edit>DocumentLibraryForm</Edit>
-  <New>DocumentLibraryForm</New>
-</FormTemplates>
-</file>
-
 <file path=customXml/item3.xml><?xml version="1.0" encoding="utf-8"?>
 <p:properties xmlns:p="http://schemas.microsoft.com/office/2006/metadata/properties" xmlns:xsi="http://www.w3.org/2001/XMLSchema-instance" xmlns:pc="http://schemas.microsoft.com/office/infopath/2007/PartnerControls">
   <documentManagement>
@@ -27374,6 +27286,14 @@
 </file>
 
 <file path=customXml/itemProps1.xml><?xml version="1.0" encoding="utf-8"?>
+<ds:datastoreItem xmlns:ds="http://schemas.openxmlformats.org/officeDocument/2006/customXml" ds:itemID="{F18501AF-04CF-4482-BAE1-607B49DDC378}">
+  <ds:schemaRefs>
+    <ds:schemaRef ds:uri="http://schemas.microsoft.com/sharepoint/v3/contenttype/forms"/>
+  </ds:schemaRefs>
+</ds:datastoreItem>
+</file>
+
+<file path=customXml/itemProps2.xml><?xml version="1.0" encoding="utf-8"?>
 <ds:datastoreItem xmlns:ds="http://schemas.openxmlformats.org/officeDocument/2006/customXml" ds:itemID="{255F5BEB-6AD6-480A-8556-C80C5EBC10F2}">
   <ds:schemaRefs>
     <ds:schemaRef ds:uri="http://schemas.microsoft.com/office/2006/metadata/contentType"/>
@@ -27393,28 +27313,20 @@
 </ds:datastoreItem>
 </file>
 
-<file path=customXml/itemProps2.xml><?xml version="1.0" encoding="utf-8"?>
-<ds:datastoreItem xmlns:ds="http://schemas.openxmlformats.org/officeDocument/2006/customXml" ds:itemID="{F18501AF-04CF-4482-BAE1-607B49DDC378}">
-  <ds:schemaRefs>
-    <ds:schemaRef ds:uri="http://schemas.microsoft.com/sharepoint/v3/contenttype/forms"/>
-  </ds:schemaRefs>
-</ds:datastoreItem>
-</file>
-
 <file path=customXml/itemProps3.xml><?xml version="1.0" encoding="utf-8"?>
 <ds:datastoreItem xmlns:ds="http://schemas.openxmlformats.org/officeDocument/2006/customXml" ds:itemID="{BAF7D529-36AB-45DA-B239-2F912F2D1610}">
   <ds:schemaRefs>
+    <ds:schemaRef ds:uri="http://purl.org/dc/terms/"/>
     <ds:schemaRef ds:uri="http://schemas.openxmlformats.org/package/2006/metadata/core-properties"/>
-    <ds:schemaRef ds:uri="http://purl.org/dc/elements/1.1/"/>
+    <ds:schemaRef ds:uri="http://purl.org/dc/dcmitype/"/>
     <ds:schemaRef ds:uri="http://schemas.microsoft.com/office/infopath/2007/PartnerControls"/>
     <ds:schemaRef ds:uri="2023ac63-7b75-4916-a9ee-591457758eee"/>
+    <ds:schemaRef ds:uri="http://purl.org/dc/elements/1.1/"/>
     <ds:schemaRef ds:uri="http://schemas.microsoft.com/office/2006/metadata/properties"/>
-    <ds:schemaRef ds:uri="http://purl.org/dc/terms/"/>
+    <ds:schemaRef ds:uri="http://schemas.microsoft.com/office/2006/documentManagement/types"/>
     <ds:schemaRef ds:uri="http://schemas.microsoft.com/sharepoint/v3"/>
-    <ds:schemaRef ds:uri="http://schemas.microsoft.com/office/2006/documentManagement/types"/>
     <ds:schemaRef ds:uri="d9c797ad-d7c3-4982-82b7-81352a75e4a5"/>
     <ds:schemaRef ds:uri="http://www.w3.org/XML/1998/namespace"/>
-    <ds:schemaRef ds:uri="http://purl.org/dc/dcmitype/"/>
   </ds:schemaRefs>
 </ds:datastoreItem>
 </file>
</xml_diff>

<commit_message>
added new items per eng
</commit_message>
<xml_diff>
--- a/Whiteboard design session/WDS trainer presentation - Azure Synapse Analytics end-to-end solution.pptx
+++ b/Whiteboard design session/WDS trainer presentation - Azure Synapse Analytics end-to-end solution.pptx
@@ -6,44 +6,57 @@
     <p:sldMasterId id="2147483665" r:id="rId5"/>
   </p:sldMasterIdLst>
   <p:notesMasterIdLst>
-    <p:notesMasterId r:id="rId41"/>
+    <p:notesMasterId r:id="rId54"/>
   </p:notesMasterIdLst>
   <p:sldIdLst>
     <p:sldId id="300" r:id="rId6"/>
-    <p:sldId id="323" r:id="rId7"/>
-    <p:sldId id="302" r:id="rId8"/>
-    <p:sldId id="259" r:id="rId9"/>
-    <p:sldId id="324" r:id="rId10"/>
-    <p:sldId id="325" r:id="rId11"/>
-    <p:sldId id="326" r:id="rId12"/>
-    <p:sldId id="327" r:id="rId13"/>
-    <p:sldId id="303" r:id="rId14"/>
-    <p:sldId id="328" r:id="rId15"/>
-    <p:sldId id="304" r:id="rId16"/>
-    <p:sldId id="329" r:id="rId17"/>
-    <p:sldId id="305" r:id="rId18"/>
-    <p:sldId id="320" r:id="rId19"/>
-    <p:sldId id="322" r:id="rId20"/>
-    <p:sldId id="321" r:id="rId21"/>
-    <p:sldId id="317" r:id="rId22"/>
-    <p:sldId id="316" r:id="rId23"/>
-    <p:sldId id="332" r:id="rId24"/>
-    <p:sldId id="333" r:id="rId25"/>
-    <p:sldId id="330" r:id="rId26"/>
-    <p:sldId id="331" r:id="rId27"/>
-    <p:sldId id="334" r:id="rId28"/>
-    <p:sldId id="335" r:id="rId29"/>
-    <p:sldId id="336" r:id="rId30"/>
-    <p:sldId id="337" r:id="rId31"/>
-    <p:sldId id="338" r:id="rId32"/>
-    <p:sldId id="339" r:id="rId33"/>
-    <p:sldId id="340" r:id="rId34"/>
-    <p:sldId id="341" r:id="rId35"/>
-    <p:sldId id="319" r:id="rId36"/>
-    <p:sldId id="342" r:id="rId37"/>
-    <p:sldId id="343" r:id="rId38"/>
-    <p:sldId id="318" r:id="rId39"/>
-    <p:sldId id="315" r:id="rId40"/>
+    <p:sldId id="345" r:id="rId7"/>
+    <p:sldId id="323" r:id="rId8"/>
+    <p:sldId id="302" r:id="rId9"/>
+    <p:sldId id="347" r:id="rId10"/>
+    <p:sldId id="259" r:id="rId11"/>
+    <p:sldId id="324" r:id="rId12"/>
+    <p:sldId id="325" r:id="rId13"/>
+    <p:sldId id="326" r:id="rId14"/>
+    <p:sldId id="327" r:id="rId15"/>
+    <p:sldId id="348" r:id="rId16"/>
+    <p:sldId id="303" r:id="rId17"/>
+    <p:sldId id="328" r:id="rId18"/>
+    <p:sldId id="349" r:id="rId19"/>
+    <p:sldId id="304" r:id="rId20"/>
+    <p:sldId id="329" r:id="rId21"/>
+    <p:sldId id="350" r:id="rId22"/>
+    <p:sldId id="305" r:id="rId23"/>
+    <p:sldId id="320" r:id="rId24"/>
+    <p:sldId id="322" r:id="rId25"/>
+    <p:sldId id="321" r:id="rId26"/>
+    <p:sldId id="351" r:id="rId27"/>
+    <p:sldId id="317" r:id="rId28"/>
+    <p:sldId id="352" r:id="rId29"/>
+    <p:sldId id="316" r:id="rId30"/>
+    <p:sldId id="353" r:id="rId31"/>
+    <p:sldId id="332" r:id="rId32"/>
+    <p:sldId id="354" r:id="rId33"/>
+    <p:sldId id="333" r:id="rId34"/>
+    <p:sldId id="355" r:id="rId35"/>
+    <p:sldId id="330" r:id="rId36"/>
+    <p:sldId id="331" r:id="rId37"/>
+    <p:sldId id="334" r:id="rId38"/>
+    <p:sldId id="335" r:id="rId39"/>
+    <p:sldId id="336" r:id="rId40"/>
+    <p:sldId id="337" r:id="rId41"/>
+    <p:sldId id="338" r:id="rId42"/>
+    <p:sldId id="339" r:id="rId43"/>
+    <p:sldId id="340" r:id="rId44"/>
+    <p:sldId id="341" r:id="rId45"/>
+    <p:sldId id="356" r:id="rId46"/>
+    <p:sldId id="319" r:id="rId47"/>
+    <p:sldId id="342" r:id="rId48"/>
+    <p:sldId id="343" r:id="rId49"/>
+    <p:sldId id="344" r:id="rId50"/>
+    <p:sldId id="357" r:id="rId51"/>
+    <p:sldId id="318" r:id="rId52"/>
+    <p:sldId id="315" r:id="rId53"/>
   </p:sldIdLst>
   <p:sldSz cx="12192000" cy="6858000"/>
   <p:notesSz cx="6858000" cy="9144000"/>
@@ -232,7 +245,7 @@
           <a:p>
             <a:fld id="{52A13B17-C506-4D51-BB37-16B365906619}" type="datetimeFigureOut">
               <a:rPr lang="en-US" smtClean="0"/>
-              <a:t>4/16/2020</a:t>
+              <a:t>4/17/2020</a:t>
             </a:fld>
             <a:endParaRPr lang="en-US" dirty="0"/>
           </a:p>
@@ -825,7 +838,7 @@
           <a:p>
             <a:fld id="{0998D5BB-B127-481F-BC0A-2F77C576BB34}" type="slidenum">
               <a:rPr lang="en-US" smtClean="0"/>
-              <a:t>10</a:t>
+              <a:t>13</a:t>
             </a:fld>
             <a:endParaRPr lang="en-US" dirty="0"/>
           </a:p>
@@ -909,7 +922,7 @@
           <a:p>
             <a:fld id="{0998D5BB-B127-481F-BC0A-2F77C576BB34}" type="slidenum">
               <a:rPr lang="en-US" smtClean="0"/>
-              <a:t>11</a:t>
+              <a:t>15</a:t>
             </a:fld>
             <a:endParaRPr lang="en-US" dirty="0"/>
           </a:p>
@@ -993,7 +1006,7 @@
           <a:p>
             <a:fld id="{0998D5BB-B127-481F-BC0A-2F77C576BB34}" type="slidenum">
               <a:rPr lang="en-US" smtClean="0"/>
-              <a:t>12</a:t>
+              <a:t>16</a:t>
             </a:fld>
             <a:endParaRPr lang="en-US" dirty="0"/>
           </a:p>
@@ -1077,7 +1090,7 @@
           <a:p>
             <a:fld id="{0998D5BB-B127-481F-BC0A-2F77C576BB34}" type="slidenum">
               <a:rPr lang="en-US" smtClean="0"/>
-              <a:t>13</a:t>
+              <a:t>18</a:t>
             </a:fld>
             <a:endParaRPr lang="en-US" dirty="0"/>
           </a:p>
@@ -1161,7 +1174,7 @@
           <a:p>
             <a:fld id="{0998D5BB-B127-481F-BC0A-2F77C576BB34}" type="slidenum">
               <a:rPr lang="en-US" smtClean="0"/>
-              <a:t>14</a:t>
+              <a:t>19</a:t>
             </a:fld>
             <a:endParaRPr lang="en-US" dirty="0"/>
           </a:p>
@@ -1245,7 +1258,7 @@
           <a:p>
             <a:fld id="{0998D5BB-B127-481F-BC0A-2F77C576BB34}" type="slidenum">
               <a:rPr lang="en-US" smtClean="0"/>
-              <a:t>15</a:t>
+              <a:t>20</a:t>
             </a:fld>
             <a:endParaRPr lang="en-US" dirty="0"/>
           </a:p>
@@ -1329,7 +1342,7 @@
           <a:p>
             <a:fld id="{0998D5BB-B127-481F-BC0A-2F77C576BB34}" type="slidenum">
               <a:rPr lang="en-US" smtClean="0"/>
-              <a:t>16</a:t>
+              <a:t>21</a:t>
             </a:fld>
             <a:endParaRPr lang="en-US" dirty="0"/>
           </a:p>
@@ -1413,7 +1426,7 @@
           <a:p>
             <a:fld id="{0998D5BB-B127-481F-BC0A-2F77C576BB34}" type="slidenum">
               <a:rPr lang="en-US" smtClean="0"/>
-              <a:t>17</a:t>
+              <a:t>23</a:t>
             </a:fld>
             <a:endParaRPr lang="en-US" dirty="0"/>
           </a:p>
@@ -1602,7 +1615,7 @@
           <a:p>
             <a:fld id="{0998D5BB-B127-481F-BC0A-2F77C576BB34}" type="slidenum">
               <a:rPr lang="en-US" smtClean="0"/>
-              <a:t>18</a:t>
+              <a:t>25</a:t>
             </a:fld>
             <a:endParaRPr lang="en-US" dirty="0"/>
           </a:p>
@@ -1697,7 +1710,7 @@
           <a:p>
             <a:fld id="{0998D5BB-B127-481F-BC0A-2F77C576BB34}" type="slidenum">
               <a:rPr lang="en-US" smtClean="0"/>
-              <a:t>19</a:t>
+              <a:t>27</a:t>
             </a:fld>
             <a:endParaRPr lang="en-US" dirty="0"/>
           </a:p>
@@ -1781,7 +1794,7 @@
           <a:p>
             <a:fld id="{0998D5BB-B127-481F-BC0A-2F77C576BB34}" type="slidenum">
               <a:rPr lang="en-US" smtClean="0"/>
-              <a:t>2</a:t>
+              <a:t>3</a:t>
             </a:fld>
             <a:endParaRPr lang="en-US" dirty="0"/>
           </a:p>
@@ -1868,7 +1881,7 @@
           <a:p>
             <a:fld id="{0998D5BB-B127-481F-BC0A-2F77C576BB34}" type="slidenum">
               <a:rPr lang="en-US" smtClean="0"/>
-              <a:t>20</a:t>
+              <a:t>29</a:t>
             </a:fld>
             <a:endParaRPr lang="en-US" dirty="0"/>
           </a:p>
@@ -2224,7 +2237,7 @@
           <a:p>
             <a:fld id="{0998D5BB-B127-481F-BC0A-2F77C576BB34}" type="slidenum">
               <a:rPr lang="en-US" smtClean="0"/>
-              <a:t>21</a:t>
+              <a:t>31</a:t>
             </a:fld>
             <a:endParaRPr lang="en-US" dirty="0"/>
           </a:p>
@@ -2601,7 +2614,7 @@
           <a:p>
             <a:fld id="{0998D5BB-B127-481F-BC0A-2F77C576BB34}" type="slidenum">
               <a:rPr lang="en-US" smtClean="0"/>
-              <a:t>22</a:t>
+              <a:t>32</a:t>
             </a:fld>
             <a:endParaRPr lang="en-US" dirty="0"/>
           </a:p>
@@ -3043,7 +3056,7 @@
           <a:p>
             <a:fld id="{0998D5BB-B127-481F-BC0A-2F77C576BB34}" type="slidenum">
               <a:rPr lang="en-US" smtClean="0"/>
-              <a:t>23</a:t>
+              <a:t>33</a:t>
             </a:fld>
             <a:endParaRPr lang="en-US" dirty="0"/>
           </a:p>
@@ -3659,7 +3672,7 @@
           <a:p>
             <a:fld id="{0998D5BB-B127-481F-BC0A-2F77C576BB34}" type="slidenum">
               <a:rPr lang="en-US" smtClean="0"/>
-              <a:t>24</a:t>
+              <a:t>34</a:t>
             </a:fld>
             <a:endParaRPr lang="en-US" dirty="0"/>
           </a:p>
@@ -4029,7 +4042,7 @@
           <a:p>
             <a:fld id="{0998D5BB-B127-481F-BC0A-2F77C576BB34}" type="slidenum">
               <a:rPr lang="en-US" smtClean="0"/>
-              <a:t>25</a:t>
+              <a:t>35</a:t>
             </a:fld>
             <a:endParaRPr lang="en-US" dirty="0"/>
           </a:p>
@@ -4260,7 +4273,7 @@
           <a:p>
             <a:fld id="{0998D5BB-B127-481F-BC0A-2F77C576BB34}" type="slidenum">
               <a:rPr lang="en-US" smtClean="0"/>
-              <a:t>26</a:t>
+              <a:t>36</a:t>
             </a:fld>
             <a:endParaRPr lang="en-US" dirty="0"/>
           </a:p>
@@ -4358,6 +4371,31 @@
                 <a:ea typeface="+mn-ea"/>
                 <a:cs typeface="+mn-cs"/>
               </a:rPr>
+              <a:t>We can separate marketing workloads from say the finance workloads using workload management. </a:t>
+            </a:r>
+          </a:p>
+          <a:p>
+            <a:endParaRPr lang="en-US" sz="1200" b="0" i="0" u="none" strike="noStrike" kern="1200" dirty="0">
+              <a:solidFill>
+                <a:schemeClr val="tx1"/>
+              </a:solidFill>
+              <a:effectLst/>
+              <a:latin typeface="+mn-lt"/>
+              <a:ea typeface="+mn-ea"/>
+              <a:cs typeface="+mn-cs"/>
+            </a:endParaRPr>
+          </a:p>
+          <a:p>
+            <a:r>
+              <a:rPr lang="en-US" sz="1200" b="0" i="0" u="none" strike="noStrike" kern="1200" dirty="0">
+                <a:solidFill>
+                  <a:schemeClr val="tx1"/>
+                </a:solidFill>
+                <a:effectLst/>
+                <a:latin typeface="+mn-lt"/>
+                <a:ea typeface="+mn-ea"/>
+                <a:cs typeface="+mn-cs"/>
+              </a:rPr>
               <a:t>WWI should configure Workload Management in Azure Synapse Analytics which serves to prevent this situation.</a:t>
             </a:r>
           </a:p>
@@ -4467,6 +4505,52 @@
               <a:ea typeface="+mn-ea"/>
               <a:cs typeface="+mn-cs"/>
             </a:endParaRPr>
+          </a:p>
+          <a:p>
+            <a:pPr marL="0" marR="0" lvl="0" indent="0" algn="l" defTabSz="914400" rtl="0" eaLnBrk="1" fontAlgn="auto" latinLnBrk="0" hangingPunct="1">
+              <a:lnSpc>
+                <a:spcPct val="100000"/>
+              </a:lnSpc>
+              <a:spcBef>
+                <a:spcPts val="0"/>
+              </a:spcBef>
+              <a:spcAft>
+                <a:spcPts val="0"/>
+              </a:spcAft>
+              <a:buClrTx/>
+              <a:buSzTx/>
+              <a:buFontTx/>
+              <a:buNone/>
+              <a:tabLst/>
+              <a:defRPr/>
+            </a:pPr>
+            <a:r>
+              <a:rPr lang="en-US" sz="1200" b="0" i="0" u="none" strike="noStrike" kern="1200" dirty="0">
+                <a:solidFill>
+                  <a:schemeClr val="tx1"/>
+                </a:solidFill>
+                <a:effectLst/>
+                <a:latin typeface="+mn-lt"/>
+                <a:ea typeface="+mn-ea"/>
+                <a:cs typeface="+mn-cs"/>
+              </a:rPr>
+              <a:t>If workload management does not suffice, note that online scaling (which allows you to increase the cluster size without incurring downtime) and multi-cluster (which allows you to have several different clusters supporting a single data warehouse) are features that are coming soon.</a:t>
+            </a:r>
+          </a:p>
+          <a:p>
+            <a:pPr lvl="0"/>
+            <a:r>
+              <a:rPr lang="en-US" sz="1200" b="0" i="0" u="none" strike="noStrike" kern="1200" dirty="0">
+                <a:solidFill>
+                  <a:schemeClr val="tx1"/>
+                </a:solidFill>
+                <a:effectLst/>
+                <a:latin typeface="+mn-lt"/>
+                <a:ea typeface="+mn-ea"/>
+                <a:cs typeface="+mn-cs"/>
+              </a:rPr>
+              <a:t>		</a:t>
+            </a:r>
           </a:p>
           <a:p>
             <a:r>
@@ -4632,7 +4716,7 @@
           <a:p>
             <a:fld id="{0998D5BB-B127-481F-BC0A-2F77C576BB34}" type="slidenum">
               <a:rPr lang="en-US" smtClean="0"/>
-              <a:t>27</a:t>
+              <a:t>37</a:t>
             </a:fld>
             <a:endParaRPr lang="en-US" dirty="0"/>
           </a:p>
@@ -4897,7 +4981,7 @@
           <a:p>
             <a:fld id="{0998D5BB-B127-481F-BC0A-2F77C576BB34}" type="slidenum">
               <a:rPr lang="en-US" smtClean="0"/>
-              <a:t>28</a:t>
+              <a:t>38</a:t>
             </a:fld>
             <a:endParaRPr lang="en-US" dirty="0"/>
           </a:p>
@@ -5620,7 +5704,7 @@
           <a:p>
             <a:fld id="{0998D5BB-B127-481F-BC0A-2F77C576BB34}" type="slidenum">
               <a:rPr lang="en-US" smtClean="0"/>
-              <a:t>29</a:t>
+              <a:t>39</a:t>
             </a:fld>
             <a:endParaRPr lang="en-US" dirty="0"/>
           </a:p>
@@ -5704,7 +5788,7 @@
           <a:p>
             <a:fld id="{0998D5BB-B127-481F-BC0A-2F77C576BB34}" type="slidenum">
               <a:rPr lang="en-US" smtClean="0"/>
-              <a:t>3</a:t>
+              <a:t>4</a:t>
             </a:fld>
             <a:endParaRPr lang="en-US" dirty="0"/>
           </a:p>
@@ -6042,7 +6126,7 @@
           <a:p>
             <a:fld id="{0998D5BB-B127-481F-BC0A-2F77C576BB34}" type="slidenum">
               <a:rPr lang="en-US" smtClean="0"/>
-              <a:t>30</a:t>
+              <a:t>40</a:t>
             </a:fld>
             <a:endParaRPr lang="en-US" dirty="0"/>
           </a:p>
@@ -6246,7 +6330,7 @@
           <a:p>
             <a:fld id="{0998D5BB-B127-481F-BC0A-2F77C576BB34}" type="slidenum">
               <a:rPr lang="en-US" smtClean="0"/>
-              <a:t>31</a:t>
+              <a:t>42</a:t>
             </a:fld>
             <a:endParaRPr lang="en-US" dirty="0"/>
           </a:p>
@@ -6491,7 +6575,7 @@
           <a:p>
             <a:fld id="{0998D5BB-B127-481F-BC0A-2F77C576BB34}" type="slidenum">
               <a:rPr lang="en-US" smtClean="0"/>
-              <a:t>32</a:t>
+              <a:t>43</a:t>
             </a:fld>
             <a:endParaRPr lang="en-US" dirty="0"/>
           </a:p>
@@ -6672,7 +6756,7 @@
           <a:p>
             <a:fld id="{0998D5BB-B127-481F-BC0A-2F77C576BB34}" type="slidenum">
               <a:rPr lang="en-US" smtClean="0"/>
-              <a:t>33</a:t>
+              <a:t>44</a:t>
             </a:fld>
             <a:endParaRPr lang="en-US" dirty="0"/>
           </a:p>
@@ -6735,7 +6819,15 @@
           <a:bodyPr/>
           <a:lstStyle/>
           <a:p>
-            <a:endParaRPr lang="en-US" dirty="0"/>
+            <a:endParaRPr lang="en-US" sz="1200" b="0" i="0" u="none" strike="noStrike" kern="1200" dirty="0">
+              <a:solidFill>
+                <a:schemeClr val="tx1"/>
+              </a:solidFill>
+              <a:effectLst/>
+              <a:latin typeface="+mn-lt"/>
+              <a:ea typeface="+mn-ea"/>
+              <a:cs typeface="+mn-cs"/>
+            </a:endParaRPr>
           </a:p>
         </p:txBody>
       </p:sp>
@@ -6756,7 +6848,91 @@
           <a:p>
             <a:fld id="{0998D5BB-B127-481F-BC0A-2F77C576BB34}" type="slidenum">
               <a:rPr lang="en-US" smtClean="0"/>
-              <a:t>34</a:t>
+              <a:t>45</a:t>
+            </a:fld>
+            <a:endParaRPr lang="en-US" dirty="0"/>
+          </a:p>
+        </p:txBody>
+      </p:sp>
+    </p:spTree>
+    <p:extLst>
+      <p:ext uri="{BB962C8B-B14F-4D97-AF65-F5344CB8AC3E}">
+        <p14:creationId xmlns:p14="http://schemas.microsoft.com/office/powerpoint/2010/main" val="1184667087"/>
+      </p:ext>
+    </p:extLst>
+  </p:cSld>
+  <p:clrMapOvr>
+    <a:masterClrMapping/>
+  </p:clrMapOvr>
+</p:notes>
+</file>
+
+<file path=ppt/notesSlides/notesSlide35.xml><?xml version="1.0" encoding="utf-8"?>
+<p:notes xmlns:a="http://schemas.openxmlformats.org/drawingml/2006/main" xmlns:r="http://schemas.openxmlformats.org/officeDocument/2006/relationships" xmlns:p="http://schemas.openxmlformats.org/presentationml/2006/main">
+  <p:cSld>
+    <p:spTree>
+      <p:nvGrpSpPr>
+        <p:cNvPr id="1" name=""/>
+        <p:cNvGrpSpPr/>
+        <p:nvPr/>
+      </p:nvGrpSpPr>
+      <p:grpSpPr>
+        <a:xfrm>
+          <a:off x="0" y="0"/>
+          <a:ext cx="0" cy="0"/>
+          <a:chOff x="0" y="0"/>
+          <a:chExt cx="0" cy="0"/>
+        </a:xfrm>
+      </p:grpSpPr>
+      <p:sp>
+        <p:nvSpPr>
+          <p:cNvPr id="2" name="Slide Image Placeholder 1"/>
+          <p:cNvSpPr>
+            <a:spLocks noGrp="1" noRot="1" noChangeAspect="1"/>
+          </p:cNvSpPr>
+          <p:nvPr>
+            <p:ph type="sldImg"/>
+          </p:nvPr>
+        </p:nvSpPr>
+        <p:spPr/>
+      </p:sp>
+      <p:sp>
+        <p:nvSpPr>
+          <p:cNvPr id="3" name="Notes Placeholder 2"/>
+          <p:cNvSpPr>
+            <a:spLocks noGrp="1"/>
+          </p:cNvSpPr>
+          <p:nvPr>
+            <p:ph type="body" idx="1"/>
+          </p:nvPr>
+        </p:nvSpPr>
+        <p:spPr/>
+        <p:txBody>
+          <a:bodyPr/>
+          <a:lstStyle/>
+          <a:p>
+            <a:endParaRPr lang="en-US" dirty="0"/>
+          </a:p>
+        </p:txBody>
+      </p:sp>
+      <p:sp>
+        <p:nvSpPr>
+          <p:cNvPr id="4" name="Slide Number Placeholder 3"/>
+          <p:cNvSpPr>
+            <a:spLocks noGrp="1"/>
+          </p:cNvSpPr>
+          <p:nvPr>
+            <p:ph type="sldNum" sz="quarter" idx="10"/>
+          </p:nvPr>
+        </p:nvSpPr>
+        <p:spPr/>
+        <p:txBody>
+          <a:bodyPr/>
+          <a:lstStyle/>
+          <a:p>
+            <a:fld id="{0998D5BB-B127-481F-BC0A-2F77C576BB34}" type="slidenum">
+              <a:rPr lang="en-US" smtClean="0"/>
+              <a:t>47</a:t>
             </a:fld>
             <a:endParaRPr lang="en-US" dirty="0"/>
           </a:p>
@@ -6775,7 +6951,7 @@
 </p:notes>
 </file>
 
-<file path=ppt/notesSlides/notesSlide35.xml><?xml version="1.0" encoding="utf-8"?>
+<file path=ppt/notesSlides/notesSlide36.xml><?xml version="1.0" encoding="utf-8"?>
 <p:notes xmlns:a="http://schemas.openxmlformats.org/drawingml/2006/main" xmlns:r="http://schemas.openxmlformats.org/officeDocument/2006/relationships" xmlns:p="http://schemas.openxmlformats.org/presentationml/2006/main">
   <p:cSld>
     <p:spTree>
@@ -6882,7 +7058,7 @@
                   <a:prstClr val="black"/>
                 </a:solidFill>
               </a:rPr>
-              <a:t>4/16/2020 11:24 AM</a:t>
+              <a:t>4/17/2020 7:06 AM</a:t>
             </a:fld>
             <a:endParaRPr lang="en-US" dirty="0">
               <a:solidFill>
@@ -6914,7 +7090,7 @@
                 </a:solidFill>
               </a:rPr>
               <a:pPr/>
-              <a:t>35</a:t>
+              <a:t>48</a:t>
             </a:fld>
             <a:endParaRPr lang="en-US" dirty="0">
               <a:solidFill>
@@ -7154,7 +7330,7 @@
           <a:p>
             <a:fld id="{0998D5BB-B127-481F-BC0A-2F77C576BB34}" type="slidenum">
               <a:rPr lang="en-US" smtClean="0"/>
-              <a:t>4</a:t>
+              <a:t>6</a:t>
             </a:fld>
             <a:endParaRPr lang="en-US" dirty="0"/>
           </a:p>
@@ -7263,7 +7439,7 @@
           <a:p>
             <a:fld id="{0998D5BB-B127-481F-BC0A-2F77C576BB34}" type="slidenum">
               <a:rPr lang="en-US" smtClean="0"/>
-              <a:t>5</a:t>
+              <a:t>7</a:t>
             </a:fld>
             <a:endParaRPr lang="en-US" dirty="0"/>
           </a:p>
@@ -7378,7 +7554,7 @@
           <a:p>
             <a:fld id="{0998D5BB-B127-481F-BC0A-2F77C576BB34}" type="slidenum">
               <a:rPr lang="en-US" smtClean="0"/>
-              <a:t>6</a:t>
+              <a:t>8</a:t>
             </a:fld>
             <a:endParaRPr lang="en-US" dirty="0"/>
           </a:p>
@@ -7501,7 +7677,7 @@
           <a:p>
             <a:fld id="{0998D5BB-B127-481F-BC0A-2F77C576BB34}" type="slidenum">
               <a:rPr lang="en-US" smtClean="0"/>
-              <a:t>7</a:t>
+              <a:t>9</a:t>
             </a:fld>
             <a:endParaRPr lang="en-US" dirty="0"/>
           </a:p>
@@ -7616,7 +7792,7 @@
           <a:p>
             <a:fld id="{0998D5BB-B127-481F-BC0A-2F77C576BB34}" type="slidenum">
               <a:rPr lang="en-US" smtClean="0"/>
-              <a:t>8</a:t>
+              <a:t>10</a:t>
             </a:fld>
             <a:endParaRPr lang="en-US" dirty="0"/>
           </a:p>
@@ -7811,7 +7987,7 @@
           <a:p>
             <a:fld id="{0998D5BB-B127-481F-BC0A-2F77C576BB34}" type="slidenum">
               <a:rPr lang="en-US" smtClean="0"/>
-              <a:t>9</a:t>
+              <a:t>12</a:t>
             </a:fld>
             <a:endParaRPr lang="en-US" dirty="0"/>
           </a:p>
@@ -19976,6 +20152,229 @@
       </p:grpSpPr>
       <p:sp>
         <p:nvSpPr>
+          <p:cNvPr id="3" name="Title 2">
+            <a:extLst>
+              <a:ext uri="{FF2B5EF4-FFF2-40B4-BE49-F238E27FC236}">
+                <a16:creationId xmlns:a16="http://schemas.microsoft.com/office/drawing/2014/main" id="{4D984DA0-6E05-4483-9781-6661D38DA8DA}"/>
+              </a:ext>
+            </a:extLst>
+          </p:cNvPr>
+          <p:cNvSpPr>
+            <a:spLocks noGrp="1"/>
+          </p:cNvSpPr>
+          <p:nvPr>
+            <p:ph type="title"/>
+          </p:nvPr>
+        </p:nvSpPr>
+        <p:spPr/>
+        <p:txBody>
+          <a:bodyPr/>
+          <a:lstStyle/>
+          <a:p>
+            <a:r>
+              <a:rPr lang="en-US" dirty="0"/>
+              <a:t>Customer Situation - 5</a:t>
+            </a:r>
+          </a:p>
+        </p:txBody>
+      </p:sp>
+      <p:sp>
+        <p:nvSpPr>
+          <p:cNvPr id="2" name="Text Placeholder 1">
+            <a:extLst>
+              <a:ext uri="{FF2B5EF4-FFF2-40B4-BE49-F238E27FC236}">
+                <a16:creationId xmlns:a16="http://schemas.microsoft.com/office/drawing/2014/main" id="{70014F08-7FD5-45F1-B973-F4EB12097E59}"/>
+              </a:ext>
+            </a:extLst>
+          </p:cNvPr>
+          <p:cNvSpPr>
+            <a:spLocks noGrp="1"/>
+          </p:cNvSpPr>
+          <p:nvPr>
+            <p:ph type="body" sz="quarter" idx="10"/>
+          </p:nvPr>
+        </p:nvSpPr>
+        <p:spPr>
+          <a:xfrm>
+            <a:off x="269240" y="1189177"/>
+            <a:ext cx="10398760" cy="3225498"/>
+          </a:xfrm>
+        </p:spPr>
+        <p:txBody>
+          <a:bodyPr/>
+          <a:lstStyle/>
+          <a:p>
+            <a:pPr>
+              <a:lnSpc>
+                <a:spcPct val="100000"/>
+              </a:lnSpc>
+            </a:pPr>
+            <a:r>
+              <a:rPr lang="en-US" sz="2800" dirty="0"/>
+              <a:t>To bring their entire operation into perspective, WWI would like to create a dashboard where they can see their KPIs derived from historical data, and near real-time data streams. </a:t>
+            </a:r>
+          </a:p>
+          <a:p>
+            <a:pPr>
+              <a:lnSpc>
+                <a:spcPct val="100000"/>
+              </a:lnSpc>
+            </a:pPr>
+            <a:endParaRPr lang="en-US" sz="1600" dirty="0"/>
+          </a:p>
+          <a:p>
+            <a:pPr>
+              <a:lnSpc>
+                <a:spcPct val="100000"/>
+              </a:lnSpc>
+            </a:pPr>
+            <a:r>
+              <a:rPr lang="en-US" sz="2800" dirty="0"/>
+              <a:t>They want to make up to the minute key product recommendations generated with the help of machine learning models.</a:t>
+            </a:r>
+          </a:p>
+        </p:txBody>
+      </p:sp>
+      <p:pic>
+        <p:nvPicPr>
+          <p:cNvPr id="7" name="Graphic 6" descr="Statistics icon">
+            <a:extLst>
+              <a:ext uri="{FF2B5EF4-FFF2-40B4-BE49-F238E27FC236}">
+                <a16:creationId xmlns:a16="http://schemas.microsoft.com/office/drawing/2014/main" id="{5340270E-0CC4-4292-AE42-BD0C77209714}"/>
+              </a:ext>
+            </a:extLst>
+          </p:cNvPr>
+          <p:cNvPicPr>
+            <a:picLocks noChangeAspect="1"/>
+          </p:cNvPicPr>
+          <p:nvPr/>
+        </p:nvPicPr>
+        <p:blipFill>
+          <a:blip r:embed="rId3">
+            <a:extLst>
+              <a:ext uri="{28A0092B-C50C-407E-A947-70E740481C1C}">
+                <a14:useLocalDpi xmlns:a14="http://schemas.microsoft.com/office/drawing/2010/main" val="0"/>
+              </a:ext>
+              <a:ext uri="{96DAC541-7B7A-43D3-8B79-37D633B846F1}">
+                <asvg:svgBlip xmlns:asvg="http://schemas.microsoft.com/office/drawing/2016/SVG/main" r:embed="rId4"/>
+              </a:ext>
+            </a:extLst>
+          </a:blip>
+          <a:stretch>
+            <a:fillRect/>
+          </a:stretch>
+        </p:blipFill>
+        <p:spPr>
+          <a:xfrm>
+            <a:off x="9582912" y="4336000"/>
+            <a:ext cx="2342168" cy="2342168"/>
+          </a:xfrm>
+          <a:prstGeom prst="rect">
+            <a:avLst/>
+          </a:prstGeom>
+        </p:spPr>
+      </p:pic>
+    </p:spTree>
+    <p:extLst>
+      <p:ext uri="{BB962C8B-B14F-4D97-AF65-F5344CB8AC3E}">
+        <p14:creationId xmlns:p14="http://schemas.microsoft.com/office/powerpoint/2010/main" val="2732402372"/>
+      </p:ext>
+    </p:extLst>
+  </p:cSld>
+  <p:clrMapOvr>
+    <a:masterClrMapping/>
+  </p:clrMapOvr>
+  <p:transition>
+    <p:fade/>
+  </p:transition>
+</p:sld>
+</file>
+
+<file path=ppt/slides/slide11.xml><?xml version="1.0" encoding="utf-8"?>
+<p:sld xmlns:a="http://schemas.openxmlformats.org/drawingml/2006/main" xmlns:r="http://schemas.openxmlformats.org/officeDocument/2006/relationships" xmlns:p="http://schemas.openxmlformats.org/presentationml/2006/main" show="0">
+  <p:cSld>
+    <p:spTree>
+      <p:nvGrpSpPr>
+        <p:cNvPr id="1" name=""/>
+        <p:cNvGrpSpPr/>
+        <p:nvPr/>
+      </p:nvGrpSpPr>
+      <p:grpSpPr>
+        <a:xfrm>
+          <a:off x="0" y="0"/>
+          <a:ext cx="0" cy="0"/>
+          <a:chOff x="0" y="0"/>
+          <a:chExt cx="0" cy="0"/>
+        </a:xfrm>
+      </p:grpSpPr>
+      <p:sp>
+        <p:nvSpPr>
+          <p:cNvPr id="4" name="Title 3">
+            <a:extLst>
+              <a:ext uri="{FF2B5EF4-FFF2-40B4-BE49-F238E27FC236}">
+                <a16:creationId xmlns:a16="http://schemas.microsoft.com/office/drawing/2014/main" id="{76B4D6BB-F715-4317-9F82-5CB9D45871F2}"/>
+              </a:ext>
+            </a:extLst>
+          </p:cNvPr>
+          <p:cNvSpPr>
+            <a:spLocks noGrp="1"/>
+          </p:cNvSpPr>
+          <p:nvPr>
+            <p:ph type="title"/>
+          </p:nvPr>
+        </p:nvSpPr>
+        <p:spPr>
+          <a:xfrm>
+            <a:off x="268080" y="2681775"/>
+            <a:ext cx="11655840" cy="899665"/>
+          </a:xfrm>
+        </p:spPr>
+        <p:txBody>
+          <a:bodyPr/>
+          <a:lstStyle/>
+          <a:p>
+            <a:r>
+              <a:rPr lang="en-US" dirty="0"/>
+              <a:t>What are some of their specific needs?</a:t>
+            </a:r>
+          </a:p>
+        </p:txBody>
+      </p:sp>
+    </p:spTree>
+    <p:extLst>
+      <p:ext uri="{BB962C8B-B14F-4D97-AF65-F5344CB8AC3E}">
+        <p14:creationId xmlns:p14="http://schemas.microsoft.com/office/powerpoint/2010/main" val="2239872014"/>
+      </p:ext>
+    </p:extLst>
+  </p:cSld>
+  <p:clrMapOvr>
+    <a:masterClrMapping/>
+  </p:clrMapOvr>
+  <p:transition>
+    <p:fade/>
+  </p:transition>
+</p:sld>
+</file>
+
+<file path=ppt/slides/slide12.xml><?xml version="1.0" encoding="utf-8"?>
+<p:sld xmlns:a="http://schemas.openxmlformats.org/drawingml/2006/main" xmlns:r="http://schemas.openxmlformats.org/officeDocument/2006/relationships" xmlns:p="http://schemas.openxmlformats.org/presentationml/2006/main">
+  <p:cSld>
+    <p:spTree>
+      <p:nvGrpSpPr>
+        <p:cNvPr id="1" name=""/>
+        <p:cNvGrpSpPr/>
+        <p:nvPr/>
+      </p:nvGrpSpPr>
+      <p:grpSpPr>
+        <a:xfrm>
+          <a:off x="0" y="0"/>
+          <a:ext cx="0" cy="0"/>
+          <a:chOff x="0" y="0"/>
+          <a:chExt cx="0" cy="0"/>
+        </a:xfrm>
+      </p:grpSpPr>
+      <p:sp>
+        <p:nvSpPr>
           <p:cNvPr id="2" name="Title 1"/>
           <p:cNvSpPr>
             <a:spLocks noGrp="1"/>
@@ -19998,7 +20397,7 @@
                 </a:solidFill>
                 <a:cs typeface="Segoe UI" panose="020B0502040204020203" pitchFamily="34" charset="0"/>
               </a:rPr>
-              <a:t>Customer needs - 2</a:t>
+              <a:t>Customer needs</a:t>
             </a:r>
             <a:br>
               <a:rPr lang="en-US" dirty="0">
@@ -20049,6 +20448,187 @@
                 <a:solidFill>
                   <a:schemeClr val="tx1"/>
                 </a:solidFill>
+              </a:rPr>
+              <a:t>G</a:t>
+            </a:r>
+            <a:r>
+              <a:rPr lang="en-US" sz="2800" dirty="0">
+                <a:solidFill>
+                  <a:schemeClr val="tx1"/>
+                </a:solidFill>
+                <a:latin typeface="+mj-lt"/>
+              </a:rPr>
+              <a:t>ain business insights using a combination of historical, real-time, and predictive analysis.</a:t>
+            </a:r>
+          </a:p>
+          <a:p>
+            <a:pPr>
+              <a:lnSpc>
+                <a:spcPct val="100000"/>
+              </a:lnSpc>
+            </a:pPr>
+            <a:r>
+              <a:rPr lang="en-US" sz="2800" dirty="0">
+                <a:solidFill>
+                  <a:schemeClr val="tx1"/>
+                </a:solidFill>
+                <a:cs typeface="Segoe UI Semilight" panose="020B0402040204020203" pitchFamily="34" charset="0"/>
+              </a:rPr>
+              <a:t>Have a unified approach to handling structured and unstructured data sources.</a:t>
+            </a:r>
+          </a:p>
+          <a:p>
+            <a:pPr>
+              <a:lnSpc>
+                <a:spcPct val="100000"/>
+              </a:lnSpc>
+            </a:pPr>
+            <a:r>
+              <a:rPr lang="en-US" sz="2800" dirty="0">
+                <a:solidFill>
+                  <a:schemeClr val="tx1"/>
+                </a:solidFill>
+                <a:cs typeface="Segoe UI Semilight" panose="020B0402040204020203" pitchFamily="34" charset="0"/>
+              </a:rPr>
+              <a:t>Enable data engineers and data scientists with the ability to run complex queries over petabytes of structured and unstructured enterprise operational data.</a:t>
+            </a:r>
+          </a:p>
+          <a:p>
+            <a:pPr>
+              <a:lnSpc>
+                <a:spcPct val="100000"/>
+              </a:lnSpc>
+            </a:pPr>
+            <a:r>
+              <a:rPr lang="en-US" sz="2800" dirty="0">
+                <a:solidFill>
+                  <a:schemeClr val="tx1"/>
+                </a:solidFill>
+                <a:cs typeface="Segoe UI Semilight" panose="020B0402040204020203" pitchFamily="34" charset="0"/>
+              </a:rPr>
+              <a:t>Enable business analysts and data science/data engineering teams to share a single source of truth.</a:t>
+            </a:r>
+            <a:endParaRPr lang="en-US" sz="2800" dirty="0">
+              <a:solidFill>
+                <a:schemeClr val="tx1"/>
+              </a:solidFill>
+            </a:endParaRPr>
+          </a:p>
+        </p:txBody>
+      </p:sp>
+    </p:spTree>
+    <p:extLst>
+      <p:ext uri="{BB962C8B-B14F-4D97-AF65-F5344CB8AC3E}">
+        <p14:creationId xmlns:p14="http://schemas.microsoft.com/office/powerpoint/2010/main" val="3923265977"/>
+      </p:ext>
+    </p:extLst>
+  </p:cSld>
+  <p:clrMapOvr>
+    <a:masterClrMapping/>
+  </p:clrMapOvr>
+  <mc:AlternateContent xmlns:mc="http://schemas.openxmlformats.org/markup-compatibility/2006" xmlns:p14="http://schemas.microsoft.com/office/powerpoint/2010/main">
+    <mc:Choice Requires="p14">
+      <p:transition p14:dur="0"/>
+    </mc:Choice>
+    <mc:Fallback xmlns="">
+      <p:transition/>
+    </mc:Fallback>
+  </mc:AlternateContent>
+</p:sld>
+</file>
+
+<file path=ppt/slides/slide13.xml><?xml version="1.0" encoding="utf-8"?>
+<p:sld xmlns:a="http://schemas.openxmlformats.org/drawingml/2006/main" xmlns:r="http://schemas.openxmlformats.org/officeDocument/2006/relationships" xmlns:p="http://schemas.openxmlformats.org/presentationml/2006/main">
+  <p:cSld>
+    <p:spTree>
+      <p:nvGrpSpPr>
+        <p:cNvPr id="1" name=""/>
+        <p:cNvGrpSpPr/>
+        <p:nvPr/>
+      </p:nvGrpSpPr>
+      <p:grpSpPr>
+        <a:xfrm>
+          <a:off x="0" y="0"/>
+          <a:ext cx="0" cy="0"/>
+          <a:chOff x="0" y="0"/>
+          <a:chExt cx="0" cy="0"/>
+        </a:xfrm>
+      </p:grpSpPr>
+      <p:sp>
+        <p:nvSpPr>
+          <p:cNvPr id="2" name="Title 1"/>
+          <p:cNvSpPr>
+            <a:spLocks noGrp="1"/>
+          </p:cNvSpPr>
+          <p:nvPr>
+            <p:ph type="title"/>
+          </p:nvPr>
+        </p:nvSpPr>
+        <p:spPr/>
+        <p:txBody>
+          <a:bodyPr>
+            <a:normAutofit fontScale="90000"/>
+          </a:bodyPr>
+          <a:lstStyle/>
+          <a:p>
+            <a:r>
+              <a:rPr lang="en-US" sz="4900" dirty="0">
+                <a:solidFill>
+                  <a:schemeClr val="tx1"/>
+                </a:solidFill>
+                <a:cs typeface="Segoe UI" panose="020B0502040204020203" pitchFamily="34" charset="0"/>
+              </a:rPr>
+              <a:t>Customer needs - 2</a:t>
+            </a:r>
+            <a:br>
+              <a:rPr lang="en-US" dirty="0">
+                <a:solidFill>
+                  <a:schemeClr val="tx1"/>
+                </a:solidFill>
+                <a:latin typeface="Segoe UI" panose="020B0502040204020203" pitchFamily="34" charset="0"/>
+              </a:rPr>
+            </a:br>
+            <a:endParaRPr lang="en-US" sz="3236" dirty="0">
+              <a:solidFill>
+                <a:schemeClr val="tx1"/>
+              </a:solidFill>
+              <a:latin typeface="Segoe UI" panose="020B0502040204020203" pitchFamily="34" charset="0"/>
+            </a:endParaRPr>
+          </a:p>
+        </p:txBody>
+      </p:sp>
+      <p:sp>
+        <p:nvSpPr>
+          <p:cNvPr id="3" name="Content Placeholder 2"/>
+          <p:cNvSpPr>
+            <a:spLocks noGrp="1"/>
+          </p:cNvSpPr>
+          <p:nvPr>
+            <p:ph type="body" sz="quarter" idx="10"/>
+          </p:nvPr>
+        </p:nvSpPr>
+        <p:spPr>
+          <a:xfrm>
+            <a:off x="269239" y="1189176"/>
+            <a:ext cx="11653523" cy="5165519"/>
+          </a:xfrm>
+        </p:spPr>
+        <p:txBody>
+          <a:bodyPr>
+            <a:normAutofit/>
+          </a:bodyPr>
+          <a:lstStyle/>
+          <a:p>
+            <a:pPr>
+              <a:lnSpc>
+                <a:spcPct val="100000"/>
+              </a:lnSpc>
+            </a:pPr>
+            <a:r>
+              <a:rPr lang="en-US" sz="2800" dirty="0">
+                <a:solidFill>
+                  <a:schemeClr val="tx1"/>
+                </a:solidFill>
                 <a:latin typeface="+mj-lt"/>
               </a:rPr>
               <a:t>Minimize the number of services used to ingest, transform, query and store data.</a:t>
@@ -20122,7 +20702,73 @@
 </p:sld>
 </file>
 
-<file path=ppt/slides/slide11.xml><?xml version="1.0" encoding="utf-8"?>
+<file path=ppt/slides/slide14.xml><?xml version="1.0" encoding="utf-8"?>
+<p:sld xmlns:a="http://schemas.openxmlformats.org/drawingml/2006/main" xmlns:r="http://schemas.openxmlformats.org/officeDocument/2006/relationships" xmlns:p="http://schemas.openxmlformats.org/presentationml/2006/main" show="0">
+  <p:cSld>
+    <p:spTree>
+      <p:nvGrpSpPr>
+        <p:cNvPr id="1" name=""/>
+        <p:cNvGrpSpPr/>
+        <p:nvPr/>
+      </p:nvGrpSpPr>
+      <p:grpSpPr>
+        <a:xfrm>
+          <a:off x="0" y="0"/>
+          <a:ext cx="0" cy="0"/>
+          <a:chOff x="0" y="0"/>
+          <a:chExt cx="0" cy="0"/>
+        </a:xfrm>
+      </p:grpSpPr>
+      <p:sp>
+        <p:nvSpPr>
+          <p:cNvPr id="4" name="Title 3">
+            <a:extLst>
+              <a:ext uri="{FF2B5EF4-FFF2-40B4-BE49-F238E27FC236}">
+                <a16:creationId xmlns:a16="http://schemas.microsoft.com/office/drawing/2014/main" id="{76B4D6BB-F715-4317-9F82-5CB9D45871F2}"/>
+              </a:ext>
+            </a:extLst>
+          </p:cNvPr>
+          <p:cNvSpPr>
+            <a:spLocks noGrp="1"/>
+          </p:cNvSpPr>
+          <p:nvPr>
+            <p:ph type="title"/>
+          </p:nvPr>
+        </p:nvSpPr>
+        <p:spPr>
+          <a:xfrm>
+            <a:off x="268080" y="2681775"/>
+            <a:ext cx="11655840" cy="899665"/>
+          </a:xfrm>
+        </p:spPr>
+        <p:txBody>
+          <a:bodyPr/>
+          <a:lstStyle/>
+          <a:p>
+            <a:r>
+              <a:rPr lang="en-US" dirty="0"/>
+              <a:t>Nabeel, did they raise any other objections or concerns?</a:t>
+            </a:r>
+          </a:p>
+        </p:txBody>
+      </p:sp>
+    </p:spTree>
+    <p:extLst>
+      <p:ext uri="{BB962C8B-B14F-4D97-AF65-F5344CB8AC3E}">
+        <p14:creationId xmlns:p14="http://schemas.microsoft.com/office/powerpoint/2010/main" val="3541415075"/>
+      </p:ext>
+    </p:extLst>
+  </p:cSld>
+  <p:clrMapOvr>
+    <a:masterClrMapping/>
+  </p:clrMapOvr>
+  <p:transition>
+    <p:fade/>
+  </p:transition>
+</p:sld>
+</file>
+
+<file path=ppt/slides/slide15.xml><?xml version="1.0" encoding="utf-8"?>
 <p:sld xmlns:a="http://schemas.openxmlformats.org/drawingml/2006/main" xmlns:r="http://schemas.openxmlformats.org/officeDocument/2006/relationships" xmlns:p="http://schemas.openxmlformats.org/presentationml/2006/main">
   <p:cSld>
     <p:spTree>
@@ -20302,7 +20948,7 @@
 </p:sld>
 </file>
 
-<file path=ppt/slides/slide12.xml><?xml version="1.0" encoding="utf-8"?>
+<file path=ppt/slides/slide16.xml><?xml version="1.0" encoding="utf-8"?>
 <p:sld xmlns:a="http://schemas.openxmlformats.org/drawingml/2006/main" xmlns:r="http://schemas.openxmlformats.org/officeDocument/2006/relationships" xmlns:p="http://schemas.openxmlformats.org/presentationml/2006/main">
   <p:cSld>
     <p:spTree>
@@ -20381,7 +21027,7 @@
         <p:spPr>
           <a:xfrm>
             <a:off x="269239" y="1189177"/>
-            <a:ext cx="11653523" cy="3804118"/>
+            <a:ext cx="11653523" cy="4752070"/>
           </a:xfrm>
         </p:spPr>
         <p:txBody>
@@ -20418,6 +21064,17 @@
             <a:r>
               <a:rPr lang="en-US" sz="2800" dirty="0"/>
               <a:t>Would data be protected at rest and are there controls over the keys used to encrypt it?</a:t>
+            </a:r>
+          </a:p>
+          <a:p>
+            <a:pPr>
+              <a:lnSpc>
+                <a:spcPct val="100000"/>
+              </a:lnSpc>
+            </a:pPr>
+            <a:r>
+              <a:rPr lang="en-US" sz="2800" dirty="0"/>
+              <a:t>Azure Databricks and Azure Synapse Analytics seem to have overlapping capabilities, how does one choose between them?</a:t>
             </a:r>
           </a:p>
         </p:txBody>
@@ -20443,7 +21100,73 @@
 </p:sld>
 </file>
 
-<file path=ppt/slides/slide13.xml><?xml version="1.0" encoding="utf-8"?>
+<file path=ppt/slides/slide17.xml><?xml version="1.0" encoding="utf-8"?>
+<p:sld xmlns:a="http://schemas.openxmlformats.org/drawingml/2006/main" xmlns:r="http://schemas.openxmlformats.org/officeDocument/2006/relationships" xmlns:p="http://schemas.openxmlformats.org/presentationml/2006/main" show="0">
+  <p:cSld>
+    <p:spTree>
+      <p:nvGrpSpPr>
+        <p:cNvPr id="1" name=""/>
+        <p:cNvGrpSpPr/>
+        <p:nvPr/>
+      </p:nvGrpSpPr>
+      <p:grpSpPr>
+        <a:xfrm>
+          <a:off x="0" y="0"/>
+          <a:ext cx="0" cy="0"/>
+          <a:chOff x="0" y="0"/>
+          <a:chExt cx="0" cy="0"/>
+        </a:xfrm>
+      </p:grpSpPr>
+      <p:sp>
+        <p:nvSpPr>
+          <p:cNvPr id="4" name="Title 3">
+            <a:extLst>
+              <a:ext uri="{FF2B5EF4-FFF2-40B4-BE49-F238E27FC236}">
+                <a16:creationId xmlns:a16="http://schemas.microsoft.com/office/drawing/2014/main" id="{76B4D6BB-F715-4317-9F82-5CB9D45871F2}"/>
+              </a:ext>
+            </a:extLst>
+          </p:cNvPr>
+          <p:cNvSpPr>
+            <a:spLocks noGrp="1"/>
+          </p:cNvSpPr>
+          <p:nvPr>
+            <p:ph type="title"/>
+          </p:nvPr>
+        </p:nvSpPr>
+        <p:spPr>
+          <a:xfrm>
+            <a:off x="268080" y="2681775"/>
+            <a:ext cx="11655840" cy="899665"/>
+          </a:xfrm>
+        </p:spPr>
+        <p:txBody>
+          <a:bodyPr/>
+          <a:lstStyle/>
+          <a:p>
+            <a:r>
+              <a:rPr lang="en-US" dirty="0"/>
+              <a:t>Zoiner, can you please give them a hint on how to approach this?</a:t>
+            </a:r>
+          </a:p>
+        </p:txBody>
+      </p:sp>
+    </p:spTree>
+    <p:extLst>
+      <p:ext uri="{BB962C8B-B14F-4D97-AF65-F5344CB8AC3E}">
+        <p14:creationId xmlns:p14="http://schemas.microsoft.com/office/powerpoint/2010/main" val="2137490362"/>
+      </p:ext>
+    </p:extLst>
+  </p:cSld>
+  <p:clrMapOvr>
+    <a:masterClrMapping/>
+  </p:clrMapOvr>
+  <p:transition>
+    <p:fade/>
+  </p:transition>
+</p:sld>
+</file>
+
+<file path=ppt/slides/slide18.xml><?xml version="1.0" encoding="utf-8"?>
 <p:sld xmlns:a="http://schemas.openxmlformats.org/drawingml/2006/main" xmlns:r="http://schemas.openxmlformats.org/officeDocument/2006/relationships" xmlns:p="http://schemas.openxmlformats.org/presentationml/2006/main">
   <p:cSld>
     <p:spTree>
@@ -20559,7 +21282,7 @@
 </p:sld>
 </file>
 
-<file path=ppt/slides/slide14.xml><?xml version="1.0" encoding="utf-8"?>
+<file path=ppt/slides/slide19.xml><?xml version="1.0" encoding="utf-8"?>
 <p:sld xmlns:a="http://schemas.openxmlformats.org/drawingml/2006/main" xmlns:r="http://schemas.openxmlformats.org/officeDocument/2006/relationships" xmlns:p="http://schemas.openxmlformats.org/presentationml/2006/main">
   <p:cSld>
     <p:spTree>
@@ -20668,7 +21391,20 @@
                 <a:latin typeface="Segoe UI Semilight" panose="020B0402040204020203" pitchFamily="34" charset="0"/>
                 <a:cs typeface="Segoe UI Semilight" panose="020B0402040204020203" pitchFamily="34" charset="0"/>
               </a:rPr>
-              <a:t>Design a solution and prepare to present the solution to the target customer audience in a 15-minute chalk-talk format. </a:t>
+              <a:t>Join your break out room using the Teams invites you received. </a:t>
+            </a:r>
+            <a:br>
+              <a:rPr lang="en-US" sz="2400" dirty="0">
+                <a:latin typeface="Segoe UI Semilight" panose="020B0402040204020203" pitchFamily="34" charset="0"/>
+                <a:cs typeface="Segoe UI Semilight" panose="020B0402040204020203" pitchFamily="34" charset="0"/>
+              </a:rPr>
+            </a:br>
+            <a:r>
+              <a:rPr lang="en-US" sz="2400" dirty="0">
+                <a:latin typeface="Segoe UI Semilight" panose="020B0402040204020203" pitchFamily="34" charset="0"/>
+                <a:cs typeface="Segoe UI Semilight" panose="020B0402040204020203" pitchFamily="34" charset="0"/>
+              </a:rPr>
+              <a:t>Design a solution in your break out room. </a:t>
             </a:r>
           </a:p>
           <a:p>
@@ -20732,14 +21468,14 @@
           <p:nvPr>
             <p:extLst>
               <p:ext uri="{D42A27DB-BD31-4B8C-83A1-F6EECF244321}">
-                <p14:modId xmlns:p14="http://schemas.microsoft.com/office/powerpoint/2010/main" val="2701882102"/>
+                <p14:modId xmlns:p14="http://schemas.microsoft.com/office/powerpoint/2010/main" val="360573115"/>
               </p:ext>
             </p:extLst>
           </p:nvPr>
         </p:nvGraphicFramePr>
         <p:xfrm>
-          <a:off x="3095545" y="3791921"/>
-          <a:ext cx="8040154" cy="2420452"/>
+          <a:off x="3234906" y="3791921"/>
+          <a:ext cx="7900793" cy="2420452"/>
         </p:xfrm>
         <a:graphic>
           <a:graphicData uri="http://schemas.openxmlformats.org/drawingml/2006/table">
@@ -20748,7 +21484,7 @@
                 <a:tableStyleId>{69CF1AB2-1976-4502-BF36-3FF5EA218861}</a:tableStyleId>
               </a:tblPr>
               <a:tblGrid>
-                <a:gridCol w="1758700">
+                <a:gridCol w="1619339">
                   <a:extLst>
                     <a:ext uri="{9D8B030D-6E8A-4147-A177-3AD203B41FA5}">
                       <a16:colId xmlns:a16="http://schemas.microsoft.com/office/drawing/2014/main" val="20000"/>
@@ -20840,7 +21576,7 @@
                           <a:latin typeface="Segoe UI" panose="020B0502040204020203" pitchFamily="34" charset="0"/>
                           <a:cs typeface="Segoe UI" panose="020B0502040204020203" pitchFamily="34" charset="0"/>
                         </a:rPr>
-                        <a:t>Respond to questions outlined in your guide and list the answers on a flipchart</a:t>
+                        <a:t>Respond to questions outlined in your guide and list the answers on a whiteboard</a:t>
                       </a:r>
                     </a:p>
                     <a:p>
@@ -20938,7 +21674,7 @@
                           <a:ea typeface="+mn-ea"/>
                           <a:cs typeface="Segoe UI" panose="020B0502040204020203" pitchFamily="34" charset="0"/>
                         </a:rPr>
-                        <a:t>Design a solution for as many of the stated requirements as time allows. Show the solution on a flipchart</a:t>
+                        <a:t>Design a solution for as many of the stated requirements as time allows. Show the solution on a whiteboard</a:t>
                       </a:r>
                     </a:p>
                     <a:p>
@@ -21062,7 +21798,7 @@
                           <a:latin typeface="Segoe UI" panose="020B0502040204020203" pitchFamily="34" charset="0"/>
                           <a:cs typeface="Segoe UI" panose="020B0502040204020203" pitchFamily="34" charset="0"/>
                         </a:rPr>
-                        <a:t>Prepare for a 15-minute presentation to the customer</a:t>
+                        <a:t>Prepare for a short presentation to the customer</a:t>
                       </a:r>
                       <a:br>
                         <a:rPr lang="en-US" sz="1300" dirty="0">
@@ -21109,7 +21845,73 @@
 </p:sld>
 </file>
 
-<file path=ppt/slides/slide15.xml><?xml version="1.0" encoding="utf-8"?>
+<file path=ppt/slides/slide2.xml><?xml version="1.0" encoding="utf-8"?>
+<p:sld xmlns:a="http://schemas.openxmlformats.org/drawingml/2006/main" xmlns:r="http://schemas.openxmlformats.org/officeDocument/2006/relationships" xmlns:p="http://schemas.openxmlformats.org/presentationml/2006/main" show="0">
+  <p:cSld>
+    <p:spTree>
+      <p:nvGrpSpPr>
+        <p:cNvPr id="1" name=""/>
+        <p:cNvGrpSpPr/>
+        <p:nvPr/>
+      </p:nvGrpSpPr>
+      <p:grpSpPr>
+        <a:xfrm>
+          <a:off x="0" y="0"/>
+          <a:ext cx="0" cy="0"/>
+          <a:chOff x="0" y="0"/>
+          <a:chExt cx="0" cy="0"/>
+        </a:xfrm>
+      </p:grpSpPr>
+      <p:sp>
+        <p:nvSpPr>
+          <p:cNvPr id="4" name="Title 3">
+            <a:extLst>
+              <a:ext uri="{FF2B5EF4-FFF2-40B4-BE49-F238E27FC236}">
+                <a16:creationId xmlns:a16="http://schemas.microsoft.com/office/drawing/2014/main" id="{76B4D6BB-F715-4317-9F82-5CB9D45871F2}"/>
+              </a:ext>
+            </a:extLst>
+          </p:cNvPr>
+          <p:cNvSpPr>
+            <a:spLocks noGrp="1"/>
+          </p:cNvSpPr>
+          <p:nvPr>
+            <p:ph type="title"/>
+          </p:nvPr>
+        </p:nvSpPr>
+        <p:spPr>
+          <a:xfrm>
+            <a:off x="268080" y="2681775"/>
+            <a:ext cx="11655840" cy="899665"/>
+          </a:xfrm>
+        </p:spPr>
+        <p:txBody>
+          <a:bodyPr/>
+          <a:lstStyle/>
+          <a:p>
+            <a:r>
+              <a:rPr lang="en-US" dirty="0"/>
+              <a:t>Can you please talk about the abstract and learning objectives?</a:t>
+            </a:r>
+          </a:p>
+        </p:txBody>
+      </p:sp>
+    </p:spTree>
+    <p:extLst>
+      <p:ext uri="{BB962C8B-B14F-4D97-AF65-F5344CB8AC3E}">
+        <p14:creationId xmlns:p14="http://schemas.microsoft.com/office/powerpoint/2010/main" val="599938125"/>
+      </p:ext>
+    </p:extLst>
+  </p:cSld>
+  <p:clrMapOvr>
+    <a:masterClrMapping/>
+  </p:clrMapOvr>
+  <p:transition>
+    <p:fade/>
+  </p:transition>
+</p:sld>
+</file>
+
+<file path=ppt/slides/slide20.xml><?xml version="1.0" encoding="utf-8"?>
 <p:sld xmlns:a="http://schemas.openxmlformats.org/drawingml/2006/main" xmlns:r="http://schemas.openxmlformats.org/officeDocument/2006/relationships" xmlns:p="http://schemas.openxmlformats.org/presentationml/2006/main">
   <p:cSld>
     <p:spTree>
@@ -21171,7 +21973,7 @@
         <p:spPr>
           <a:xfrm>
             <a:off x="340285" y="1062166"/>
-            <a:ext cx="10229103" cy="5838521"/>
+            <a:ext cx="10229103" cy="3416320"/>
           </a:xfrm>
           <a:prstGeom prst="rect">
             <a:avLst/>
@@ -21213,11 +22015,8 @@
                 <a:latin typeface="Segoe UI Semilight" panose="020B0402040204020203" pitchFamily="34" charset="0"/>
                 <a:cs typeface="Segoe UI Semilight" panose="020B0402040204020203" pitchFamily="34" charset="0"/>
               </a:rPr>
-              <a:t>Present a solution to the target customer in a 15-minute chalk-talk format. </a:t>
-            </a:r>
-            <a:endParaRPr lang="en-US" sz="3600" dirty="0">
-              <a:latin typeface="+mj-lt"/>
-            </a:endParaRPr>
+              <a:t>Present a solution to your customer (SME) in your break out room.</a:t>
+            </a:r>
           </a:p>
           <a:p>
             <a:pPr>
@@ -21262,7 +22061,7 @@
                 <a:latin typeface="Segoe UI Semilight" panose="020B0402040204020203" pitchFamily="34" charset="0"/>
                 <a:cs typeface="Segoe UI Semilight" panose="020B0402040204020203" pitchFamily="34" charset="0"/>
               </a:rPr>
-              <a:t>30 minutes (15 minutes for each team to present and receive feedback) </a:t>
+              <a:t>15 minutes</a:t>
             </a:r>
           </a:p>
           <a:p>
@@ -21276,104 +22075,6 @@
             </a:pPr>
             <a:endParaRPr lang="en-US" sz="2400" dirty="0">
               <a:latin typeface="+mj-lt"/>
-            </a:endParaRPr>
-          </a:p>
-          <a:p>
-            <a:pPr>
-              <a:lnSpc>
-                <a:spcPct val="90000"/>
-              </a:lnSpc>
-              <a:spcAft>
-                <a:spcPts val="600"/>
-              </a:spcAft>
-            </a:pPr>
-            <a:r>
-              <a:rPr lang="en-US" sz="3600" dirty="0">
-                <a:latin typeface="+mj-lt"/>
-              </a:rPr>
-              <a:t>Directions</a:t>
-            </a:r>
-          </a:p>
-          <a:p>
-            <a:pPr marL="342900" lvl="0" indent="-342900">
-              <a:buFont typeface="Arial" panose="020B0604020202020204" pitchFamily="34" charset="0"/>
-              <a:buChar char="•"/>
-            </a:pPr>
-            <a:r>
-              <a:rPr lang="en-US" sz="2000" dirty="0">
-                <a:latin typeface="Segoe UI Semilight" panose="020B0402040204020203" pitchFamily="34" charset="0"/>
-                <a:cs typeface="Segoe UI Semilight" panose="020B0402040204020203" pitchFamily="34" charset="0"/>
-              </a:rPr>
-              <a:t>Pair with another table.</a:t>
-            </a:r>
-          </a:p>
-          <a:p>
-            <a:pPr marL="342900" lvl="0" indent="-342900">
-              <a:buFont typeface="Arial" panose="020B0604020202020204" pitchFamily="34" charset="0"/>
-              <a:buChar char="•"/>
-            </a:pPr>
-            <a:r>
-              <a:rPr lang="en-US" sz="2000" dirty="0">
-                <a:latin typeface="Segoe UI Semilight" panose="020B0402040204020203" pitchFamily="34" charset="0"/>
-                <a:cs typeface="Segoe UI Semilight" panose="020B0402040204020203" pitchFamily="34" charset="0"/>
-              </a:rPr>
-              <a:t>One table is the Microsoft team and the other table is the customer.</a:t>
-            </a:r>
-          </a:p>
-          <a:p>
-            <a:pPr marL="342900" lvl="0" indent="-342900">
-              <a:buFont typeface="Arial" panose="020B0604020202020204" pitchFamily="34" charset="0"/>
-              <a:buChar char="•"/>
-            </a:pPr>
-            <a:r>
-              <a:rPr lang="en-US" sz="2000" dirty="0">
-                <a:latin typeface="Segoe UI Semilight" panose="020B0402040204020203" pitchFamily="34" charset="0"/>
-                <a:cs typeface="Segoe UI Semilight" panose="020B0402040204020203" pitchFamily="34" charset="0"/>
-              </a:rPr>
-              <a:t>The Microsoft team presents their proposed solution to the customer.</a:t>
-            </a:r>
-          </a:p>
-          <a:p>
-            <a:pPr marL="342900" lvl="0" indent="-342900">
-              <a:buFont typeface="Arial" panose="020B0604020202020204" pitchFamily="34" charset="0"/>
-              <a:buChar char="•"/>
-            </a:pPr>
-            <a:r>
-              <a:rPr lang="en-US" sz="2000" dirty="0">
-                <a:latin typeface="Segoe UI Semilight" panose="020B0402040204020203" pitchFamily="34" charset="0"/>
-                <a:cs typeface="Segoe UI Semilight" panose="020B0402040204020203" pitchFamily="34" charset="0"/>
-              </a:rPr>
-              <a:t>The customer asks one of the objections from the list of objections in the case study.</a:t>
-            </a:r>
-          </a:p>
-          <a:p>
-            <a:pPr marL="342900" lvl="0" indent="-342900">
-              <a:buFont typeface="Arial" panose="020B0604020202020204" pitchFamily="34" charset="0"/>
-              <a:buChar char="•"/>
-            </a:pPr>
-            <a:r>
-              <a:rPr lang="en-US" sz="2000" dirty="0">
-                <a:latin typeface="Segoe UI Semilight" panose="020B0402040204020203" pitchFamily="34" charset="0"/>
-                <a:cs typeface="Segoe UI Semilight" panose="020B0402040204020203" pitchFamily="34" charset="0"/>
-              </a:rPr>
-              <a:t>The Microsoft team responds to the objection.</a:t>
-            </a:r>
-          </a:p>
-          <a:p>
-            <a:pPr marL="342900" lvl="0" indent="-342900">
-              <a:buFont typeface="Arial" panose="020B0604020202020204" pitchFamily="34" charset="0"/>
-              <a:buChar char="•"/>
-            </a:pPr>
-            <a:r>
-              <a:rPr lang="en-US" sz="2000" dirty="0">
-                <a:latin typeface="Segoe UI Semilight" panose="020B0402040204020203" pitchFamily="34" charset="0"/>
-                <a:cs typeface="Segoe UI Semilight" panose="020B0402040204020203" pitchFamily="34" charset="0"/>
-              </a:rPr>
-              <a:t>The customer team gives feedback to the Microsoft team.</a:t>
-            </a:r>
-            <a:endParaRPr lang="en-US" sz="2000" strike="sngStrike" dirty="0">
-              <a:latin typeface="Segoe UI Semilight" panose="020B0402040204020203" pitchFamily="34" charset="0"/>
-              <a:cs typeface="Segoe UI Semilight" panose="020B0402040204020203" pitchFamily="34" charset="0"/>
             </a:endParaRPr>
           </a:p>
           <a:p>
@@ -21413,7 +22114,7 @@
 </p:sld>
 </file>
 
-<file path=ppt/slides/slide16.xml><?xml version="1.0" encoding="utf-8"?>
+<file path=ppt/slides/slide21.xml><?xml version="1.0" encoding="utf-8"?>
 <p:sld xmlns:a="http://schemas.openxmlformats.org/drawingml/2006/main" xmlns:r="http://schemas.openxmlformats.org/officeDocument/2006/relationships" xmlns:p="http://schemas.openxmlformats.org/presentationml/2006/main">
   <p:cSld>
     <p:spTree>
@@ -21604,7 +22305,73 @@
 </p:sld>
 </file>
 
-<file path=ppt/slides/slide17.xml><?xml version="1.0" encoding="utf-8"?>
+<file path=ppt/slides/slide22.xml><?xml version="1.0" encoding="utf-8"?>
+<p:sld xmlns:a="http://schemas.openxmlformats.org/drawingml/2006/main" xmlns:r="http://schemas.openxmlformats.org/officeDocument/2006/relationships" xmlns:p="http://schemas.openxmlformats.org/presentationml/2006/main" show="0">
+  <p:cSld>
+    <p:spTree>
+      <p:nvGrpSpPr>
+        <p:cNvPr id="1" name=""/>
+        <p:cNvGrpSpPr/>
+        <p:nvPr/>
+      </p:nvGrpSpPr>
+      <p:grpSpPr>
+        <a:xfrm>
+          <a:off x="0" y="0"/>
+          <a:ext cx="0" cy="0"/>
+          <a:chOff x="0" y="0"/>
+          <a:chExt cx="0" cy="0"/>
+        </a:xfrm>
+      </p:grpSpPr>
+      <p:sp>
+        <p:nvSpPr>
+          <p:cNvPr id="4" name="Title 3">
+            <a:extLst>
+              <a:ext uri="{FF2B5EF4-FFF2-40B4-BE49-F238E27FC236}">
+                <a16:creationId xmlns:a16="http://schemas.microsoft.com/office/drawing/2014/main" id="{76B4D6BB-F715-4317-9F82-5CB9D45871F2}"/>
+              </a:ext>
+            </a:extLst>
+          </p:cNvPr>
+          <p:cNvSpPr>
+            <a:spLocks noGrp="1"/>
+          </p:cNvSpPr>
+          <p:nvPr>
+            <p:ph type="title"/>
+          </p:nvPr>
+        </p:nvSpPr>
+        <p:spPr>
+          <a:xfrm>
+            <a:off x="268080" y="2681775"/>
+            <a:ext cx="11655840" cy="899665"/>
+          </a:xfrm>
+        </p:spPr>
+        <p:txBody>
+          <a:bodyPr/>
+          <a:lstStyle/>
+          <a:p>
+            <a:r>
+              <a:rPr lang="en-US" dirty="0"/>
+              <a:t>Before we get into the technical solution, who should our field sellers by targeting?</a:t>
+            </a:r>
+          </a:p>
+        </p:txBody>
+      </p:sp>
+    </p:spTree>
+    <p:extLst>
+      <p:ext uri="{BB962C8B-B14F-4D97-AF65-F5344CB8AC3E}">
+        <p14:creationId xmlns:p14="http://schemas.microsoft.com/office/powerpoint/2010/main" val="3674823097"/>
+      </p:ext>
+    </p:extLst>
+  </p:cSld>
+  <p:clrMapOvr>
+    <a:masterClrMapping/>
+  </p:clrMapOvr>
+  <p:transition>
+    <p:fade/>
+  </p:transition>
+</p:sld>
+</file>
+
+<file path=ppt/slides/slide23.xml><?xml version="1.0" encoding="utf-8"?>
 <p:sld xmlns:a="http://schemas.openxmlformats.org/drawingml/2006/main" xmlns:r="http://schemas.openxmlformats.org/officeDocument/2006/relationships" xmlns:p="http://schemas.openxmlformats.org/presentationml/2006/main">
   <p:cSld>
     <p:bg>
@@ -21836,7 +22603,73 @@
 </p:sld>
 </file>
 
-<file path=ppt/slides/slide18.xml><?xml version="1.0" encoding="utf-8"?>
+<file path=ppt/slides/slide24.xml><?xml version="1.0" encoding="utf-8"?>
+<p:sld xmlns:a="http://schemas.openxmlformats.org/drawingml/2006/main" xmlns:r="http://schemas.openxmlformats.org/officeDocument/2006/relationships" xmlns:p="http://schemas.openxmlformats.org/presentationml/2006/main" show="0">
+  <p:cSld>
+    <p:spTree>
+      <p:nvGrpSpPr>
+        <p:cNvPr id="1" name=""/>
+        <p:cNvGrpSpPr/>
+        <p:nvPr/>
+      </p:nvGrpSpPr>
+      <p:grpSpPr>
+        <a:xfrm>
+          <a:off x="0" y="0"/>
+          <a:ext cx="0" cy="0"/>
+          <a:chOff x="0" y="0"/>
+          <a:chExt cx="0" cy="0"/>
+        </a:xfrm>
+      </p:grpSpPr>
+      <p:sp>
+        <p:nvSpPr>
+          <p:cNvPr id="4" name="Title 3">
+            <a:extLst>
+              <a:ext uri="{FF2B5EF4-FFF2-40B4-BE49-F238E27FC236}">
+                <a16:creationId xmlns:a16="http://schemas.microsoft.com/office/drawing/2014/main" id="{76B4D6BB-F715-4317-9F82-5CB9D45871F2}"/>
+              </a:ext>
+            </a:extLst>
+          </p:cNvPr>
+          <p:cNvSpPr>
+            <a:spLocks noGrp="1"/>
+          </p:cNvSpPr>
+          <p:nvPr>
+            <p:ph type="title"/>
+          </p:nvPr>
+        </p:nvSpPr>
+        <p:spPr>
+          <a:xfrm>
+            <a:off x="268080" y="2681775"/>
+            <a:ext cx="11655840" cy="899665"/>
+          </a:xfrm>
+        </p:spPr>
+        <p:txBody>
+          <a:bodyPr/>
+          <a:lstStyle/>
+          <a:p>
+            <a:r>
+              <a:rPr lang="en-US" dirty="0"/>
+              <a:t>Matt, this scenario has a LOT of details! Can you talk us thru it at a high level?</a:t>
+            </a:r>
+          </a:p>
+        </p:txBody>
+      </p:sp>
+    </p:spTree>
+    <p:extLst>
+      <p:ext uri="{BB962C8B-B14F-4D97-AF65-F5344CB8AC3E}">
+        <p14:creationId xmlns:p14="http://schemas.microsoft.com/office/powerpoint/2010/main" val="2727828922"/>
+      </p:ext>
+    </p:extLst>
+  </p:cSld>
+  <p:clrMapOvr>
+    <a:masterClrMapping/>
+  </p:clrMapOvr>
+  <p:transition>
+    <p:fade/>
+  </p:transition>
+</p:sld>
+</file>
+
+<file path=ppt/slides/slide25.xml><?xml version="1.0" encoding="utf-8"?>
 <p:sld xmlns:a="http://schemas.openxmlformats.org/drawingml/2006/main" xmlns:r="http://schemas.openxmlformats.org/officeDocument/2006/relationships" xmlns:p="http://schemas.openxmlformats.org/presentationml/2006/main">
   <p:cSld>
     <p:spTree>
@@ -21952,7 +22785,73 @@
 </p:sld>
 </file>
 
-<file path=ppt/slides/slide19.xml><?xml version="1.0" encoding="utf-8"?>
+<file path=ppt/slides/slide26.xml><?xml version="1.0" encoding="utf-8"?>
+<p:sld xmlns:a="http://schemas.openxmlformats.org/drawingml/2006/main" xmlns:r="http://schemas.openxmlformats.org/officeDocument/2006/relationships" xmlns:p="http://schemas.openxmlformats.org/presentationml/2006/main" show="0">
+  <p:cSld>
+    <p:spTree>
+      <p:nvGrpSpPr>
+        <p:cNvPr id="1" name=""/>
+        <p:cNvGrpSpPr/>
+        <p:nvPr/>
+      </p:nvGrpSpPr>
+      <p:grpSpPr>
+        <a:xfrm>
+          <a:off x="0" y="0"/>
+          <a:ext cx="0" cy="0"/>
+          <a:chOff x="0" y="0"/>
+          <a:chExt cx="0" cy="0"/>
+        </a:xfrm>
+      </p:grpSpPr>
+      <p:sp>
+        <p:nvSpPr>
+          <p:cNvPr id="4" name="Title 3">
+            <a:extLst>
+              <a:ext uri="{FF2B5EF4-FFF2-40B4-BE49-F238E27FC236}">
+                <a16:creationId xmlns:a16="http://schemas.microsoft.com/office/drawing/2014/main" id="{76B4D6BB-F715-4317-9F82-5CB9D45871F2}"/>
+              </a:ext>
+            </a:extLst>
+          </p:cNvPr>
+          <p:cNvSpPr>
+            <a:spLocks noGrp="1"/>
+          </p:cNvSpPr>
+          <p:nvPr>
+            <p:ph type="title"/>
+          </p:nvPr>
+        </p:nvSpPr>
+        <p:spPr>
+          <a:xfrm>
+            <a:off x="268080" y="2681775"/>
+            <a:ext cx="11655840" cy="899665"/>
+          </a:xfrm>
+        </p:spPr>
+        <p:txBody>
+          <a:bodyPr/>
+          <a:lstStyle/>
+          <a:p>
+            <a:r>
+              <a:rPr lang="en-US" dirty="0"/>
+              <a:t>OK, we understand the cold path, but what about the Twitter data?</a:t>
+            </a:r>
+          </a:p>
+        </p:txBody>
+      </p:sp>
+    </p:spTree>
+    <p:extLst>
+      <p:ext uri="{BB962C8B-B14F-4D97-AF65-F5344CB8AC3E}">
+        <p14:creationId xmlns:p14="http://schemas.microsoft.com/office/powerpoint/2010/main" val="3862775663"/>
+      </p:ext>
+    </p:extLst>
+  </p:cSld>
+  <p:clrMapOvr>
+    <a:masterClrMapping/>
+  </p:clrMapOvr>
+  <p:transition>
+    <p:fade/>
+  </p:transition>
+</p:sld>
+</file>
+
+<file path=ppt/slides/slide27.xml><?xml version="1.0" encoding="utf-8"?>
 <p:sld xmlns:a="http://schemas.openxmlformats.org/drawingml/2006/main" xmlns:r="http://schemas.openxmlformats.org/officeDocument/2006/relationships" xmlns:p="http://schemas.openxmlformats.org/presentationml/2006/main">
   <p:cSld>
     <p:spTree>
@@ -22068,17 +22967,9 @@
 </p:sld>
 </file>
 
-<file path=ppt/slides/slide2.xml><?xml version="1.0" encoding="utf-8"?>
-<p:sld xmlns:a="http://schemas.openxmlformats.org/drawingml/2006/main" xmlns:r="http://schemas.openxmlformats.org/officeDocument/2006/relationships" xmlns:p="http://schemas.openxmlformats.org/presentationml/2006/main">
+<file path=ppt/slides/slide28.xml><?xml version="1.0" encoding="utf-8"?>
+<p:sld xmlns:a="http://schemas.openxmlformats.org/drawingml/2006/main" xmlns:r="http://schemas.openxmlformats.org/officeDocument/2006/relationships" xmlns:p="http://schemas.openxmlformats.org/presentationml/2006/main" show="0">
   <p:cSld>
-    <p:bg>
-      <p:bgPr>
-        <a:solidFill>
-          <a:schemeClr val="bg2"/>
-        </a:solidFill>
-        <a:effectLst/>
-      </p:bgPr>
-    </p:bg>
     <p:spTree>
       <p:nvGrpSpPr>
         <p:cNvPr id="1" name=""/>
@@ -22095,7 +22986,13 @@
       </p:grpSpPr>
       <p:sp>
         <p:nvSpPr>
-          <p:cNvPr id="2" name="Title 1"/>
+          <p:cNvPr id="4" name="Title 3">
+            <a:extLst>
+              <a:ext uri="{FF2B5EF4-FFF2-40B4-BE49-F238E27FC236}">
+                <a16:creationId xmlns:a16="http://schemas.microsoft.com/office/drawing/2014/main" id="{76B4D6BB-F715-4317-9F82-5CB9D45871F2}"/>
+              </a:ext>
+            </a:extLst>
+          </p:cNvPr>
           <p:cNvSpPr>
             <a:spLocks noGrp="1"/>
           </p:cNvSpPr>
@@ -22105,176 +23002,38 @@
         </p:nvSpPr>
         <p:spPr>
           <a:xfrm>
-            <a:off x="268080" y="66674"/>
+            <a:off x="268080" y="2681775"/>
             <a:ext cx="11655840" cy="899665"/>
           </a:xfrm>
         </p:spPr>
         <p:txBody>
-          <a:bodyPr>
-            <a:normAutofit/>
-          </a:bodyPr>
+          <a:bodyPr/>
           <a:lstStyle/>
           <a:p>
             <a:r>
-              <a:rPr lang="en-US" sz="4400" dirty="0">
-                <a:solidFill>
-                  <a:schemeClr val="tx1"/>
-                </a:solidFill>
-                <a:latin typeface="Segoe UI Light" panose="020B0502040204020203" pitchFamily="34" charset="0"/>
-                <a:cs typeface="Segoe UI Light" panose="020B0502040204020203" pitchFamily="34" charset="0"/>
-              </a:rPr>
-              <a:t>Abstract and learning objectives</a:t>
+              <a:rPr lang="en-US" dirty="0"/>
+              <a:t>That makes sense. Zoiner, what about how they should handle machine learning?</a:t>
             </a:r>
           </a:p>
         </p:txBody>
       </p:sp>
-      <p:sp>
-        <p:nvSpPr>
-          <p:cNvPr id="5" name="TextBox 4">
-            <a:extLst>
-              <a:ext uri="{FF2B5EF4-FFF2-40B4-BE49-F238E27FC236}">
-                <a16:creationId xmlns:a16="http://schemas.microsoft.com/office/drawing/2014/main" id="{14863F9F-12C3-4104-AF05-EE6350D14EEC}"/>
-              </a:ext>
-            </a:extLst>
-          </p:cNvPr>
-          <p:cNvSpPr txBox="1"/>
-          <p:nvPr/>
-        </p:nvSpPr>
-        <p:spPr>
-          <a:xfrm>
-            <a:off x="568586" y="1094646"/>
-            <a:ext cx="7355243" cy="4881336"/>
-          </a:xfrm>
-          <a:prstGeom prst="rect">
-            <a:avLst/>
-          </a:prstGeom>
-          <a:noFill/>
-        </p:spPr>
-        <p:txBody>
-          <a:bodyPr wrap="square" lIns="182880" tIns="146304" rIns="182880" bIns="146304" rtlCol="0">
-            <a:spAutoFit/>
-          </a:bodyPr>
-          <a:lstStyle/>
-          <a:p>
-            <a:pPr>
-              <a:spcAft>
-                <a:spcPts val="600"/>
-              </a:spcAft>
-            </a:pPr>
-            <a:r>
-              <a:rPr lang="en-US" sz="2400" dirty="0">
-                <a:gradFill>
-                  <a:gsLst>
-                    <a:gs pos="2917">
-                      <a:schemeClr val="tx1"/>
-                    </a:gs>
-                    <a:gs pos="30000">
-                      <a:schemeClr val="tx1"/>
-                    </a:gs>
-                  </a:gsLst>
-                  <a:lin ang="5400000" scaled="0"/>
-                </a:gradFill>
-              </a:rPr>
-              <a:t>In this whiteboard design session, you will work in a group to look at the process of designing an end-to-end solution using Azure Synapse Analytics. The design session will cover data loading, data preparation, data transformation and data serving, along with performing machine learning and handling of both batch and real-time data.</a:t>
-            </a:r>
-          </a:p>
-          <a:p>
-            <a:pPr>
-              <a:spcAft>
-                <a:spcPts val="600"/>
-              </a:spcAft>
-            </a:pPr>
-            <a:endParaRPr lang="en-US" sz="2400" dirty="0">
-              <a:gradFill>
-                <a:gsLst>
-                  <a:gs pos="2917">
-                    <a:schemeClr val="tx1"/>
-                  </a:gs>
-                  <a:gs pos="30000">
-                    <a:schemeClr val="tx1"/>
-                  </a:gs>
-                </a:gsLst>
-                <a:lin ang="5400000" scaled="0"/>
-              </a:gradFill>
-            </a:endParaRPr>
-          </a:p>
-          <a:p>
-            <a:pPr>
-              <a:spcAft>
-                <a:spcPts val="600"/>
-              </a:spcAft>
-            </a:pPr>
-            <a:r>
-              <a:rPr lang="en-US" sz="2400" dirty="0">
-                <a:gradFill>
-                  <a:gsLst>
-                    <a:gs pos="2917">
-                      <a:schemeClr val="tx1"/>
-                    </a:gs>
-                    <a:gs pos="30000">
-                      <a:schemeClr val="tx1"/>
-                    </a:gs>
-                  </a:gsLst>
-                  <a:lin ang="5400000" scaled="0"/>
-                </a:gradFill>
-              </a:rPr>
-              <a:t>At the end of this whiteboard design session, you will be better able to design and build a complete end-to-end advanced analytics solution using Azure Synapse Analytics.</a:t>
-            </a:r>
-          </a:p>
-        </p:txBody>
-      </p:sp>
-      <p:pic>
-        <p:nvPicPr>
-          <p:cNvPr id="3" name="Picture 2" descr="Icon representation of a presenter waving at a whiteboard.">
-            <a:extLst>
-              <a:ext uri="{FF2B5EF4-FFF2-40B4-BE49-F238E27FC236}">
-                <a16:creationId xmlns:a16="http://schemas.microsoft.com/office/drawing/2014/main" id="{90670106-9F72-4C69-AC97-2303D33801DD}"/>
-              </a:ext>
-            </a:extLst>
-          </p:cNvPr>
-          <p:cNvPicPr>
-            <a:picLocks noChangeAspect="1"/>
-          </p:cNvPicPr>
-          <p:nvPr/>
-        </p:nvPicPr>
-        <p:blipFill>
-          <a:blip r:embed="rId3"/>
-          <a:stretch>
-            <a:fillRect/>
-          </a:stretch>
-        </p:blipFill>
-        <p:spPr>
-          <a:xfrm>
-            <a:off x="7945793" y="1828661"/>
-            <a:ext cx="3200677" cy="3200677"/>
-          </a:xfrm>
-          <a:prstGeom prst="rect">
-            <a:avLst/>
-          </a:prstGeom>
-        </p:spPr>
-      </p:pic>
     </p:spTree>
     <p:extLst>
       <p:ext uri="{BB962C8B-B14F-4D97-AF65-F5344CB8AC3E}">
-        <p14:creationId xmlns:p14="http://schemas.microsoft.com/office/powerpoint/2010/main" val="772880493"/>
+        <p14:creationId xmlns:p14="http://schemas.microsoft.com/office/powerpoint/2010/main" val="856055440"/>
       </p:ext>
     </p:extLst>
   </p:cSld>
   <p:clrMapOvr>
     <a:masterClrMapping/>
   </p:clrMapOvr>
-  <mc:AlternateContent xmlns:mc="http://schemas.openxmlformats.org/markup-compatibility/2006" xmlns:p14="http://schemas.microsoft.com/office/powerpoint/2010/main">
-    <mc:Choice Requires="p14">
-      <p:transition p14:dur="0"/>
-    </mc:Choice>
-    <mc:Fallback xmlns="">
-      <p:transition/>
-    </mc:Fallback>
-  </mc:AlternateContent>
+  <p:transition>
+    <p:fade/>
+  </p:transition>
 </p:sld>
 </file>
 
-<file path=ppt/slides/slide20.xml><?xml version="1.0" encoding="utf-8"?>
+<file path=ppt/slides/slide29.xml><?xml version="1.0" encoding="utf-8"?>
 <p:sld xmlns:a="http://schemas.openxmlformats.org/drawingml/2006/main" xmlns:r="http://schemas.openxmlformats.org/officeDocument/2006/relationships" xmlns:p="http://schemas.openxmlformats.org/presentationml/2006/main">
   <p:cSld>
     <p:spTree>
@@ -22390,7 +23149,279 @@
 </p:sld>
 </file>
 
-<file path=ppt/slides/slide21.xml><?xml version="1.0" encoding="utf-8"?>
+<file path=ppt/slides/slide3.xml><?xml version="1.0" encoding="utf-8"?>
+<p:sld xmlns:a="http://schemas.openxmlformats.org/drawingml/2006/main" xmlns:r="http://schemas.openxmlformats.org/officeDocument/2006/relationships" xmlns:p="http://schemas.openxmlformats.org/presentationml/2006/main">
+  <p:cSld>
+    <p:bg>
+      <p:bgPr>
+        <a:solidFill>
+          <a:schemeClr val="bg2"/>
+        </a:solidFill>
+        <a:effectLst/>
+      </p:bgPr>
+    </p:bg>
+    <p:spTree>
+      <p:nvGrpSpPr>
+        <p:cNvPr id="1" name=""/>
+        <p:cNvGrpSpPr/>
+        <p:nvPr/>
+      </p:nvGrpSpPr>
+      <p:grpSpPr>
+        <a:xfrm>
+          <a:off x="0" y="0"/>
+          <a:ext cx="0" cy="0"/>
+          <a:chOff x="0" y="0"/>
+          <a:chExt cx="0" cy="0"/>
+        </a:xfrm>
+      </p:grpSpPr>
+      <p:sp>
+        <p:nvSpPr>
+          <p:cNvPr id="2" name="Title 1"/>
+          <p:cNvSpPr>
+            <a:spLocks noGrp="1"/>
+          </p:cNvSpPr>
+          <p:nvPr>
+            <p:ph type="title"/>
+          </p:nvPr>
+        </p:nvSpPr>
+        <p:spPr>
+          <a:xfrm>
+            <a:off x="268080" y="66674"/>
+            <a:ext cx="11655840" cy="899665"/>
+          </a:xfrm>
+        </p:spPr>
+        <p:txBody>
+          <a:bodyPr>
+            <a:normAutofit/>
+          </a:bodyPr>
+          <a:lstStyle/>
+          <a:p>
+            <a:r>
+              <a:rPr lang="en-US" sz="4400" dirty="0">
+                <a:solidFill>
+                  <a:schemeClr val="tx1"/>
+                </a:solidFill>
+                <a:latin typeface="Segoe UI Light" panose="020B0502040204020203" pitchFamily="34" charset="0"/>
+                <a:cs typeface="Segoe UI Light" panose="020B0502040204020203" pitchFamily="34" charset="0"/>
+              </a:rPr>
+              <a:t>Abstract and learning objectives</a:t>
+            </a:r>
+          </a:p>
+        </p:txBody>
+      </p:sp>
+      <p:sp>
+        <p:nvSpPr>
+          <p:cNvPr id="5" name="TextBox 4">
+            <a:extLst>
+              <a:ext uri="{FF2B5EF4-FFF2-40B4-BE49-F238E27FC236}">
+                <a16:creationId xmlns:a16="http://schemas.microsoft.com/office/drawing/2014/main" id="{14863F9F-12C3-4104-AF05-EE6350D14EEC}"/>
+              </a:ext>
+            </a:extLst>
+          </p:cNvPr>
+          <p:cNvSpPr txBox="1"/>
+          <p:nvPr/>
+        </p:nvSpPr>
+        <p:spPr>
+          <a:xfrm>
+            <a:off x="568586" y="1094646"/>
+            <a:ext cx="7355243" cy="4881336"/>
+          </a:xfrm>
+          <a:prstGeom prst="rect">
+            <a:avLst/>
+          </a:prstGeom>
+          <a:noFill/>
+        </p:spPr>
+        <p:txBody>
+          <a:bodyPr wrap="square" lIns="182880" tIns="146304" rIns="182880" bIns="146304" rtlCol="0">
+            <a:spAutoFit/>
+          </a:bodyPr>
+          <a:lstStyle/>
+          <a:p>
+            <a:pPr>
+              <a:spcAft>
+                <a:spcPts val="600"/>
+              </a:spcAft>
+            </a:pPr>
+            <a:r>
+              <a:rPr lang="en-US" sz="2400" dirty="0">
+                <a:gradFill>
+                  <a:gsLst>
+                    <a:gs pos="2917">
+                      <a:schemeClr val="tx1"/>
+                    </a:gs>
+                    <a:gs pos="30000">
+                      <a:schemeClr val="tx1"/>
+                    </a:gs>
+                  </a:gsLst>
+                  <a:lin ang="5400000" scaled="0"/>
+                </a:gradFill>
+              </a:rPr>
+              <a:t>In this whiteboard design session, you will work in a group to look at the process of designing an end-to-end solution using Azure Synapse Analytics. The design session will cover data loading, data preparation, data transformation and data serving, along with performing machine learning and handling of both batch and real-time data.</a:t>
+            </a:r>
+          </a:p>
+          <a:p>
+            <a:pPr>
+              <a:spcAft>
+                <a:spcPts val="600"/>
+              </a:spcAft>
+            </a:pPr>
+            <a:endParaRPr lang="en-US" sz="2400" dirty="0">
+              <a:gradFill>
+                <a:gsLst>
+                  <a:gs pos="2917">
+                    <a:schemeClr val="tx1"/>
+                  </a:gs>
+                  <a:gs pos="30000">
+                    <a:schemeClr val="tx1"/>
+                  </a:gs>
+                </a:gsLst>
+                <a:lin ang="5400000" scaled="0"/>
+              </a:gradFill>
+            </a:endParaRPr>
+          </a:p>
+          <a:p>
+            <a:pPr>
+              <a:spcAft>
+                <a:spcPts val="600"/>
+              </a:spcAft>
+            </a:pPr>
+            <a:r>
+              <a:rPr lang="en-US" sz="2400" dirty="0">
+                <a:gradFill>
+                  <a:gsLst>
+                    <a:gs pos="2917">
+                      <a:schemeClr val="tx1"/>
+                    </a:gs>
+                    <a:gs pos="30000">
+                      <a:schemeClr val="tx1"/>
+                    </a:gs>
+                  </a:gsLst>
+                  <a:lin ang="5400000" scaled="0"/>
+                </a:gradFill>
+              </a:rPr>
+              <a:t>At the end of this whiteboard design session, you will be better able to design and build a complete end-to-end advanced analytics solution using Azure Synapse Analytics.</a:t>
+            </a:r>
+          </a:p>
+        </p:txBody>
+      </p:sp>
+      <p:pic>
+        <p:nvPicPr>
+          <p:cNvPr id="3" name="Picture 2" descr="Icon representation of a presenter waving at a whiteboard.">
+            <a:extLst>
+              <a:ext uri="{FF2B5EF4-FFF2-40B4-BE49-F238E27FC236}">
+                <a16:creationId xmlns:a16="http://schemas.microsoft.com/office/drawing/2014/main" id="{90670106-9F72-4C69-AC97-2303D33801DD}"/>
+              </a:ext>
+            </a:extLst>
+          </p:cNvPr>
+          <p:cNvPicPr>
+            <a:picLocks noChangeAspect="1"/>
+          </p:cNvPicPr>
+          <p:nvPr/>
+        </p:nvPicPr>
+        <p:blipFill>
+          <a:blip r:embed="rId3"/>
+          <a:stretch>
+            <a:fillRect/>
+          </a:stretch>
+        </p:blipFill>
+        <p:spPr>
+          <a:xfrm>
+            <a:off x="7945793" y="1828661"/>
+            <a:ext cx="3200677" cy="3200677"/>
+          </a:xfrm>
+          <a:prstGeom prst="rect">
+            <a:avLst/>
+          </a:prstGeom>
+        </p:spPr>
+      </p:pic>
+    </p:spTree>
+    <p:extLst>
+      <p:ext uri="{BB962C8B-B14F-4D97-AF65-F5344CB8AC3E}">
+        <p14:creationId xmlns:p14="http://schemas.microsoft.com/office/powerpoint/2010/main" val="772880493"/>
+      </p:ext>
+    </p:extLst>
+  </p:cSld>
+  <p:clrMapOvr>
+    <a:masterClrMapping/>
+  </p:clrMapOvr>
+  <mc:AlternateContent xmlns:mc="http://schemas.openxmlformats.org/markup-compatibility/2006" xmlns:p14="http://schemas.microsoft.com/office/powerpoint/2010/main">
+    <mc:Choice Requires="p14">
+      <p:transition p14:dur="0"/>
+    </mc:Choice>
+    <mc:Fallback xmlns="">
+      <p:transition/>
+    </mc:Fallback>
+  </mc:AlternateContent>
+</p:sld>
+</file>
+
+<file path=ppt/slides/slide30.xml><?xml version="1.0" encoding="utf-8"?>
+<p:sld xmlns:a="http://schemas.openxmlformats.org/drawingml/2006/main" xmlns:r="http://schemas.openxmlformats.org/officeDocument/2006/relationships" xmlns:p="http://schemas.openxmlformats.org/presentationml/2006/main" show="0">
+  <p:cSld>
+    <p:spTree>
+      <p:nvGrpSpPr>
+        <p:cNvPr id="1" name=""/>
+        <p:cNvGrpSpPr/>
+        <p:nvPr/>
+      </p:nvGrpSpPr>
+      <p:grpSpPr>
+        <a:xfrm>
+          <a:off x="0" y="0"/>
+          <a:ext cx="0" cy="0"/>
+          <a:chOff x="0" y="0"/>
+          <a:chExt cx="0" cy="0"/>
+        </a:xfrm>
+      </p:grpSpPr>
+      <p:sp>
+        <p:nvSpPr>
+          <p:cNvPr id="4" name="Title 3">
+            <a:extLst>
+              <a:ext uri="{FF2B5EF4-FFF2-40B4-BE49-F238E27FC236}">
+                <a16:creationId xmlns:a16="http://schemas.microsoft.com/office/drawing/2014/main" id="{76B4D6BB-F715-4317-9F82-5CB9D45871F2}"/>
+              </a:ext>
+            </a:extLst>
+          </p:cNvPr>
+          <p:cNvSpPr>
+            <a:spLocks noGrp="1"/>
+          </p:cNvSpPr>
+          <p:nvPr>
+            <p:ph type="title"/>
+          </p:nvPr>
+        </p:nvSpPr>
+        <p:spPr>
+          <a:xfrm>
+            <a:off x="268080" y="2681775"/>
+            <a:ext cx="11655840" cy="899665"/>
+          </a:xfrm>
+        </p:spPr>
+        <p:txBody>
+          <a:bodyPr/>
+          <a:lstStyle/>
+          <a:p>
+            <a:r>
+              <a:rPr lang="en-US" dirty="0"/>
+              <a:t>That’s helpful. I know there were a lot of details, can you talk us thru them in a Q&amp;A fashion?</a:t>
+            </a:r>
+          </a:p>
+        </p:txBody>
+      </p:sp>
+    </p:spTree>
+    <p:extLst>
+      <p:ext uri="{BB962C8B-B14F-4D97-AF65-F5344CB8AC3E}">
+        <p14:creationId xmlns:p14="http://schemas.microsoft.com/office/powerpoint/2010/main" val="3673300103"/>
+      </p:ext>
+    </p:extLst>
+  </p:cSld>
+  <p:clrMapOvr>
+    <a:masterClrMapping/>
+  </p:clrMapOvr>
+  <p:transition>
+    <p:fade/>
+  </p:transition>
+</p:sld>
+</file>
+
+<file path=ppt/slides/slide31.xml><?xml version="1.0" encoding="utf-8"?>
 <p:sld xmlns:a="http://schemas.openxmlformats.org/drawingml/2006/main" xmlns:r="http://schemas.openxmlformats.org/officeDocument/2006/relationships" xmlns:p="http://schemas.openxmlformats.org/presentationml/2006/main">
   <p:cSld>
     <p:spTree>
@@ -22544,7 +23575,7 @@
 </p:sld>
 </file>
 
-<file path=ppt/slides/slide22.xml><?xml version="1.0" encoding="utf-8"?>
+<file path=ppt/slides/slide32.xml><?xml version="1.0" encoding="utf-8"?>
 <p:sld xmlns:a="http://schemas.openxmlformats.org/drawingml/2006/main" xmlns:r="http://schemas.openxmlformats.org/officeDocument/2006/relationships" xmlns:p="http://schemas.openxmlformats.org/presentationml/2006/main">
   <p:cSld>
     <p:spTree>
@@ -22701,7 +23732,7 @@
 </p:sld>
 </file>
 
-<file path=ppt/slides/slide23.xml><?xml version="1.0" encoding="utf-8"?>
+<file path=ppt/slides/slide33.xml><?xml version="1.0" encoding="utf-8"?>
 <p:sld xmlns:a="http://schemas.openxmlformats.org/drawingml/2006/main" xmlns:r="http://schemas.openxmlformats.org/officeDocument/2006/relationships" xmlns:p="http://schemas.openxmlformats.org/presentationml/2006/main">
   <p:cSld>
     <p:spTree>
@@ -22887,7 +23918,7 @@
 </p:sld>
 </file>
 
-<file path=ppt/slides/slide24.xml><?xml version="1.0" encoding="utf-8"?>
+<file path=ppt/slides/slide34.xml><?xml version="1.0" encoding="utf-8"?>
 <p:sld xmlns:a="http://schemas.openxmlformats.org/drawingml/2006/main" xmlns:r="http://schemas.openxmlformats.org/officeDocument/2006/relationships" xmlns:p="http://schemas.openxmlformats.org/presentationml/2006/main">
   <p:cSld>
     <p:spTree>
@@ -23074,7 +24105,7 @@
 </p:sld>
 </file>
 
-<file path=ppt/slides/slide25.xml><?xml version="1.0" encoding="utf-8"?>
+<file path=ppt/slides/slide35.xml><?xml version="1.0" encoding="utf-8"?>
 <p:sld xmlns:a="http://schemas.openxmlformats.org/drawingml/2006/main" xmlns:r="http://schemas.openxmlformats.org/officeDocument/2006/relationships" xmlns:p="http://schemas.openxmlformats.org/presentationml/2006/main">
   <p:cSld>
     <p:spTree>
@@ -23236,7 +24267,7 @@
 </p:sld>
 </file>
 
-<file path=ppt/slides/slide26.xml><?xml version="1.0" encoding="utf-8"?>
+<file path=ppt/slides/slide36.xml><?xml version="1.0" encoding="utf-8"?>
 <p:sld xmlns:a="http://schemas.openxmlformats.org/drawingml/2006/main" xmlns:r="http://schemas.openxmlformats.org/officeDocument/2006/relationships" xmlns:p="http://schemas.openxmlformats.org/presentationml/2006/main">
   <p:cSld>
     <p:spTree>
@@ -23379,7 +24410,7 @@
 </p:sld>
 </file>
 
-<file path=ppt/slides/slide27.xml><?xml version="1.0" encoding="utf-8"?>
+<file path=ppt/slides/slide37.xml><?xml version="1.0" encoding="utf-8"?>
 <p:sld xmlns:a="http://schemas.openxmlformats.org/drawingml/2006/main" xmlns:r="http://schemas.openxmlformats.org/officeDocument/2006/relationships" xmlns:p="http://schemas.openxmlformats.org/presentationml/2006/main">
   <p:cSld>
     <p:spTree>
@@ -23559,7 +24590,7 @@
 </p:sld>
 </file>
 
-<file path=ppt/slides/slide28.xml><?xml version="1.0" encoding="utf-8"?>
+<file path=ppt/slides/slide38.xml><?xml version="1.0" encoding="utf-8"?>
 <p:sld xmlns:a="http://schemas.openxmlformats.org/drawingml/2006/main" xmlns:r="http://schemas.openxmlformats.org/officeDocument/2006/relationships" xmlns:p="http://schemas.openxmlformats.org/presentationml/2006/main">
   <p:cSld>
     <p:spTree>
@@ -23704,7 +24735,7 @@
 </p:sld>
 </file>
 
-<file path=ppt/slides/slide29.xml><?xml version="1.0" encoding="utf-8"?>
+<file path=ppt/slides/slide39.xml><?xml version="1.0" encoding="utf-8"?>
 <p:sld xmlns:a="http://schemas.openxmlformats.org/drawingml/2006/main" xmlns:r="http://schemas.openxmlformats.org/officeDocument/2006/relationships" xmlns:p="http://schemas.openxmlformats.org/presentationml/2006/main">
   <p:cSld>
     <p:spTree>
@@ -23889,8 +24920,8 @@
 </p:sld>
 </file>
 
-<file path=ppt/slides/slide3.xml><?xml version="1.0" encoding="utf-8"?>
-<p:sld xmlns:a="http://schemas.openxmlformats.org/drawingml/2006/main" xmlns:r="http://schemas.openxmlformats.org/officeDocument/2006/relationships" xmlns:p="http://schemas.openxmlformats.org/presentationml/2006/main">
+<file path=ppt/slides/slide4.xml><?xml version="1.0" encoding="utf-8"?>
+<p:sld xmlns:a="http://schemas.openxmlformats.org/drawingml/2006/main" xmlns:r="http://schemas.openxmlformats.org/officeDocument/2006/relationships" xmlns:p="http://schemas.openxmlformats.org/presentationml/2006/main" show="0">
   <p:cSld>
     <p:bg>
       <p:bgPr>
@@ -24071,7 +25102,7 @@
 </p:sld>
 </file>
 
-<file path=ppt/slides/slide30.xml><?xml version="1.0" encoding="utf-8"?>
+<file path=ppt/slides/slide40.xml><?xml version="1.0" encoding="utf-8"?>
 <p:sld xmlns:a="http://schemas.openxmlformats.org/drawingml/2006/main" xmlns:r="http://schemas.openxmlformats.org/officeDocument/2006/relationships" xmlns:p="http://schemas.openxmlformats.org/presentationml/2006/main">
   <p:cSld>
     <p:spTree>
@@ -24200,7 +25231,73 @@
 </p:sld>
 </file>
 
-<file path=ppt/slides/slide31.xml><?xml version="1.0" encoding="utf-8"?>
+<file path=ppt/slides/slide41.xml><?xml version="1.0" encoding="utf-8"?>
+<p:sld xmlns:a="http://schemas.openxmlformats.org/drawingml/2006/main" xmlns:r="http://schemas.openxmlformats.org/officeDocument/2006/relationships" xmlns:p="http://schemas.openxmlformats.org/presentationml/2006/main" show="0">
+  <p:cSld>
+    <p:spTree>
+      <p:nvGrpSpPr>
+        <p:cNvPr id="1" name=""/>
+        <p:cNvGrpSpPr/>
+        <p:nvPr/>
+      </p:nvGrpSpPr>
+      <p:grpSpPr>
+        <a:xfrm>
+          <a:off x="0" y="0"/>
+          <a:ext cx="0" cy="0"/>
+          <a:chOff x="0" y="0"/>
+          <a:chExt cx="0" cy="0"/>
+        </a:xfrm>
+      </p:grpSpPr>
+      <p:sp>
+        <p:nvSpPr>
+          <p:cNvPr id="4" name="Title 3">
+            <a:extLst>
+              <a:ext uri="{FF2B5EF4-FFF2-40B4-BE49-F238E27FC236}">
+                <a16:creationId xmlns:a16="http://schemas.microsoft.com/office/drawing/2014/main" id="{76B4D6BB-F715-4317-9F82-5CB9D45871F2}"/>
+              </a:ext>
+            </a:extLst>
+          </p:cNvPr>
+          <p:cNvSpPr>
+            <a:spLocks noGrp="1"/>
+          </p:cNvSpPr>
+          <p:nvPr>
+            <p:ph type="title"/>
+          </p:nvPr>
+        </p:nvSpPr>
+        <p:spPr>
+          <a:xfrm>
+            <a:off x="268080" y="2681775"/>
+            <a:ext cx="11655840" cy="899665"/>
+          </a:xfrm>
+        </p:spPr>
+        <p:txBody>
+          <a:bodyPr/>
+          <a:lstStyle/>
+          <a:p>
+            <a:r>
+              <a:rPr lang="en-US" dirty="0"/>
+              <a:t>Thanks guys. I recall Nabeel had captured several concerns and objections from the customer? Can you guys walk us thru handling those?</a:t>
+            </a:r>
+          </a:p>
+        </p:txBody>
+      </p:sp>
+    </p:spTree>
+    <p:extLst>
+      <p:ext uri="{BB962C8B-B14F-4D97-AF65-F5344CB8AC3E}">
+        <p14:creationId xmlns:p14="http://schemas.microsoft.com/office/powerpoint/2010/main" val="2048843877"/>
+      </p:ext>
+    </p:extLst>
+  </p:cSld>
+  <p:clrMapOvr>
+    <a:masterClrMapping/>
+  </p:clrMapOvr>
+  <p:transition>
+    <p:fade/>
+  </p:transition>
+</p:sld>
+</file>
+
+<file path=ppt/slides/slide42.xml><?xml version="1.0" encoding="utf-8"?>
 <p:sld xmlns:a="http://schemas.openxmlformats.org/drawingml/2006/main" xmlns:r="http://schemas.openxmlformats.org/officeDocument/2006/relationships" xmlns:p="http://schemas.openxmlformats.org/presentationml/2006/main">
   <p:cSld>
     <p:spTree>
@@ -24423,7 +25520,7 @@
 </p:sld>
 </file>
 
-<file path=ppt/slides/slide32.xml><?xml version="1.0" encoding="utf-8"?>
+<file path=ppt/slides/slide43.xml><?xml version="1.0" encoding="utf-8"?>
 <p:sld xmlns:a="http://schemas.openxmlformats.org/drawingml/2006/main" xmlns:r="http://schemas.openxmlformats.org/officeDocument/2006/relationships" xmlns:p="http://schemas.openxmlformats.org/presentationml/2006/main">
   <p:cSld>
     <p:spTree>
@@ -24647,7 +25744,7 @@
 </p:sld>
 </file>
 
-<file path=ppt/slides/slide33.xml><?xml version="1.0" encoding="utf-8"?>
+<file path=ppt/slides/slide44.xml><?xml version="1.0" encoding="utf-8"?>
 <p:sld xmlns:a="http://schemas.openxmlformats.org/drawingml/2006/main" xmlns:r="http://schemas.openxmlformats.org/officeDocument/2006/relationships" xmlns:p="http://schemas.openxmlformats.org/presentationml/2006/main">
   <p:cSld>
     <p:spTree>
@@ -24870,7 +25967,263 @@
 </p:sld>
 </file>
 
-<file path=ppt/slides/slide34.xml><?xml version="1.0" encoding="utf-8"?>
+<file path=ppt/slides/slide45.xml><?xml version="1.0" encoding="utf-8"?>
+<p:sld xmlns:a="http://schemas.openxmlformats.org/drawingml/2006/main" xmlns:r="http://schemas.openxmlformats.org/officeDocument/2006/relationships" xmlns:p="http://schemas.openxmlformats.org/presentationml/2006/main">
+  <p:cSld>
+    <p:spTree>
+      <p:nvGrpSpPr>
+        <p:cNvPr id="1" name=""/>
+        <p:cNvGrpSpPr/>
+        <p:nvPr/>
+      </p:nvGrpSpPr>
+      <p:grpSpPr>
+        <a:xfrm>
+          <a:off x="0" y="0"/>
+          <a:ext cx="0" cy="0"/>
+          <a:chOff x="0" y="0"/>
+          <a:chExt cx="0" cy="0"/>
+        </a:xfrm>
+      </p:grpSpPr>
+      <p:sp>
+        <p:nvSpPr>
+          <p:cNvPr id="2" name="Title 1"/>
+          <p:cNvSpPr>
+            <a:spLocks noGrp="1"/>
+          </p:cNvSpPr>
+          <p:nvPr>
+            <p:ph type="title"/>
+          </p:nvPr>
+        </p:nvSpPr>
+        <p:spPr/>
+        <p:txBody>
+          <a:bodyPr>
+            <a:normAutofit fontScale="90000"/>
+          </a:bodyPr>
+          <a:lstStyle/>
+          <a:p>
+            <a:r>
+              <a:rPr lang="en-US" sz="4900" dirty="0">
+                <a:solidFill>
+                  <a:schemeClr val="tx1"/>
+                </a:solidFill>
+                <a:cs typeface="Segoe UI" panose="020B0502040204020203" pitchFamily="34" charset="0"/>
+              </a:rPr>
+              <a:t>Preferred objections handling - 4</a:t>
+            </a:r>
+            <a:br>
+              <a:rPr lang="en-US" dirty="0">
+                <a:solidFill>
+                  <a:schemeClr val="tx1"/>
+                </a:solidFill>
+                <a:latin typeface="Segoe UI" panose="020B0502040204020203" pitchFamily="34" charset="0"/>
+              </a:rPr>
+            </a:br>
+            <a:endParaRPr lang="en-US" sz="3236" dirty="0">
+              <a:solidFill>
+                <a:schemeClr val="tx1"/>
+              </a:solidFill>
+              <a:latin typeface="Segoe UI" panose="020B0502040204020203" pitchFamily="34" charset="0"/>
+            </a:endParaRPr>
+          </a:p>
+        </p:txBody>
+      </p:sp>
+      <p:sp>
+        <p:nvSpPr>
+          <p:cNvPr id="3" name="Content Placeholder 2"/>
+          <p:cNvSpPr>
+            <a:spLocks noGrp="1"/>
+          </p:cNvSpPr>
+          <p:nvPr>
+            <p:ph type="body" sz="quarter" idx="10"/>
+          </p:nvPr>
+        </p:nvSpPr>
+        <p:spPr>
+          <a:xfrm>
+            <a:off x="269239" y="1189177"/>
+            <a:ext cx="11653523" cy="5668824"/>
+          </a:xfrm>
+        </p:spPr>
+        <p:txBody>
+          <a:bodyPr>
+            <a:normAutofit/>
+          </a:bodyPr>
+          <a:lstStyle/>
+          <a:p>
+            <a:pPr>
+              <a:lnSpc>
+                <a:spcPct val="120000"/>
+              </a:lnSpc>
+            </a:pPr>
+            <a:r>
+              <a:rPr lang="en-US" sz="3000" dirty="0">
+                <a:solidFill>
+                  <a:schemeClr val="tx1"/>
+                </a:solidFill>
+              </a:rPr>
+              <a:t>Azure Databricks and Azure Synapse Analytics seem to have overlapping capabilities, how does one choose between them?</a:t>
+            </a:r>
+          </a:p>
+          <a:p>
+            <a:pPr marL="336145" lvl="1" indent="0">
+              <a:lnSpc>
+                <a:spcPct val="120000"/>
+              </a:lnSpc>
+              <a:buNone/>
+            </a:pPr>
+            <a:endParaRPr lang="en-US" sz="1400" dirty="0">
+              <a:solidFill>
+                <a:schemeClr val="tx1"/>
+              </a:solidFill>
+              <a:latin typeface="+mj-lt"/>
+            </a:endParaRPr>
+          </a:p>
+          <a:p>
+            <a:pPr marL="336145" lvl="1" indent="0">
+              <a:lnSpc>
+                <a:spcPct val="120000"/>
+              </a:lnSpc>
+              <a:buNone/>
+            </a:pPr>
+            <a:r>
+              <a:rPr lang="en-US" sz="2400" dirty="0">
+                <a:solidFill>
+                  <a:schemeClr val="tx1"/>
+                </a:solidFill>
+                <a:latin typeface="+mj-lt"/>
+              </a:rPr>
+              <a:t>For customers primarily looking for a Data Warehousing solution, we recommend Azure Synapse Analytics.</a:t>
+            </a:r>
+          </a:p>
+          <a:p>
+            <a:pPr marL="336145" lvl="1" indent="0">
+              <a:lnSpc>
+                <a:spcPct val="120000"/>
+              </a:lnSpc>
+              <a:buNone/>
+            </a:pPr>
+            <a:r>
+              <a:rPr lang="en-US" sz="2400" dirty="0">
+                <a:solidFill>
+                  <a:schemeClr val="tx1"/>
+                </a:solidFill>
+                <a:latin typeface="+mj-lt"/>
+              </a:rPr>
+              <a:t>For customers primarily looking for a Spark solution and don’t have data warehousing needs, we recommend Azure Databricks. In case of Spark based ML scenarios, we also recommend using Azure Machine Learning from within Azure Databricks for experiment tracking, automated machine learning and MLOPs.</a:t>
+            </a:r>
+          </a:p>
+          <a:p>
+            <a:pPr marL="336145" lvl="1" indent="0">
+              <a:lnSpc>
+                <a:spcPct val="120000"/>
+              </a:lnSpc>
+              <a:buNone/>
+            </a:pPr>
+            <a:r>
+              <a:rPr lang="en-US" sz="2400" dirty="0">
+                <a:solidFill>
+                  <a:schemeClr val="tx1"/>
+                </a:solidFill>
+                <a:latin typeface="+mj-lt"/>
+              </a:rPr>
+              <a:t>For customers who are heavily investing in Spark and have data warehousing needs, we recommend both Azure Databricks and Azure Synapse.</a:t>
+            </a:r>
+            <a:endParaRPr lang="en-US" sz="2032" dirty="0">
+              <a:solidFill>
+                <a:schemeClr val="tx1"/>
+              </a:solidFill>
+              <a:latin typeface="+mj-lt"/>
+            </a:endParaRPr>
+          </a:p>
+        </p:txBody>
+      </p:sp>
+    </p:spTree>
+    <p:extLst>
+      <p:ext uri="{BB962C8B-B14F-4D97-AF65-F5344CB8AC3E}">
+        <p14:creationId xmlns:p14="http://schemas.microsoft.com/office/powerpoint/2010/main" val="1693185608"/>
+      </p:ext>
+    </p:extLst>
+  </p:cSld>
+  <p:clrMapOvr>
+    <a:masterClrMapping/>
+  </p:clrMapOvr>
+  <mc:AlternateContent xmlns:mc="http://schemas.openxmlformats.org/markup-compatibility/2006" xmlns:p14="http://schemas.microsoft.com/office/powerpoint/2010/main">
+    <mc:Choice Requires="p14">
+      <p:transition p14:dur="0"/>
+    </mc:Choice>
+    <mc:Fallback xmlns="">
+      <p:transition/>
+    </mc:Fallback>
+  </mc:AlternateContent>
+</p:sld>
+</file>
+
+<file path=ppt/slides/slide46.xml><?xml version="1.0" encoding="utf-8"?>
+<p:sld xmlns:a="http://schemas.openxmlformats.org/drawingml/2006/main" xmlns:r="http://schemas.openxmlformats.org/officeDocument/2006/relationships" xmlns:p="http://schemas.openxmlformats.org/presentationml/2006/main" show="0">
+  <p:cSld>
+    <p:spTree>
+      <p:nvGrpSpPr>
+        <p:cNvPr id="1" name=""/>
+        <p:cNvGrpSpPr/>
+        <p:nvPr/>
+      </p:nvGrpSpPr>
+      <p:grpSpPr>
+        <a:xfrm>
+          <a:off x="0" y="0"/>
+          <a:ext cx="0" cy="0"/>
+          <a:chOff x="0" y="0"/>
+          <a:chExt cx="0" cy="0"/>
+        </a:xfrm>
+      </p:grpSpPr>
+      <p:sp>
+        <p:nvSpPr>
+          <p:cNvPr id="4" name="Title 3">
+            <a:extLst>
+              <a:ext uri="{FF2B5EF4-FFF2-40B4-BE49-F238E27FC236}">
+                <a16:creationId xmlns:a16="http://schemas.microsoft.com/office/drawing/2014/main" id="{76B4D6BB-F715-4317-9F82-5CB9D45871F2}"/>
+              </a:ext>
+            </a:extLst>
+          </p:cNvPr>
+          <p:cNvSpPr>
+            <a:spLocks noGrp="1"/>
+          </p:cNvSpPr>
+          <p:nvPr>
+            <p:ph type="title"/>
+          </p:nvPr>
+        </p:nvSpPr>
+        <p:spPr>
+          <a:xfrm>
+            <a:off x="268080" y="2681775"/>
+            <a:ext cx="11655840" cy="899665"/>
+          </a:xfrm>
+        </p:spPr>
+        <p:txBody>
+          <a:bodyPr/>
+          <a:lstStyle/>
+          <a:p>
+            <a:r>
+              <a:rPr lang="en-US" dirty="0"/>
+              <a:t>Very insightful. Do we have any closing words?</a:t>
+            </a:r>
+          </a:p>
+        </p:txBody>
+      </p:sp>
+    </p:spTree>
+    <p:extLst>
+      <p:ext uri="{BB962C8B-B14F-4D97-AF65-F5344CB8AC3E}">
+        <p14:creationId xmlns:p14="http://schemas.microsoft.com/office/powerpoint/2010/main" val="3212240577"/>
+      </p:ext>
+    </p:extLst>
+  </p:cSld>
+  <p:clrMapOvr>
+    <a:masterClrMapping/>
+  </p:clrMapOvr>
+  <p:transition>
+    <p:fade/>
+  </p:transition>
+</p:sld>
+</file>
+
+<file path=ppt/slides/slide47.xml><?xml version="1.0" encoding="utf-8"?>
 <p:sld xmlns:a="http://schemas.openxmlformats.org/drawingml/2006/main" xmlns:r="http://schemas.openxmlformats.org/officeDocument/2006/relationships" xmlns:p="http://schemas.openxmlformats.org/presentationml/2006/main">
   <p:cSld>
     <p:spTree>
@@ -25037,7 +26390,7 @@
 </p:sld>
 </file>
 
-<file path=ppt/slides/slide35.xml><?xml version="1.0" encoding="utf-8"?>
+<file path=ppt/slides/slide48.xml><?xml version="1.0" encoding="utf-8"?>
 <p:sld xmlns:a="http://schemas.openxmlformats.org/drawingml/2006/main" xmlns:r="http://schemas.openxmlformats.org/officeDocument/2006/relationships" xmlns:p="http://schemas.openxmlformats.org/presentationml/2006/main">
   <p:cSld>
     <p:bg>
@@ -25087,7 +26440,73 @@
 </p:sld>
 </file>
 
-<file path=ppt/slides/slide4.xml><?xml version="1.0" encoding="utf-8"?>
+<file path=ppt/slides/slide5.xml><?xml version="1.0" encoding="utf-8"?>
+<p:sld xmlns:a="http://schemas.openxmlformats.org/drawingml/2006/main" xmlns:r="http://schemas.openxmlformats.org/officeDocument/2006/relationships" xmlns:p="http://schemas.openxmlformats.org/presentationml/2006/main" show="0">
+  <p:cSld>
+    <p:spTree>
+      <p:nvGrpSpPr>
+        <p:cNvPr id="1" name=""/>
+        <p:cNvGrpSpPr/>
+        <p:nvPr/>
+      </p:nvGrpSpPr>
+      <p:grpSpPr>
+        <a:xfrm>
+          <a:off x="0" y="0"/>
+          <a:ext cx="0" cy="0"/>
+          <a:chOff x="0" y="0"/>
+          <a:chExt cx="0" cy="0"/>
+        </a:xfrm>
+      </p:grpSpPr>
+      <p:sp>
+        <p:nvSpPr>
+          <p:cNvPr id="4" name="Title 3">
+            <a:extLst>
+              <a:ext uri="{FF2B5EF4-FFF2-40B4-BE49-F238E27FC236}">
+                <a16:creationId xmlns:a16="http://schemas.microsoft.com/office/drawing/2014/main" id="{76B4D6BB-F715-4317-9F82-5CB9D45871F2}"/>
+              </a:ext>
+            </a:extLst>
+          </p:cNvPr>
+          <p:cNvSpPr>
+            <a:spLocks noGrp="1"/>
+          </p:cNvSpPr>
+          <p:nvPr>
+            <p:ph type="title"/>
+          </p:nvPr>
+        </p:nvSpPr>
+        <p:spPr>
+          <a:xfrm>
+            <a:off x="268080" y="2681775"/>
+            <a:ext cx="11655840" cy="899665"/>
+          </a:xfrm>
+        </p:spPr>
+        <p:txBody>
+          <a:bodyPr/>
+          <a:lstStyle/>
+          <a:p>
+            <a:r>
+              <a:rPr lang="en-US" dirty="0"/>
+              <a:t>Can you tell us a little about the customer scenario?</a:t>
+            </a:r>
+          </a:p>
+        </p:txBody>
+      </p:sp>
+    </p:spTree>
+    <p:extLst>
+      <p:ext uri="{BB962C8B-B14F-4D97-AF65-F5344CB8AC3E}">
+        <p14:creationId xmlns:p14="http://schemas.microsoft.com/office/powerpoint/2010/main" val="1711147406"/>
+      </p:ext>
+    </p:extLst>
+  </p:cSld>
+  <p:clrMapOvr>
+    <a:masterClrMapping/>
+  </p:clrMapOvr>
+  <p:transition>
+    <p:fade/>
+  </p:transition>
+</p:sld>
+</file>
+
+<file path=ppt/slides/slide6.xml><?xml version="1.0" encoding="utf-8"?>
 <p:sld xmlns:a="http://schemas.openxmlformats.org/drawingml/2006/main" xmlns:r="http://schemas.openxmlformats.org/officeDocument/2006/relationships" xmlns:p="http://schemas.openxmlformats.org/presentationml/2006/main">
   <p:cSld>
     <p:spTree>
@@ -25283,7 +26702,7 @@
 </p:sld>
 </file>
 
-<file path=ppt/slides/slide5.xml><?xml version="1.0" encoding="utf-8"?>
+<file path=ppt/slides/slide7.xml><?xml version="1.0" encoding="utf-8"?>
 <p:sld xmlns:a="http://schemas.openxmlformats.org/drawingml/2006/main" xmlns:r="http://schemas.openxmlformats.org/officeDocument/2006/relationships" xmlns:p="http://schemas.openxmlformats.org/presentationml/2006/main">
   <p:cSld>
     <p:spTree>
@@ -25548,7 +26967,7 @@
 </p:sld>
 </file>
 
-<file path=ppt/slides/slide6.xml><?xml version="1.0" encoding="utf-8"?>
+<file path=ppt/slides/slide8.xml><?xml version="1.0" encoding="utf-8"?>
 <p:sld xmlns:a="http://schemas.openxmlformats.org/drawingml/2006/main" xmlns:r="http://schemas.openxmlformats.org/officeDocument/2006/relationships" xmlns:p="http://schemas.openxmlformats.org/presentationml/2006/main">
   <p:cSld>
     <p:spTree>
@@ -25705,7 +27124,7 @@
 </p:sld>
 </file>
 
-<file path=ppt/slides/slide7.xml><?xml version="1.0" encoding="utf-8"?>
+<file path=ppt/slides/slide9.xml><?xml version="1.0" encoding="utf-8"?>
 <p:sld xmlns:a="http://schemas.openxmlformats.org/drawingml/2006/main" xmlns:r="http://schemas.openxmlformats.org/officeDocument/2006/relationships" xmlns:p="http://schemas.openxmlformats.org/presentationml/2006/main">
   <p:cSld>
     <p:spTree>
@@ -25859,344 +27278,6 @@
   <p:transition>
     <p:fade/>
   </p:transition>
-</p:sld>
-</file>
-
-<file path=ppt/slides/slide8.xml><?xml version="1.0" encoding="utf-8"?>
-<p:sld xmlns:a="http://schemas.openxmlformats.org/drawingml/2006/main" xmlns:r="http://schemas.openxmlformats.org/officeDocument/2006/relationships" xmlns:p="http://schemas.openxmlformats.org/presentationml/2006/main">
-  <p:cSld>
-    <p:spTree>
-      <p:nvGrpSpPr>
-        <p:cNvPr id="1" name=""/>
-        <p:cNvGrpSpPr/>
-        <p:nvPr/>
-      </p:nvGrpSpPr>
-      <p:grpSpPr>
-        <a:xfrm>
-          <a:off x="0" y="0"/>
-          <a:ext cx="0" cy="0"/>
-          <a:chOff x="0" y="0"/>
-          <a:chExt cx="0" cy="0"/>
-        </a:xfrm>
-      </p:grpSpPr>
-      <p:sp>
-        <p:nvSpPr>
-          <p:cNvPr id="3" name="Title 2">
-            <a:extLst>
-              <a:ext uri="{FF2B5EF4-FFF2-40B4-BE49-F238E27FC236}">
-                <a16:creationId xmlns:a16="http://schemas.microsoft.com/office/drawing/2014/main" id="{4D984DA0-6E05-4483-9781-6661D38DA8DA}"/>
-              </a:ext>
-            </a:extLst>
-          </p:cNvPr>
-          <p:cNvSpPr>
-            <a:spLocks noGrp="1"/>
-          </p:cNvSpPr>
-          <p:nvPr>
-            <p:ph type="title"/>
-          </p:nvPr>
-        </p:nvSpPr>
-        <p:spPr/>
-        <p:txBody>
-          <a:bodyPr/>
-          <a:lstStyle/>
-          <a:p>
-            <a:r>
-              <a:rPr lang="en-US" dirty="0"/>
-              <a:t>Customer Situation - 5</a:t>
-            </a:r>
-          </a:p>
-        </p:txBody>
-      </p:sp>
-      <p:sp>
-        <p:nvSpPr>
-          <p:cNvPr id="2" name="Text Placeholder 1">
-            <a:extLst>
-              <a:ext uri="{FF2B5EF4-FFF2-40B4-BE49-F238E27FC236}">
-                <a16:creationId xmlns:a16="http://schemas.microsoft.com/office/drawing/2014/main" id="{70014F08-7FD5-45F1-B973-F4EB12097E59}"/>
-              </a:ext>
-            </a:extLst>
-          </p:cNvPr>
-          <p:cNvSpPr>
-            <a:spLocks noGrp="1"/>
-          </p:cNvSpPr>
-          <p:nvPr>
-            <p:ph type="body" sz="quarter" idx="10"/>
-          </p:nvPr>
-        </p:nvSpPr>
-        <p:spPr>
-          <a:xfrm>
-            <a:off x="269240" y="1189177"/>
-            <a:ext cx="10398760" cy="3225498"/>
-          </a:xfrm>
-        </p:spPr>
-        <p:txBody>
-          <a:bodyPr/>
-          <a:lstStyle/>
-          <a:p>
-            <a:pPr>
-              <a:lnSpc>
-                <a:spcPct val="100000"/>
-              </a:lnSpc>
-            </a:pPr>
-            <a:r>
-              <a:rPr lang="en-US" sz="2800" dirty="0"/>
-              <a:t>To bring their entire operation into perspective, WWI would like to create a dashboard where they can see their KPIs derived from historical data, and near real-time data streams. </a:t>
-            </a:r>
-          </a:p>
-          <a:p>
-            <a:pPr>
-              <a:lnSpc>
-                <a:spcPct val="100000"/>
-              </a:lnSpc>
-            </a:pPr>
-            <a:endParaRPr lang="en-US" sz="1600" dirty="0"/>
-          </a:p>
-          <a:p>
-            <a:pPr>
-              <a:lnSpc>
-                <a:spcPct val="100000"/>
-              </a:lnSpc>
-            </a:pPr>
-            <a:r>
-              <a:rPr lang="en-US" sz="2800" dirty="0"/>
-              <a:t>They want to make up to the minute key product recommendations generated with the help of machine learning models.</a:t>
-            </a:r>
-          </a:p>
-        </p:txBody>
-      </p:sp>
-      <p:pic>
-        <p:nvPicPr>
-          <p:cNvPr id="7" name="Graphic 6" descr="Statistics icon">
-            <a:extLst>
-              <a:ext uri="{FF2B5EF4-FFF2-40B4-BE49-F238E27FC236}">
-                <a16:creationId xmlns:a16="http://schemas.microsoft.com/office/drawing/2014/main" id="{5340270E-0CC4-4292-AE42-BD0C77209714}"/>
-              </a:ext>
-            </a:extLst>
-          </p:cNvPr>
-          <p:cNvPicPr>
-            <a:picLocks noChangeAspect="1"/>
-          </p:cNvPicPr>
-          <p:nvPr/>
-        </p:nvPicPr>
-        <p:blipFill>
-          <a:blip r:embed="rId3">
-            <a:extLst>
-              <a:ext uri="{28A0092B-C50C-407E-A947-70E740481C1C}">
-                <a14:useLocalDpi xmlns:a14="http://schemas.microsoft.com/office/drawing/2010/main" val="0"/>
-              </a:ext>
-              <a:ext uri="{96DAC541-7B7A-43D3-8B79-37D633B846F1}">
-                <asvg:svgBlip xmlns:asvg="http://schemas.microsoft.com/office/drawing/2016/SVG/main" r:embed="rId4"/>
-              </a:ext>
-            </a:extLst>
-          </a:blip>
-          <a:stretch>
-            <a:fillRect/>
-          </a:stretch>
-        </p:blipFill>
-        <p:spPr>
-          <a:xfrm>
-            <a:off x="9582912" y="4336000"/>
-            <a:ext cx="2342168" cy="2342168"/>
-          </a:xfrm>
-          <a:prstGeom prst="rect">
-            <a:avLst/>
-          </a:prstGeom>
-        </p:spPr>
-      </p:pic>
-    </p:spTree>
-    <p:extLst>
-      <p:ext uri="{BB962C8B-B14F-4D97-AF65-F5344CB8AC3E}">
-        <p14:creationId xmlns:p14="http://schemas.microsoft.com/office/powerpoint/2010/main" val="2732402372"/>
-      </p:ext>
-    </p:extLst>
-  </p:cSld>
-  <p:clrMapOvr>
-    <a:masterClrMapping/>
-  </p:clrMapOvr>
-  <p:transition>
-    <p:fade/>
-  </p:transition>
-</p:sld>
-</file>
-
-<file path=ppt/slides/slide9.xml><?xml version="1.0" encoding="utf-8"?>
-<p:sld xmlns:a="http://schemas.openxmlformats.org/drawingml/2006/main" xmlns:r="http://schemas.openxmlformats.org/officeDocument/2006/relationships" xmlns:p="http://schemas.openxmlformats.org/presentationml/2006/main">
-  <p:cSld>
-    <p:spTree>
-      <p:nvGrpSpPr>
-        <p:cNvPr id="1" name=""/>
-        <p:cNvGrpSpPr/>
-        <p:nvPr/>
-      </p:nvGrpSpPr>
-      <p:grpSpPr>
-        <a:xfrm>
-          <a:off x="0" y="0"/>
-          <a:ext cx="0" cy="0"/>
-          <a:chOff x="0" y="0"/>
-          <a:chExt cx="0" cy="0"/>
-        </a:xfrm>
-      </p:grpSpPr>
-      <p:sp>
-        <p:nvSpPr>
-          <p:cNvPr id="2" name="Title 1"/>
-          <p:cNvSpPr>
-            <a:spLocks noGrp="1"/>
-          </p:cNvSpPr>
-          <p:nvPr>
-            <p:ph type="title"/>
-          </p:nvPr>
-        </p:nvSpPr>
-        <p:spPr/>
-        <p:txBody>
-          <a:bodyPr>
-            <a:normAutofit fontScale="90000"/>
-          </a:bodyPr>
-          <a:lstStyle/>
-          <a:p>
-            <a:r>
-              <a:rPr lang="en-US" sz="4900" dirty="0">
-                <a:solidFill>
-                  <a:schemeClr val="tx1"/>
-                </a:solidFill>
-                <a:cs typeface="Segoe UI" panose="020B0502040204020203" pitchFamily="34" charset="0"/>
-              </a:rPr>
-              <a:t>Customer needs</a:t>
-            </a:r>
-            <a:br>
-              <a:rPr lang="en-US" dirty="0">
-                <a:solidFill>
-                  <a:schemeClr val="tx1"/>
-                </a:solidFill>
-                <a:latin typeface="Segoe UI" panose="020B0502040204020203" pitchFamily="34" charset="0"/>
-              </a:rPr>
-            </a:br>
-            <a:endParaRPr lang="en-US" sz="3236" dirty="0">
-              <a:solidFill>
-                <a:schemeClr val="tx1"/>
-              </a:solidFill>
-              <a:latin typeface="Segoe UI" panose="020B0502040204020203" pitchFamily="34" charset="0"/>
-            </a:endParaRPr>
-          </a:p>
-        </p:txBody>
-      </p:sp>
-      <p:sp>
-        <p:nvSpPr>
-          <p:cNvPr id="3" name="Content Placeholder 2"/>
-          <p:cNvSpPr>
-            <a:spLocks noGrp="1"/>
-          </p:cNvSpPr>
-          <p:nvPr>
-            <p:ph type="body" sz="quarter" idx="10"/>
-          </p:nvPr>
-        </p:nvSpPr>
-        <p:spPr>
-          <a:xfrm>
-            <a:off x="269239" y="1189176"/>
-            <a:ext cx="11653523" cy="5165519"/>
-          </a:xfrm>
-        </p:spPr>
-        <p:txBody>
-          <a:bodyPr>
-            <a:normAutofit/>
-          </a:bodyPr>
-          <a:lstStyle/>
-          <a:p>
-            <a:pPr>
-              <a:lnSpc>
-                <a:spcPct val="100000"/>
-              </a:lnSpc>
-            </a:pPr>
-            <a:r>
-              <a:rPr lang="en-US" sz="2800" dirty="0">
-                <a:solidFill>
-                  <a:schemeClr val="tx1"/>
-                </a:solidFill>
-              </a:rPr>
-              <a:t>G</a:t>
-            </a:r>
-            <a:r>
-              <a:rPr lang="en-US" sz="2800" dirty="0">
-                <a:solidFill>
-                  <a:schemeClr val="tx1"/>
-                </a:solidFill>
-                <a:latin typeface="+mj-lt"/>
-              </a:rPr>
-              <a:t>ain business insights using a combination of historical, real-time, and predictive analysis.</a:t>
-            </a:r>
-          </a:p>
-          <a:p>
-            <a:pPr>
-              <a:lnSpc>
-                <a:spcPct val="100000"/>
-              </a:lnSpc>
-            </a:pPr>
-            <a:r>
-              <a:rPr lang="en-US" sz="2800" dirty="0">
-                <a:solidFill>
-                  <a:schemeClr val="tx1"/>
-                </a:solidFill>
-                <a:cs typeface="Segoe UI Semilight" panose="020B0402040204020203" pitchFamily="34" charset="0"/>
-              </a:rPr>
-              <a:t>Have a unified approach to handling structured and unstructured data sources.</a:t>
-            </a:r>
-          </a:p>
-          <a:p>
-            <a:pPr>
-              <a:lnSpc>
-                <a:spcPct val="100000"/>
-              </a:lnSpc>
-            </a:pPr>
-            <a:r>
-              <a:rPr lang="en-US" sz="2800" dirty="0">
-                <a:solidFill>
-                  <a:schemeClr val="tx1"/>
-                </a:solidFill>
-                <a:cs typeface="Segoe UI Semilight" panose="020B0402040204020203" pitchFamily="34" charset="0"/>
-              </a:rPr>
-              <a:t>Enable data engineers and data scientists with the ability to run complex queries over petabytes of structured and unstructured enterprise operational data.</a:t>
-            </a:r>
-          </a:p>
-          <a:p>
-            <a:pPr>
-              <a:lnSpc>
-                <a:spcPct val="100000"/>
-              </a:lnSpc>
-            </a:pPr>
-            <a:r>
-              <a:rPr lang="en-US" sz="2800" dirty="0">
-                <a:solidFill>
-                  <a:schemeClr val="tx1"/>
-                </a:solidFill>
-                <a:cs typeface="Segoe UI Semilight" panose="020B0402040204020203" pitchFamily="34" charset="0"/>
-              </a:rPr>
-              <a:t>Enable business analysts and data science/data engineering teams to share a single source of truth.</a:t>
-            </a:r>
-            <a:endParaRPr lang="en-US" sz="2800" dirty="0">
-              <a:solidFill>
-                <a:schemeClr val="tx1"/>
-              </a:solidFill>
-            </a:endParaRPr>
-          </a:p>
-        </p:txBody>
-      </p:sp>
-    </p:spTree>
-    <p:extLst>
-      <p:ext uri="{BB962C8B-B14F-4D97-AF65-F5344CB8AC3E}">
-        <p14:creationId xmlns:p14="http://schemas.microsoft.com/office/powerpoint/2010/main" val="3923265977"/>
-      </p:ext>
-    </p:extLst>
-  </p:cSld>
-  <p:clrMapOvr>
-    <a:masterClrMapping/>
-  </p:clrMapOvr>
-  <mc:AlternateContent xmlns:mc="http://schemas.openxmlformats.org/markup-compatibility/2006" xmlns:p14="http://schemas.microsoft.com/office/powerpoint/2010/main">
-    <mc:Choice Requires="p14">
-      <p:transition p14:dur="0"/>
-    </mc:Choice>
-    <mc:Fallback xmlns="">
-      <p:transition/>
-    </mc:Fallback>
-  </mc:AlternateContent>
 </p:sld>
 </file>
 
@@ -27066,15 +28147,6 @@
 </file>
 
 <file path=customXml/item1.xml><?xml version="1.0" encoding="utf-8"?>
-<?mso-contentType ?>
-<FormTemplates xmlns="http://schemas.microsoft.com/sharepoint/v3/contenttype/forms">
-  <Display>DocumentLibraryForm</Display>
-  <Edit>DocumentLibraryForm</Edit>
-  <New>DocumentLibraryForm</New>
-</FormTemplates>
-</file>
-
-<file path=customXml/item2.xml><?xml version="1.0" encoding="utf-8"?>
 <ct:contentTypeSchema xmlns:ct="http://schemas.microsoft.com/office/2006/metadata/contentType" xmlns:ma="http://schemas.microsoft.com/office/2006/metadata/properties/metaAttributes" ct:_="" ma:_="" ma:contentTypeName="Document" ma:contentTypeID="0x010100D15DFA3690A15B4081582BBCC6BEAC3E" ma:contentTypeVersion="9" ma:contentTypeDescription="Create a new document." ma:contentTypeScope="" ma:versionID="642da1784587cbe85a7fdbbe4dc36103">
   <xsd:schema xmlns:xsd="http://www.w3.org/2001/XMLSchema" xmlns:xs="http://www.w3.org/2001/XMLSchema" xmlns:p="http://schemas.microsoft.com/office/2006/metadata/properties" xmlns:ns1="http://schemas.microsoft.com/sharepoint/v3" xmlns:ns2="2023ac63-7b75-4916-a9ee-591457758eee" xmlns:ns3="d9c797ad-d7c3-4982-82b7-81352a75e4a5" targetNamespace="http://schemas.microsoft.com/office/2006/metadata/properties" ma:root="true" ma:fieldsID="91198b0246576053cc55dd2c67035a89" ns1:_="" ns2:_="" ns3:_="">
     <xsd:import namespace="http://schemas.microsoft.com/sharepoint/v3"/>
@@ -27276,6 +28348,15 @@
 </ct:contentTypeSchema>
 </file>
 
+<file path=customXml/item2.xml><?xml version="1.0" encoding="utf-8"?>
+<?mso-contentType ?>
+<FormTemplates xmlns="http://schemas.microsoft.com/sharepoint/v3/contenttype/forms">
+  <Display>DocumentLibraryForm</Display>
+  <Edit>DocumentLibraryForm</Edit>
+  <New>DocumentLibraryForm</New>
+</FormTemplates>
+</file>
+
 <file path=customXml/item3.xml><?xml version="1.0" encoding="utf-8"?>
 <p:properties xmlns:p="http://schemas.microsoft.com/office/2006/metadata/properties" xmlns:xsi="http://www.w3.org/2001/XMLSchema-instance" xmlns:pc="http://schemas.microsoft.com/office/infopath/2007/PartnerControls">
   <documentManagement>
@@ -27286,14 +28367,6 @@
 </file>
 
 <file path=customXml/itemProps1.xml><?xml version="1.0" encoding="utf-8"?>
-<ds:datastoreItem xmlns:ds="http://schemas.openxmlformats.org/officeDocument/2006/customXml" ds:itemID="{F18501AF-04CF-4482-BAE1-607B49DDC378}">
-  <ds:schemaRefs>
-    <ds:schemaRef ds:uri="http://schemas.microsoft.com/sharepoint/v3/contenttype/forms"/>
-  </ds:schemaRefs>
-</ds:datastoreItem>
-</file>
-
-<file path=customXml/itemProps2.xml><?xml version="1.0" encoding="utf-8"?>
 <ds:datastoreItem xmlns:ds="http://schemas.openxmlformats.org/officeDocument/2006/customXml" ds:itemID="{255F5BEB-6AD6-480A-8556-C80C5EBC10F2}">
   <ds:schemaRefs>
     <ds:schemaRef ds:uri="http://schemas.microsoft.com/office/2006/metadata/contentType"/>
@@ -27309,6 +28382,14 @@
     <ds:schemaRef ds:uri="http://purl.org/dc/elements/1.1/"/>
     <ds:schemaRef ds:uri="http://purl.org/dc/terms/"/>
     <ds:schemaRef ds:uri="http://schemas.microsoft.com/internal/obd"/>
+  </ds:schemaRefs>
+</ds:datastoreItem>
+</file>
+
+<file path=customXml/itemProps2.xml><?xml version="1.0" encoding="utf-8"?>
+<ds:datastoreItem xmlns:ds="http://schemas.openxmlformats.org/officeDocument/2006/customXml" ds:itemID="{F18501AF-04CF-4482-BAE1-607B49DDC378}">
+  <ds:schemaRefs>
+    <ds:schemaRef ds:uri="http://schemas.microsoft.com/sharepoint/v3/contenttype/forms"/>
   </ds:schemaRefs>
 </ds:datastoreItem>
 </file>

</xml_diff>